<commit_message>
Update dialog notes for writers (#1773)
* WIP

* Update PowerPoint notes
</commit_message>
<xml_diff>
--- a/styleguide/dialogs/work-in-progress/dialog-diagrams.pptx
+++ b/styleguide/dialogs/work-in-progress/dialog-diagrams.pptx
@@ -7,6 +7,7 @@
   <p:sldIdLst>
     <p:sldId id="256" r:id="rId2"/>
     <p:sldId id="257" r:id="rId3"/>
+    <p:sldId id="258" r:id="rId4"/>
   </p:sldIdLst>
   <p:sldSz cx="12192000" cy="6858000"/>
   <p:notesSz cx="6858000" cy="9144000"/>
@@ -260,7 +261,7 @@
           <a:p>
             <a:fld id="{5E7A417E-3F10-4EE6-A8E6-5AC370CB751F}" type="datetimeFigureOut">
               <a:rPr lang="en-US" smtClean="0"/>
-              <a:t>8/12/2019</a:t>
+              <a:t>10/16/2019</a:t>
             </a:fld>
             <a:endParaRPr lang="en-US"/>
           </a:p>
@@ -458,7 +459,7 @@
           <a:p>
             <a:fld id="{5E7A417E-3F10-4EE6-A8E6-5AC370CB751F}" type="datetimeFigureOut">
               <a:rPr lang="en-US" smtClean="0"/>
-              <a:t>8/12/2019</a:t>
+              <a:t>10/16/2019</a:t>
             </a:fld>
             <a:endParaRPr lang="en-US"/>
           </a:p>
@@ -666,7 +667,7 @@
           <a:p>
             <a:fld id="{5E7A417E-3F10-4EE6-A8E6-5AC370CB751F}" type="datetimeFigureOut">
               <a:rPr lang="en-US" smtClean="0"/>
-              <a:t>8/12/2019</a:t>
+              <a:t>10/16/2019</a:t>
             </a:fld>
             <a:endParaRPr lang="en-US"/>
           </a:p>
@@ -864,7 +865,7 @@
           <a:p>
             <a:fld id="{5E7A417E-3F10-4EE6-A8E6-5AC370CB751F}" type="datetimeFigureOut">
               <a:rPr lang="en-US" smtClean="0"/>
-              <a:t>8/12/2019</a:t>
+              <a:t>10/16/2019</a:t>
             </a:fld>
             <a:endParaRPr lang="en-US"/>
           </a:p>
@@ -1139,7 +1140,7 @@
           <a:p>
             <a:fld id="{5E7A417E-3F10-4EE6-A8E6-5AC370CB751F}" type="datetimeFigureOut">
               <a:rPr lang="en-US" smtClean="0"/>
-              <a:t>8/12/2019</a:t>
+              <a:t>10/16/2019</a:t>
             </a:fld>
             <a:endParaRPr lang="en-US"/>
           </a:p>
@@ -1404,7 +1405,7 @@
           <a:p>
             <a:fld id="{5E7A417E-3F10-4EE6-A8E6-5AC370CB751F}" type="datetimeFigureOut">
               <a:rPr lang="en-US" smtClean="0"/>
-              <a:t>8/12/2019</a:t>
+              <a:t>10/16/2019</a:t>
             </a:fld>
             <a:endParaRPr lang="en-US"/>
           </a:p>
@@ -1816,7 +1817,7 @@
           <a:p>
             <a:fld id="{5E7A417E-3F10-4EE6-A8E6-5AC370CB751F}" type="datetimeFigureOut">
               <a:rPr lang="en-US" smtClean="0"/>
-              <a:t>8/12/2019</a:t>
+              <a:t>10/16/2019</a:t>
             </a:fld>
             <a:endParaRPr lang="en-US"/>
           </a:p>
@@ -1957,7 +1958,7 @@
           <a:p>
             <a:fld id="{5E7A417E-3F10-4EE6-A8E6-5AC370CB751F}" type="datetimeFigureOut">
               <a:rPr lang="en-US" smtClean="0"/>
-              <a:t>8/12/2019</a:t>
+              <a:t>10/16/2019</a:t>
             </a:fld>
             <a:endParaRPr lang="en-US"/>
           </a:p>
@@ -2070,7 +2071,7 @@
           <a:p>
             <a:fld id="{5E7A417E-3F10-4EE6-A8E6-5AC370CB751F}" type="datetimeFigureOut">
               <a:rPr lang="en-US" smtClean="0"/>
-              <a:t>8/12/2019</a:t>
+              <a:t>10/16/2019</a:t>
             </a:fld>
             <a:endParaRPr lang="en-US"/>
           </a:p>
@@ -2381,7 +2382,7 @@
           <a:p>
             <a:fld id="{5E7A417E-3F10-4EE6-A8E6-5AC370CB751F}" type="datetimeFigureOut">
               <a:rPr lang="en-US" smtClean="0"/>
-              <a:t>8/12/2019</a:t>
+              <a:t>10/16/2019</a:t>
             </a:fld>
             <a:endParaRPr lang="en-US"/>
           </a:p>
@@ -2669,7 +2670,7 @@
           <a:p>
             <a:fld id="{5E7A417E-3F10-4EE6-A8E6-5AC370CB751F}" type="datetimeFigureOut">
               <a:rPr lang="en-US" smtClean="0"/>
-              <a:t>8/12/2019</a:t>
+              <a:t>10/16/2019</a:t>
             </a:fld>
             <a:endParaRPr lang="en-US"/>
           </a:p>
@@ -2910,7 +2911,7 @@
           <a:p>
             <a:fld id="{5E7A417E-3F10-4EE6-A8E6-5AC370CB751F}" type="datetimeFigureOut">
               <a:rPr lang="en-US" smtClean="0"/>
-              <a:t>8/12/2019</a:t>
+              <a:t>10/16/2019</a:t>
             </a:fld>
             <a:endParaRPr lang="en-US"/>
           </a:p>
@@ -5129,6 +5130,3846 @@
 </p:sld>
 </file>
 
+<file path=ppt/slides/slide3.xml><?xml version="1.0" encoding="utf-8"?>
+<p:sld xmlns:a="http://schemas.openxmlformats.org/drawingml/2006/main" xmlns:r="http://schemas.openxmlformats.org/officeDocument/2006/relationships" xmlns:p="http://schemas.openxmlformats.org/presentationml/2006/main">
+  <p:cSld>
+    <p:spTree>
+      <p:nvGrpSpPr>
+        <p:cNvPr id="1" name=""/>
+        <p:cNvGrpSpPr/>
+        <p:nvPr/>
+      </p:nvGrpSpPr>
+      <p:grpSpPr>
+        <a:xfrm>
+          <a:off x="0" y="0"/>
+          <a:ext cx="0" cy="0"/>
+          <a:chOff x="0" y="0"/>
+          <a:chExt cx="0" cy="0"/>
+        </a:xfrm>
+      </p:grpSpPr>
+      <p:sp>
+        <p:nvSpPr>
+          <p:cNvPr id="185" name="Rectangle 184">
+            <a:extLst>
+              <a:ext uri="{FF2B5EF4-FFF2-40B4-BE49-F238E27FC236}">
+                <a16:creationId xmlns:a16="http://schemas.microsoft.com/office/drawing/2014/main" id="{9E7A60E2-06E2-4216-B6F1-38BB24997C0E}"/>
+              </a:ext>
+            </a:extLst>
+          </p:cNvPr>
+          <p:cNvSpPr/>
+          <p:nvPr/>
+        </p:nvSpPr>
+        <p:spPr>
+          <a:xfrm>
+            <a:off x="5295900" y="914400"/>
+            <a:ext cx="2044700" cy="1885950"/>
+          </a:xfrm>
+          <a:prstGeom prst="rect">
+            <a:avLst/>
+          </a:prstGeom>
+          <a:solidFill>
+            <a:schemeClr val="accent6">
+              <a:lumMod val="20000"/>
+              <a:lumOff val="80000"/>
+            </a:schemeClr>
+          </a:solidFill>
+          <a:ln w="12700">
+            <a:solidFill>
+              <a:schemeClr val="accent1">
+                <a:lumMod val="75000"/>
+              </a:schemeClr>
+            </a:solidFill>
+          </a:ln>
+        </p:spPr>
+        <p:style>
+          <a:lnRef idx="2">
+            <a:schemeClr val="accent1">
+              <a:shade val="50000"/>
+            </a:schemeClr>
+          </a:lnRef>
+          <a:fillRef idx="1">
+            <a:schemeClr val="accent1"/>
+          </a:fillRef>
+          <a:effectRef idx="0">
+            <a:schemeClr val="accent1"/>
+          </a:effectRef>
+          <a:fontRef idx="minor">
+            <a:schemeClr val="lt1"/>
+          </a:fontRef>
+        </p:style>
+        <p:txBody>
+          <a:bodyPr rtlCol="0" anchor="ctr"/>
+          <a:lstStyle/>
+          <a:p>
+            <a:pPr algn="ctr"/>
+            <a:endParaRPr lang="en-US"/>
+          </a:p>
+        </p:txBody>
+      </p:sp>
+      <p:sp>
+        <p:nvSpPr>
+          <p:cNvPr id="176" name="Rectangle 175">
+            <a:extLst>
+              <a:ext uri="{FF2B5EF4-FFF2-40B4-BE49-F238E27FC236}">
+                <a16:creationId xmlns:a16="http://schemas.microsoft.com/office/drawing/2014/main" id="{46AC58E3-C761-4232-8A15-922CB23F90FF}"/>
+              </a:ext>
+            </a:extLst>
+          </p:cNvPr>
+          <p:cNvSpPr/>
+          <p:nvPr/>
+        </p:nvSpPr>
+        <p:spPr>
+          <a:xfrm>
+            <a:off x="9525000" y="914400"/>
+            <a:ext cx="2286000" cy="5715000"/>
+          </a:xfrm>
+          <a:prstGeom prst="rect">
+            <a:avLst/>
+          </a:prstGeom>
+          <a:solidFill>
+            <a:schemeClr val="accent1">
+              <a:lumMod val="20000"/>
+              <a:lumOff val="80000"/>
+            </a:schemeClr>
+          </a:solidFill>
+          <a:ln w="12700">
+            <a:solidFill>
+              <a:schemeClr val="accent1">
+                <a:lumMod val="75000"/>
+              </a:schemeClr>
+            </a:solidFill>
+          </a:ln>
+        </p:spPr>
+        <p:style>
+          <a:lnRef idx="2">
+            <a:schemeClr val="accent1">
+              <a:shade val="50000"/>
+            </a:schemeClr>
+          </a:lnRef>
+          <a:fillRef idx="1">
+            <a:schemeClr val="accent1"/>
+          </a:fillRef>
+          <a:effectRef idx="0">
+            <a:schemeClr val="accent1"/>
+          </a:effectRef>
+          <a:fontRef idx="minor">
+            <a:schemeClr val="lt1"/>
+          </a:fontRef>
+        </p:style>
+        <p:txBody>
+          <a:bodyPr rtlCol="0" anchor="ctr"/>
+          <a:lstStyle/>
+          <a:p>
+            <a:pPr algn="ctr"/>
+            <a:endParaRPr lang="en-US"/>
+          </a:p>
+        </p:txBody>
+      </p:sp>
+      <p:sp>
+        <p:nvSpPr>
+          <p:cNvPr id="2" name="Rectangle 1">
+            <a:extLst>
+              <a:ext uri="{FF2B5EF4-FFF2-40B4-BE49-F238E27FC236}">
+                <a16:creationId xmlns:a16="http://schemas.microsoft.com/office/drawing/2014/main" id="{14A5457B-157B-4C6A-A516-3DEC2026CFF5}"/>
+              </a:ext>
+            </a:extLst>
+          </p:cNvPr>
+          <p:cNvSpPr/>
+          <p:nvPr/>
+        </p:nvSpPr>
+        <p:spPr>
+          <a:xfrm>
+            <a:off x="4038600" y="228600"/>
+            <a:ext cx="1600200" cy="342900"/>
+          </a:xfrm>
+          <a:prstGeom prst="rect">
+            <a:avLst/>
+          </a:prstGeom>
+          <a:solidFill>
+            <a:schemeClr val="accent2"/>
+          </a:solidFill>
+        </p:spPr>
+        <p:style>
+          <a:lnRef idx="2">
+            <a:schemeClr val="accent1">
+              <a:shade val="50000"/>
+            </a:schemeClr>
+          </a:lnRef>
+          <a:fillRef idx="1">
+            <a:schemeClr val="accent1"/>
+          </a:fillRef>
+          <a:effectRef idx="0">
+            <a:schemeClr val="accent1"/>
+          </a:effectRef>
+          <a:fontRef idx="minor">
+            <a:schemeClr val="lt1"/>
+          </a:fontRef>
+        </p:style>
+        <p:txBody>
+          <a:bodyPr rtlCol="0" anchor="ctr"/>
+          <a:lstStyle/>
+          <a:p>
+            <a:pPr algn="ctr"/>
+            <a:r>
+              <a:rPr lang="en-US" sz="1200" i="1" dirty="0"/>
+              <a:t>Dialog</a:t>
+            </a:r>
+          </a:p>
+        </p:txBody>
+      </p:sp>
+      <p:sp>
+        <p:nvSpPr>
+          <p:cNvPr id="3" name="Rectangle 2">
+            <a:extLst>
+              <a:ext uri="{FF2B5EF4-FFF2-40B4-BE49-F238E27FC236}">
+                <a16:creationId xmlns:a16="http://schemas.microsoft.com/office/drawing/2014/main" id="{31CF3F0B-7E44-4931-A033-ED4DA98D23A3}"/>
+              </a:ext>
+            </a:extLst>
+          </p:cNvPr>
+          <p:cNvSpPr/>
+          <p:nvPr/>
+        </p:nvSpPr>
+        <p:spPr>
+          <a:xfrm>
+            <a:off x="495300" y="1028700"/>
+            <a:ext cx="1600200" cy="342900"/>
+          </a:xfrm>
+          <a:prstGeom prst="rect">
+            <a:avLst/>
+          </a:prstGeom>
+          <a:solidFill>
+            <a:schemeClr val="accent2"/>
+          </a:solidFill>
+          <a:ln>
+            <a:headEnd type="triangle"/>
+            <a:tailEnd type="none"/>
+          </a:ln>
+        </p:spPr>
+        <p:style>
+          <a:lnRef idx="2">
+            <a:schemeClr val="accent1">
+              <a:shade val="50000"/>
+            </a:schemeClr>
+          </a:lnRef>
+          <a:fillRef idx="1">
+            <a:schemeClr val="accent1"/>
+          </a:fillRef>
+          <a:effectRef idx="0">
+            <a:schemeClr val="accent1"/>
+          </a:effectRef>
+          <a:fontRef idx="minor">
+            <a:schemeClr val="lt1"/>
+          </a:fontRef>
+        </p:style>
+        <p:txBody>
+          <a:bodyPr rtlCol="0" anchor="ctr"/>
+          <a:lstStyle/>
+          <a:p>
+            <a:pPr algn="ctr"/>
+            <a:r>
+              <a:rPr lang="en-US" sz="1200" i="1" dirty="0"/>
+              <a:t>Prompt</a:t>
+            </a:r>
+          </a:p>
+        </p:txBody>
+      </p:sp>
+      <p:sp>
+        <p:nvSpPr>
+          <p:cNvPr id="4" name="Rectangle 3">
+            <a:extLst>
+              <a:ext uri="{FF2B5EF4-FFF2-40B4-BE49-F238E27FC236}">
+                <a16:creationId xmlns:a16="http://schemas.microsoft.com/office/drawing/2014/main" id="{186BEA9A-55AE-4230-9DDD-00780B210F14}"/>
+              </a:ext>
+            </a:extLst>
+          </p:cNvPr>
+          <p:cNvSpPr/>
+          <p:nvPr/>
+        </p:nvSpPr>
+        <p:spPr>
+          <a:xfrm>
+            <a:off x="495300" y="1485900"/>
+            <a:ext cx="1600200" cy="228600"/>
+          </a:xfrm>
+          <a:prstGeom prst="rect">
+            <a:avLst/>
+          </a:prstGeom>
+          <a:solidFill>
+            <a:schemeClr val="accent2"/>
+          </a:solidFill>
+          <a:ln>
+            <a:headEnd type="triangle"/>
+            <a:tailEnd type="none"/>
+          </a:ln>
+        </p:spPr>
+        <p:style>
+          <a:lnRef idx="2">
+            <a:schemeClr val="accent1">
+              <a:shade val="50000"/>
+            </a:schemeClr>
+          </a:lnRef>
+          <a:fillRef idx="1">
+            <a:schemeClr val="accent1"/>
+          </a:fillRef>
+          <a:effectRef idx="0">
+            <a:schemeClr val="accent1"/>
+          </a:effectRef>
+          <a:fontRef idx="minor">
+            <a:schemeClr val="lt1"/>
+          </a:fontRef>
+        </p:style>
+        <p:txBody>
+          <a:bodyPr rtlCol="0" anchor="ctr"/>
+          <a:lstStyle/>
+          <a:p>
+            <a:pPr algn="ctr"/>
+            <a:r>
+              <a:rPr lang="en-US" sz="1200" i="1" dirty="0" err="1"/>
+              <a:t>ActivityPrompt</a:t>
+            </a:r>
+            <a:endParaRPr lang="en-US" sz="1200" i="1" dirty="0"/>
+          </a:p>
+        </p:txBody>
+      </p:sp>
+      <p:grpSp>
+        <p:nvGrpSpPr>
+          <p:cNvPr id="172" name="Group 171">
+            <a:extLst>
+              <a:ext uri="{FF2B5EF4-FFF2-40B4-BE49-F238E27FC236}">
+                <a16:creationId xmlns:a16="http://schemas.microsoft.com/office/drawing/2014/main" id="{F365C81E-6E4C-40F4-AEF9-521A3D734AF3}"/>
+              </a:ext>
+            </a:extLst>
+          </p:cNvPr>
+          <p:cNvGrpSpPr/>
+          <p:nvPr/>
+        </p:nvGrpSpPr>
+        <p:grpSpPr>
+          <a:xfrm>
+            <a:off x="495300" y="1828800"/>
+            <a:ext cx="1600200" cy="1371600"/>
+            <a:chOff x="723900" y="1828800"/>
+            <a:chExt cx="1600200" cy="1371600"/>
+          </a:xfrm>
+        </p:grpSpPr>
+        <p:sp>
+          <p:nvSpPr>
+            <p:cNvPr id="5" name="Rectangle 4">
+              <a:extLst>
+                <a:ext uri="{FF2B5EF4-FFF2-40B4-BE49-F238E27FC236}">
+                  <a16:creationId xmlns:a16="http://schemas.microsoft.com/office/drawing/2014/main" id="{D6C203E6-5DB5-496D-B940-9CF36BEA8914}"/>
+                </a:ext>
+              </a:extLst>
+            </p:cNvPr>
+            <p:cNvSpPr/>
+            <p:nvPr/>
+          </p:nvSpPr>
+          <p:spPr>
+            <a:xfrm>
+              <a:off x="723900" y="1828800"/>
+              <a:ext cx="1600200" cy="228600"/>
+            </a:xfrm>
+            <a:prstGeom prst="rect">
+              <a:avLst/>
+            </a:prstGeom>
+            <a:solidFill>
+              <a:schemeClr val="accent2"/>
+            </a:solidFill>
+            <a:ln>
+              <a:headEnd type="triangle"/>
+              <a:tailEnd type="none"/>
+            </a:ln>
+          </p:spPr>
+          <p:style>
+            <a:lnRef idx="2">
+              <a:schemeClr val="accent1">
+                <a:shade val="50000"/>
+              </a:schemeClr>
+            </a:lnRef>
+            <a:fillRef idx="1">
+              <a:schemeClr val="accent1"/>
+            </a:fillRef>
+            <a:effectRef idx="0">
+              <a:schemeClr val="accent1"/>
+            </a:effectRef>
+            <a:fontRef idx="minor">
+              <a:schemeClr val="lt1"/>
+            </a:fontRef>
+          </p:style>
+          <p:txBody>
+            <a:bodyPr rtlCol="0" anchor="ctr"/>
+            <a:lstStyle/>
+            <a:p>
+              <a:pPr algn="ctr"/>
+              <a:r>
+                <a:rPr lang="en-US" sz="1200" dirty="0" err="1"/>
+                <a:t>AttachmentPrompt</a:t>
+              </a:r>
+              <a:endParaRPr lang="en-US" sz="1200" dirty="0"/>
+            </a:p>
+          </p:txBody>
+        </p:sp>
+        <p:sp>
+          <p:nvSpPr>
+            <p:cNvPr id="6" name="Rectangle 5">
+              <a:extLst>
+                <a:ext uri="{FF2B5EF4-FFF2-40B4-BE49-F238E27FC236}">
+                  <a16:creationId xmlns:a16="http://schemas.microsoft.com/office/drawing/2014/main" id="{885771FC-2728-4036-972E-4188F13C9CBF}"/>
+                </a:ext>
+              </a:extLst>
+            </p:cNvPr>
+            <p:cNvSpPr/>
+            <p:nvPr/>
+          </p:nvSpPr>
+          <p:spPr>
+            <a:xfrm>
+              <a:off x="723900" y="2057400"/>
+              <a:ext cx="1600200" cy="228600"/>
+            </a:xfrm>
+            <a:prstGeom prst="rect">
+              <a:avLst/>
+            </a:prstGeom>
+            <a:solidFill>
+              <a:schemeClr val="accent2"/>
+            </a:solidFill>
+            <a:ln>
+              <a:headEnd type="triangle"/>
+              <a:tailEnd type="none"/>
+            </a:ln>
+          </p:spPr>
+          <p:style>
+            <a:lnRef idx="2">
+              <a:schemeClr val="accent1">
+                <a:shade val="50000"/>
+              </a:schemeClr>
+            </a:lnRef>
+            <a:fillRef idx="1">
+              <a:schemeClr val="accent1"/>
+            </a:fillRef>
+            <a:effectRef idx="0">
+              <a:schemeClr val="accent1"/>
+            </a:effectRef>
+            <a:fontRef idx="minor">
+              <a:schemeClr val="lt1"/>
+            </a:fontRef>
+          </p:style>
+          <p:txBody>
+            <a:bodyPr rtlCol="0" anchor="ctr"/>
+            <a:lstStyle/>
+            <a:p>
+              <a:pPr algn="ctr"/>
+              <a:r>
+                <a:rPr lang="en-US" sz="1200" dirty="0" err="1"/>
+                <a:t>ChoicePrompt</a:t>
+              </a:r>
+              <a:endParaRPr lang="en-US" sz="1200" dirty="0"/>
+            </a:p>
+          </p:txBody>
+        </p:sp>
+        <p:sp>
+          <p:nvSpPr>
+            <p:cNvPr id="7" name="Rectangle 6">
+              <a:extLst>
+                <a:ext uri="{FF2B5EF4-FFF2-40B4-BE49-F238E27FC236}">
+                  <a16:creationId xmlns:a16="http://schemas.microsoft.com/office/drawing/2014/main" id="{E15FBD0C-DB9A-475B-884B-028646E484AB}"/>
+                </a:ext>
+              </a:extLst>
+            </p:cNvPr>
+            <p:cNvSpPr/>
+            <p:nvPr/>
+          </p:nvSpPr>
+          <p:spPr>
+            <a:xfrm>
+              <a:off x="723900" y="2286000"/>
+              <a:ext cx="1600200" cy="228600"/>
+            </a:xfrm>
+            <a:prstGeom prst="rect">
+              <a:avLst/>
+            </a:prstGeom>
+            <a:solidFill>
+              <a:schemeClr val="accent2"/>
+            </a:solidFill>
+            <a:ln>
+              <a:headEnd type="triangle"/>
+              <a:tailEnd type="none"/>
+            </a:ln>
+          </p:spPr>
+          <p:style>
+            <a:lnRef idx="2">
+              <a:schemeClr val="accent1">
+                <a:shade val="50000"/>
+              </a:schemeClr>
+            </a:lnRef>
+            <a:fillRef idx="1">
+              <a:schemeClr val="accent1"/>
+            </a:fillRef>
+            <a:effectRef idx="0">
+              <a:schemeClr val="accent1"/>
+            </a:effectRef>
+            <a:fontRef idx="minor">
+              <a:schemeClr val="lt1"/>
+            </a:fontRef>
+          </p:style>
+          <p:txBody>
+            <a:bodyPr rtlCol="0" anchor="ctr"/>
+            <a:lstStyle/>
+            <a:p>
+              <a:pPr algn="ctr"/>
+              <a:r>
+                <a:rPr lang="en-US" sz="1200" dirty="0" err="1"/>
+                <a:t>ConfirmPrompt</a:t>
+              </a:r>
+              <a:endParaRPr lang="en-US" sz="1200" dirty="0"/>
+            </a:p>
+          </p:txBody>
+        </p:sp>
+        <p:sp>
+          <p:nvSpPr>
+            <p:cNvPr id="8" name="Rectangle 7">
+              <a:extLst>
+                <a:ext uri="{FF2B5EF4-FFF2-40B4-BE49-F238E27FC236}">
+                  <a16:creationId xmlns:a16="http://schemas.microsoft.com/office/drawing/2014/main" id="{7042A6E2-D6C5-43A0-9C75-4309D725A384}"/>
+                </a:ext>
+              </a:extLst>
+            </p:cNvPr>
+            <p:cNvSpPr/>
+            <p:nvPr/>
+          </p:nvSpPr>
+          <p:spPr>
+            <a:xfrm>
+              <a:off x="723900" y="2514600"/>
+              <a:ext cx="1600200" cy="228600"/>
+            </a:xfrm>
+            <a:prstGeom prst="rect">
+              <a:avLst/>
+            </a:prstGeom>
+            <a:solidFill>
+              <a:schemeClr val="accent2"/>
+            </a:solidFill>
+            <a:ln>
+              <a:headEnd type="triangle"/>
+              <a:tailEnd type="none"/>
+            </a:ln>
+          </p:spPr>
+          <p:style>
+            <a:lnRef idx="2">
+              <a:schemeClr val="accent1">
+                <a:shade val="50000"/>
+              </a:schemeClr>
+            </a:lnRef>
+            <a:fillRef idx="1">
+              <a:schemeClr val="accent1"/>
+            </a:fillRef>
+            <a:effectRef idx="0">
+              <a:schemeClr val="accent1"/>
+            </a:effectRef>
+            <a:fontRef idx="minor">
+              <a:schemeClr val="lt1"/>
+            </a:fontRef>
+          </p:style>
+          <p:txBody>
+            <a:bodyPr rtlCol="0" anchor="ctr"/>
+            <a:lstStyle/>
+            <a:p>
+              <a:pPr algn="ctr"/>
+              <a:r>
+                <a:rPr lang="en-US" sz="1200" dirty="0" err="1"/>
+                <a:t>DateTimePrompt</a:t>
+              </a:r>
+              <a:endParaRPr lang="en-US" sz="1200" dirty="0"/>
+            </a:p>
+          </p:txBody>
+        </p:sp>
+        <p:sp>
+          <p:nvSpPr>
+            <p:cNvPr id="9" name="Rectangle 8">
+              <a:extLst>
+                <a:ext uri="{FF2B5EF4-FFF2-40B4-BE49-F238E27FC236}">
+                  <a16:creationId xmlns:a16="http://schemas.microsoft.com/office/drawing/2014/main" id="{2D366A59-A88A-4317-A5C6-A91172A9978A}"/>
+                </a:ext>
+              </a:extLst>
+            </p:cNvPr>
+            <p:cNvSpPr/>
+            <p:nvPr/>
+          </p:nvSpPr>
+          <p:spPr>
+            <a:xfrm>
+              <a:off x="723900" y="2743200"/>
+              <a:ext cx="1600200" cy="228600"/>
+            </a:xfrm>
+            <a:prstGeom prst="rect">
+              <a:avLst/>
+            </a:prstGeom>
+            <a:solidFill>
+              <a:schemeClr val="accent2"/>
+            </a:solidFill>
+            <a:ln>
+              <a:headEnd type="triangle"/>
+              <a:tailEnd type="none"/>
+            </a:ln>
+          </p:spPr>
+          <p:style>
+            <a:lnRef idx="2">
+              <a:schemeClr val="accent1">
+                <a:shade val="50000"/>
+              </a:schemeClr>
+            </a:lnRef>
+            <a:fillRef idx="1">
+              <a:schemeClr val="accent1"/>
+            </a:fillRef>
+            <a:effectRef idx="0">
+              <a:schemeClr val="accent1"/>
+            </a:effectRef>
+            <a:fontRef idx="minor">
+              <a:schemeClr val="lt1"/>
+            </a:fontRef>
+          </p:style>
+          <p:txBody>
+            <a:bodyPr rtlCol="0" anchor="ctr"/>
+            <a:lstStyle/>
+            <a:p>
+              <a:pPr algn="ctr"/>
+              <a:r>
+                <a:rPr lang="en-US" sz="1200" dirty="0" err="1"/>
+                <a:t>NumberPrompt</a:t>
+              </a:r>
+              <a:endParaRPr lang="en-US" sz="1200" dirty="0"/>
+            </a:p>
+          </p:txBody>
+        </p:sp>
+        <p:sp>
+          <p:nvSpPr>
+            <p:cNvPr id="10" name="Rectangle 9">
+              <a:extLst>
+                <a:ext uri="{FF2B5EF4-FFF2-40B4-BE49-F238E27FC236}">
+                  <a16:creationId xmlns:a16="http://schemas.microsoft.com/office/drawing/2014/main" id="{CE6C50C1-7A43-4EAB-B227-8CB3C92916B5}"/>
+                </a:ext>
+              </a:extLst>
+            </p:cNvPr>
+            <p:cNvSpPr/>
+            <p:nvPr/>
+          </p:nvSpPr>
+          <p:spPr>
+            <a:xfrm>
+              <a:off x="723900" y="2971800"/>
+              <a:ext cx="1600200" cy="228600"/>
+            </a:xfrm>
+            <a:prstGeom prst="rect">
+              <a:avLst/>
+            </a:prstGeom>
+            <a:solidFill>
+              <a:schemeClr val="accent2"/>
+            </a:solidFill>
+            <a:ln>
+              <a:headEnd type="triangle"/>
+              <a:tailEnd type="none"/>
+            </a:ln>
+          </p:spPr>
+          <p:style>
+            <a:lnRef idx="2">
+              <a:schemeClr val="accent1">
+                <a:shade val="50000"/>
+              </a:schemeClr>
+            </a:lnRef>
+            <a:fillRef idx="1">
+              <a:schemeClr val="accent1"/>
+            </a:fillRef>
+            <a:effectRef idx="0">
+              <a:schemeClr val="accent1"/>
+            </a:effectRef>
+            <a:fontRef idx="minor">
+              <a:schemeClr val="lt1"/>
+            </a:fontRef>
+          </p:style>
+          <p:txBody>
+            <a:bodyPr rtlCol="0" anchor="ctr"/>
+            <a:lstStyle/>
+            <a:p>
+              <a:pPr algn="ctr"/>
+              <a:r>
+                <a:rPr lang="en-US" sz="1200" dirty="0" err="1"/>
+                <a:t>TextPrompt</a:t>
+              </a:r>
+              <a:endParaRPr lang="en-US" sz="1200" dirty="0"/>
+            </a:p>
+          </p:txBody>
+        </p:sp>
+      </p:grpSp>
+      <p:cxnSp>
+        <p:nvCxnSpPr>
+          <p:cNvPr id="12" name="Connector: Elbow 11">
+            <a:extLst>
+              <a:ext uri="{FF2B5EF4-FFF2-40B4-BE49-F238E27FC236}">
+                <a16:creationId xmlns:a16="http://schemas.microsoft.com/office/drawing/2014/main" id="{8F6678F3-C0A1-40E3-8677-7E211287C3C9}"/>
+              </a:ext>
+            </a:extLst>
+          </p:cNvPr>
+          <p:cNvCxnSpPr>
+            <a:cxnSpLocks/>
+            <a:stCxn id="3" idx="3"/>
+            <a:endCxn id="4" idx="3"/>
+          </p:cNvCxnSpPr>
+          <p:nvPr/>
+        </p:nvCxnSpPr>
+        <p:spPr>
+          <a:xfrm>
+            <a:off x="2095500" y="1200150"/>
+            <a:ext cx="12700" cy="400050"/>
+          </a:xfrm>
+          <a:prstGeom prst="bentConnector3">
+            <a:avLst>
+              <a:gd name="adj1" fmla="val 1800000"/>
+            </a:avLst>
+          </a:prstGeom>
+          <a:ln>
+            <a:headEnd type="triangle"/>
+            <a:tailEnd type="none"/>
+          </a:ln>
+        </p:spPr>
+        <p:style>
+          <a:lnRef idx="1">
+            <a:schemeClr val="accent1"/>
+          </a:lnRef>
+          <a:fillRef idx="0">
+            <a:schemeClr val="accent1"/>
+          </a:fillRef>
+          <a:effectRef idx="0">
+            <a:schemeClr val="accent1"/>
+          </a:effectRef>
+          <a:fontRef idx="minor">
+            <a:schemeClr val="tx1"/>
+          </a:fontRef>
+        </p:style>
+      </p:cxnSp>
+      <p:cxnSp>
+        <p:nvCxnSpPr>
+          <p:cNvPr id="14" name="Connector: Elbow 13">
+            <a:extLst>
+              <a:ext uri="{FF2B5EF4-FFF2-40B4-BE49-F238E27FC236}">
+                <a16:creationId xmlns:a16="http://schemas.microsoft.com/office/drawing/2014/main" id="{A4EB4675-0FF6-4C18-A828-9376545BAE52}"/>
+              </a:ext>
+            </a:extLst>
+          </p:cNvPr>
+          <p:cNvCxnSpPr>
+            <a:cxnSpLocks/>
+            <a:stCxn id="3" idx="3"/>
+            <a:endCxn id="5" idx="3"/>
+          </p:cNvCxnSpPr>
+          <p:nvPr/>
+        </p:nvCxnSpPr>
+        <p:spPr>
+          <a:xfrm>
+            <a:off x="2095500" y="1200150"/>
+            <a:ext cx="12700" cy="742950"/>
+          </a:xfrm>
+          <a:prstGeom prst="bentConnector3">
+            <a:avLst>
+              <a:gd name="adj1" fmla="val 1800000"/>
+            </a:avLst>
+          </a:prstGeom>
+          <a:ln>
+            <a:headEnd type="triangle"/>
+            <a:tailEnd type="none"/>
+          </a:ln>
+        </p:spPr>
+        <p:style>
+          <a:lnRef idx="1">
+            <a:schemeClr val="accent1"/>
+          </a:lnRef>
+          <a:fillRef idx="0">
+            <a:schemeClr val="accent1"/>
+          </a:fillRef>
+          <a:effectRef idx="0">
+            <a:schemeClr val="accent1"/>
+          </a:effectRef>
+          <a:fontRef idx="minor">
+            <a:schemeClr val="tx1"/>
+          </a:fontRef>
+        </p:style>
+      </p:cxnSp>
+      <p:cxnSp>
+        <p:nvCxnSpPr>
+          <p:cNvPr id="26" name="Connector: Elbow 25">
+            <a:extLst>
+              <a:ext uri="{FF2B5EF4-FFF2-40B4-BE49-F238E27FC236}">
+                <a16:creationId xmlns:a16="http://schemas.microsoft.com/office/drawing/2014/main" id="{23C22E53-F894-4A86-8627-EFB945B58000}"/>
+              </a:ext>
+            </a:extLst>
+          </p:cNvPr>
+          <p:cNvCxnSpPr>
+            <a:cxnSpLocks/>
+            <a:stCxn id="3" idx="0"/>
+            <a:endCxn id="2" idx="2"/>
+          </p:cNvCxnSpPr>
+          <p:nvPr/>
+        </p:nvCxnSpPr>
+        <p:spPr>
+          <a:xfrm rot="5400000" flipH="1" flipV="1">
+            <a:off x="2838450" y="-971550"/>
+            <a:ext cx="457200" cy="3543300"/>
+          </a:xfrm>
+          <a:prstGeom prst="bentConnector3">
+            <a:avLst/>
+          </a:prstGeom>
+          <a:ln>
+            <a:tailEnd type="triangle"/>
+          </a:ln>
+        </p:spPr>
+        <p:style>
+          <a:lnRef idx="1">
+            <a:schemeClr val="accent1"/>
+          </a:lnRef>
+          <a:fillRef idx="0">
+            <a:schemeClr val="accent1"/>
+          </a:fillRef>
+          <a:effectRef idx="0">
+            <a:schemeClr val="accent1"/>
+          </a:effectRef>
+          <a:fontRef idx="minor">
+            <a:schemeClr val="tx1"/>
+          </a:fontRef>
+        </p:style>
+      </p:cxnSp>
+      <p:sp>
+        <p:nvSpPr>
+          <p:cNvPr id="27" name="Rectangle 26">
+            <a:extLst>
+              <a:ext uri="{FF2B5EF4-FFF2-40B4-BE49-F238E27FC236}">
+                <a16:creationId xmlns:a16="http://schemas.microsoft.com/office/drawing/2014/main" id="{88764262-BA1A-423A-8D84-46ADD3B467F8}"/>
+              </a:ext>
+            </a:extLst>
+          </p:cNvPr>
+          <p:cNvSpPr/>
+          <p:nvPr/>
+        </p:nvSpPr>
+        <p:spPr>
+          <a:xfrm>
+            <a:off x="3009900" y="1943100"/>
+            <a:ext cx="1600200" cy="342900"/>
+          </a:xfrm>
+          <a:prstGeom prst="rect">
+            <a:avLst/>
+          </a:prstGeom>
+          <a:solidFill>
+            <a:schemeClr val="accent2"/>
+          </a:solidFill>
+          <a:ln>
+            <a:headEnd type="triangle"/>
+            <a:tailEnd type="none"/>
+          </a:ln>
+        </p:spPr>
+        <p:style>
+          <a:lnRef idx="2">
+            <a:schemeClr val="accent1">
+              <a:shade val="50000"/>
+            </a:schemeClr>
+          </a:lnRef>
+          <a:fillRef idx="1">
+            <a:schemeClr val="accent1"/>
+          </a:fillRef>
+          <a:effectRef idx="0">
+            <a:schemeClr val="accent1"/>
+          </a:effectRef>
+          <a:fontRef idx="minor">
+            <a:schemeClr val="lt1"/>
+          </a:fontRef>
+        </p:style>
+        <p:txBody>
+          <a:bodyPr rtlCol="0" anchor="ctr"/>
+          <a:lstStyle/>
+          <a:p>
+            <a:pPr algn="ctr"/>
+            <a:r>
+              <a:rPr lang="en-US" sz="1200" dirty="0" err="1"/>
+              <a:t>OAuthPrompt</a:t>
+            </a:r>
+            <a:endParaRPr lang="en-US" sz="1200" dirty="0"/>
+          </a:p>
+        </p:txBody>
+      </p:sp>
+      <p:cxnSp>
+        <p:nvCxnSpPr>
+          <p:cNvPr id="29" name="Connector: Elbow 28">
+            <a:extLst>
+              <a:ext uri="{FF2B5EF4-FFF2-40B4-BE49-F238E27FC236}">
+                <a16:creationId xmlns:a16="http://schemas.microsoft.com/office/drawing/2014/main" id="{A59C3755-6A6A-449A-A451-27B8AEBCDAFA}"/>
+              </a:ext>
+            </a:extLst>
+          </p:cNvPr>
+          <p:cNvCxnSpPr>
+            <a:cxnSpLocks/>
+            <a:stCxn id="27" idx="3"/>
+            <a:endCxn id="2" idx="2"/>
+          </p:cNvCxnSpPr>
+          <p:nvPr/>
+        </p:nvCxnSpPr>
+        <p:spPr>
+          <a:xfrm flipV="1">
+            <a:off x="4610100" y="571500"/>
+            <a:ext cx="228600" cy="1543050"/>
+          </a:xfrm>
+          <a:prstGeom prst="bentConnector2">
+            <a:avLst/>
+          </a:prstGeom>
+          <a:ln>
+            <a:tailEnd type="triangle"/>
+          </a:ln>
+        </p:spPr>
+        <p:style>
+          <a:lnRef idx="1">
+            <a:schemeClr val="accent1"/>
+          </a:lnRef>
+          <a:fillRef idx="0">
+            <a:schemeClr val="accent1"/>
+          </a:fillRef>
+          <a:effectRef idx="0">
+            <a:schemeClr val="accent1"/>
+          </a:effectRef>
+          <a:fontRef idx="minor">
+            <a:schemeClr val="tx1"/>
+          </a:fontRef>
+        </p:style>
+      </p:cxnSp>
+      <p:sp>
+        <p:nvSpPr>
+          <p:cNvPr id="30" name="Rectangle 29">
+            <a:extLst>
+              <a:ext uri="{FF2B5EF4-FFF2-40B4-BE49-F238E27FC236}">
+                <a16:creationId xmlns:a16="http://schemas.microsoft.com/office/drawing/2014/main" id="{1DFA52FE-D874-4796-8A1A-C30E805ECB1D}"/>
+              </a:ext>
+            </a:extLst>
+          </p:cNvPr>
+          <p:cNvSpPr/>
+          <p:nvPr/>
+        </p:nvSpPr>
+        <p:spPr>
+          <a:xfrm>
+            <a:off x="2552700" y="1028700"/>
+            <a:ext cx="1600200" cy="342900"/>
+          </a:xfrm>
+          <a:prstGeom prst="rect">
+            <a:avLst/>
+          </a:prstGeom>
+          <a:solidFill>
+            <a:schemeClr val="accent2"/>
+          </a:solidFill>
+        </p:spPr>
+        <p:style>
+          <a:lnRef idx="2">
+            <a:schemeClr val="accent1">
+              <a:shade val="50000"/>
+            </a:schemeClr>
+          </a:lnRef>
+          <a:fillRef idx="1">
+            <a:schemeClr val="accent1"/>
+          </a:fillRef>
+          <a:effectRef idx="0">
+            <a:schemeClr val="accent1"/>
+          </a:effectRef>
+          <a:fontRef idx="minor">
+            <a:schemeClr val="lt1"/>
+          </a:fontRef>
+        </p:style>
+        <p:txBody>
+          <a:bodyPr rtlCol="0" anchor="ctr"/>
+          <a:lstStyle/>
+          <a:p>
+            <a:pPr algn="ctr"/>
+            <a:r>
+              <a:rPr lang="en-US" sz="1200" dirty="0" err="1"/>
+              <a:t>WaterfallDialog</a:t>
+            </a:r>
+            <a:endParaRPr lang="en-US" sz="1200" dirty="0"/>
+          </a:p>
+        </p:txBody>
+      </p:sp>
+      <p:sp>
+        <p:nvSpPr>
+          <p:cNvPr id="31" name="Rectangle 30">
+            <a:extLst>
+              <a:ext uri="{FF2B5EF4-FFF2-40B4-BE49-F238E27FC236}">
+                <a16:creationId xmlns:a16="http://schemas.microsoft.com/office/drawing/2014/main" id="{744B6EF3-DF45-467B-A9F4-96FB6BCCBE81}"/>
+              </a:ext>
+            </a:extLst>
+          </p:cNvPr>
+          <p:cNvSpPr/>
+          <p:nvPr/>
+        </p:nvSpPr>
+        <p:spPr>
+          <a:xfrm>
+            <a:off x="5638800" y="1028700"/>
+            <a:ext cx="1600200" cy="342900"/>
+          </a:xfrm>
+          <a:prstGeom prst="rect">
+            <a:avLst/>
+          </a:prstGeom>
+          <a:solidFill>
+            <a:schemeClr val="accent6"/>
+          </a:solidFill>
+        </p:spPr>
+        <p:style>
+          <a:lnRef idx="2">
+            <a:schemeClr val="accent1">
+              <a:shade val="50000"/>
+            </a:schemeClr>
+          </a:lnRef>
+          <a:fillRef idx="1">
+            <a:schemeClr val="accent1"/>
+          </a:fillRef>
+          <a:effectRef idx="0">
+            <a:schemeClr val="accent1"/>
+          </a:effectRef>
+          <a:fontRef idx="minor">
+            <a:schemeClr val="lt1"/>
+          </a:fontRef>
+        </p:style>
+        <p:txBody>
+          <a:bodyPr rtlCol="0" anchor="ctr"/>
+          <a:lstStyle/>
+          <a:p>
+            <a:pPr algn="ctr"/>
+            <a:r>
+              <a:rPr lang="en-US" sz="1200" i="1" dirty="0" err="1"/>
+              <a:t>DialogContainer</a:t>
+            </a:r>
+            <a:endParaRPr lang="en-US" sz="1200" i="1" dirty="0"/>
+          </a:p>
+        </p:txBody>
+      </p:sp>
+      <p:cxnSp>
+        <p:nvCxnSpPr>
+          <p:cNvPr id="33" name="Connector: Elbow 32">
+            <a:extLst>
+              <a:ext uri="{FF2B5EF4-FFF2-40B4-BE49-F238E27FC236}">
+                <a16:creationId xmlns:a16="http://schemas.microsoft.com/office/drawing/2014/main" id="{764688A8-07D3-47FC-AB75-54A1678A4354}"/>
+              </a:ext>
+            </a:extLst>
+          </p:cNvPr>
+          <p:cNvCxnSpPr>
+            <a:cxnSpLocks/>
+            <a:stCxn id="31" idx="0"/>
+            <a:endCxn id="2" idx="2"/>
+          </p:cNvCxnSpPr>
+          <p:nvPr/>
+        </p:nvCxnSpPr>
+        <p:spPr>
+          <a:xfrm rot="16200000" flipV="1">
+            <a:off x="5410200" y="0"/>
+            <a:ext cx="457200" cy="1600200"/>
+          </a:xfrm>
+          <a:prstGeom prst="bentConnector3">
+            <a:avLst/>
+          </a:prstGeom>
+          <a:ln>
+            <a:tailEnd type="triangle"/>
+          </a:ln>
+        </p:spPr>
+        <p:style>
+          <a:lnRef idx="1">
+            <a:schemeClr val="accent1"/>
+          </a:lnRef>
+          <a:fillRef idx="0">
+            <a:schemeClr val="accent1"/>
+          </a:fillRef>
+          <a:effectRef idx="0">
+            <a:schemeClr val="accent1"/>
+          </a:effectRef>
+          <a:fontRef idx="minor">
+            <a:schemeClr val="tx1"/>
+          </a:fontRef>
+        </p:style>
+      </p:cxnSp>
+      <p:cxnSp>
+        <p:nvCxnSpPr>
+          <p:cNvPr id="35" name="Connector: Elbow 34">
+            <a:extLst>
+              <a:ext uri="{FF2B5EF4-FFF2-40B4-BE49-F238E27FC236}">
+                <a16:creationId xmlns:a16="http://schemas.microsoft.com/office/drawing/2014/main" id="{8DA24480-8C0A-41EA-B8EC-8271CCA5B4CA}"/>
+              </a:ext>
+            </a:extLst>
+          </p:cNvPr>
+          <p:cNvCxnSpPr>
+            <a:cxnSpLocks/>
+            <a:stCxn id="30" idx="0"/>
+            <a:endCxn id="2" idx="2"/>
+          </p:cNvCxnSpPr>
+          <p:nvPr/>
+        </p:nvCxnSpPr>
+        <p:spPr>
+          <a:xfrm rot="5400000" flipH="1" flipV="1">
+            <a:off x="3867150" y="57150"/>
+            <a:ext cx="457200" cy="1485900"/>
+          </a:xfrm>
+          <a:prstGeom prst="bentConnector3">
+            <a:avLst/>
+          </a:prstGeom>
+          <a:ln>
+            <a:tailEnd type="triangle"/>
+          </a:ln>
+        </p:spPr>
+        <p:style>
+          <a:lnRef idx="1">
+            <a:schemeClr val="accent1"/>
+          </a:lnRef>
+          <a:fillRef idx="0">
+            <a:schemeClr val="accent1"/>
+          </a:fillRef>
+          <a:effectRef idx="0">
+            <a:schemeClr val="accent1"/>
+          </a:effectRef>
+          <a:fontRef idx="minor">
+            <a:schemeClr val="tx1"/>
+          </a:fontRef>
+        </p:style>
+      </p:cxnSp>
+      <p:sp>
+        <p:nvSpPr>
+          <p:cNvPr id="36" name="Rectangle 35">
+            <a:extLst>
+              <a:ext uri="{FF2B5EF4-FFF2-40B4-BE49-F238E27FC236}">
+                <a16:creationId xmlns:a16="http://schemas.microsoft.com/office/drawing/2014/main" id="{26146FC0-A6AF-4196-84EF-C77EAD769153}"/>
+              </a:ext>
+            </a:extLst>
+          </p:cNvPr>
+          <p:cNvSpPr/>
+          <p:nvPr/>
+        </p:nvSpPr>
+        <p:spPr>
+          <a:xfrm>
+            <a:off x="5638800" y="1714500"/>
+            <a:ext cx="1600200" cy="342900"/>
+          </a:xfrm>
+          <a:prstGeom prst="rect">
+            <a:avLst/>
+          </a:prstGeom>
+          <a:solidFill>
+            <a:schemeClr val="accent2"/>
+          </a:solidFill>
+        </p:spPr>
+        <p:style>
+          <a:lnRef idx="2">
+            <a:schemeClr val="accent1">
+              <a:shade val="50000"/>
+            </a:schemeClr>
+          </a:lnRef>
+          <a:fillRef idx="1">
+            <a:schemeClr val="accent1"/>
+          </a:fillRef>
+          <a:effectRef idx="0">
+            <a:schemeClr val="accent1"/>
+          </a:effectRef>
+          <a:fontRef idx="minor">
+            <a:schemeClr val="lt1"/>
+          </a:fontRef>
+        </p:style>
+        <p:txBody>
+          <a:bodyPr rtlCol="0" anchor="ctr"/>
+          <a:lstStyle/>
+          <a:p>
+            <a:pPr algn="ctr"/>
+            <a:r>
+              <a:rPr lang="en-US" sz="1200" dirty="0" err="1"/>
+              <a:t>ComponentDialog</a:t>
+            </a:r>
+            <a:endParaRPr lang="en-US" sz="1200" dirty="0"/>
+          </a:p>
+        </p:txBody>
+      </p:sp>
+      <p:sp>
+        <p:nvSpPr>
+          <p:cNvPr id="37" name="Rectangle 36">
+            <a:extLst>
+              <a:ext uri="{FF2B5EF4-FFF2-40B4-BE49-F238E27FC236}">
+                <a16:creationId xmlns:a16="http://schemas.microsoft.com/office/drawing/2014/main" id="{D33E5408-756B-45AC-9BD9-DFBCAFC862EE}"/>
+              </a:ext>
+            </a:extLst>
+          </p:cNvPr>
+          <p:cNvSpPr/>
+          <p:nvPr/>
+        </p:nvSpPr>
+        <p:spPr>
+          <a:xfrm>
+            <a:off x="5638800" y="2286000"/>
+            <a:ext cx="1600200" cy="342900"/>
+          </a:xfrm>
+          <a:prstGeom prst="rect">
+            <a:avLst/>
+          </a:prstGeom>
+          <a:solidFill>
+            <a:schemeClr val="accent5"/>
+          </a:solidFill>
+        </p:spPr>
+        <p:style>
+          <a:lnRef idx="2">
+            <a:schemeClr val="accent1">
+              <a:shade val="50000"/>
+            </a:schemeClr>
+          </a:lnRef>
+          <a:fillRef idx="1">
+            <a:schemeClr val="accent1"/>
+          </a:fillRef>
+          <a:effectRef idx="0">
+            <a:schemeClr val="accent1"/>
+          </a:effectRef>
+          <a:fontRef idx="minor">
+            <a:schemeClr val="lt1"/>
+          </a:fontRef>
+        </p:style>
+        <p:txBody>
+          <a:bodyPr rtlCol="0" anchor="ctr"/>
+          <a:lstStyle/>
+          <a:p>
+            <a:pPr algn="ctr"/>
+            <a:r>
+              <a:rPr lang="en-US" sz="1200" dirty="0" err="1"/>
+              <a:t>AdaptiveDialog</a:t>
+            </a:r>
+            <a:endParaRPr lang="en-US" sz="1200" dirty="0"/>
+          </a:p>
+        </p:txBody>
+      </p:sp>
+      <p:sp>
+        <p:nvSpPr>
+          <p:cNvPr id="38" name="Rectangle 37">
+            <a:extLst>
+              <a:ext uri="{FF2B5EF4-FFF2-40B4-BE49-F238E27FC236}">
+                <a16:creationId xmlns:a16="http://schemas.microsoft.com/office/drawing/2014/main" id="{36715E5F-0532-4EEF-903B-045BBB5151A7}"/>
+              </a:ext>
+            </a:extLst>
+          </p:cNvPr>
+          <p:cNvSpPr/>
+          <p:nvPr/>
+        </p:nvSpPr>
+        <p:spPr>
+          <a:xfrm>
+            <a:off x="7696200" y="1028700"/>
+            <a:ext cx="1600200" cy="342900"/>
+          </a:xfrm>
+          <a:prstGeom prst="rect">
+            <a:avLst/>
+          </a:prstGeom>
+          <a:solidFill>
+            <a:schemeClr val="accent5"/>
+          </a:solidFill>
+        </p:spPr>
+        <p:style>
+          <a:lnRef idx="2">
+            <a:schemeClr val="accent1">
+              <a:shade val="50000"/>
+            </a:schemeClr>
+          </a:lnRef>
+          <a:fillRef idx="1">
+            <a:schemeClr val="accent1"/>
+          </a:fillRef>
+          <a:effectRef idx="0">
+            <a:schemeClr val="accent1"/>
+          </a:effectRef>
+          <a:fontRef idx="minor">
+            <a:schemeClr val="lt1"/>
+          </a:fontRef>
+        </p:style>
+        <p:txBody>
+          <a:bodyPr rtlCol="0" anchor="ctr"/>
+          <a:lstStyle/>
+          <a:p>
+            <a:pPr algn="ctr"/>
+            <a:r>
+              <a:rPr lang="en-US" sz="1200" i="1" dirty="0" err="1"/>
+              <a:t>InputDialog</a:t>
+            </a:r>
+            <a:endParaRPr lang="en-US" sz="1200" i="1" dirty="0"/>
+          </a:p>
+        </p:txBody>
+      </p:sp>
+      <p:sp>
+        <p:nvSpPr>
+          <p:cNvPr id="39" name="Rectangle 38">
+            <a:extLst>
+              <a:ext uri="{FF2B5EF4-FFF2-40B4-BE49-F238E27FC236}">
+                <a16:creationId xmlns:a16="http://schemas.microsoft.com/office/drawing/2014/main" id="{62EB7AB5-AC41-40C1-8953-75026956EC40}"/>
+              </a:ext>
+            </a:extLst>
+          </p:cNvPr>
+          <p:cNvSpPr/>
+          <p:nvPr/>
+        </p:nvSpPr>
+        <p:spPr>
+          <a:xfrm>
+            <a:off x="3009900" y="2514600"/>
+            <a:ext cx="1600200" cy="342900"/>
+          </a:xfrm>
+          <a:prstGeom prst="rect">
+            <a:avLst/>
+          </a:prstGeom>
+          <a:solidFill>
+            <a:schemeClr val="accent5"/>
+          </a:solidFill>
+        </p:spPr>
+        <p:style>
+          <a:lnRef idx="2">
+            <a:schemeClr val="accent1">
+              <a:shade val="50000"/>
+            </a:schemeClr>
+          </a:lnRef>
+          <a:fillRef idx="1">
+            <a:schemeClr val="accent1"/>
+          </a:fillRef>
+          <a:effectRef idx="0">
+            <a:schemeClr val="accent1"/>
+          </a:effectRef>
+          <a:fontRef idx="minor">
+            <a:schemeClr val="lt1"/>
+          </a:fontRef>
+        </p:style>
+        <p:txBody>
+          <a:bodyPr rtlCol="0" anchor="ctr"/>
+          <a:lstStyle/>
+          <a:p>
+            <a:pPr algn="ctr"/>
+            <a:r>
+              <a:rPr lang="en-US" sz="1200" dirty="0" err="1"/>
+              <a:t>OAuthInput</a:t>
+            </a:r>
+            <a:endParaRPr lang="en-US" sz="1200" dirty="0"/>
+          </a:p>
+        </p:txBody>
+      </p:sp>
+      <p:cxnSp>
+        <p:nvCxnSpPr>
+          <p:cNvPr id="43" name="Connector: Elbow 42">
+            <a:extLst>
+              <a:ext uri="{FF2B5EF4-FFF2-40B4-BE49-F238E27FC236}">
+                <a16:creationId xmlns:a16="http://schemas.microsoft.com/office/drawing/2014/main" id="{E55A8F78-3FA8-4270-85DC-4615D18B1D03}"/>
+              </a:ext>
+            </a:extLst>
+          </p:cNvPr>
+          <p:cNvCxnSpPr>
+            <a:cxnSpLocks/>
+            <a:stCxn id="38" idx="0"/>
+            <a:endCxn id="2" idx="2"/>
+          </p:cNvCxnSpPr>
+          <p:nvPr/>
+        </p:nvCxnSpPr>
+        <p:spPr>
+          <a:xfrm rot="16200000" flipV="1">
+            <a:off x="6438900" y="-1028700"/>
+            <a:ext cx="457200" cy="3657600"/>
+          </a:xfrm>
+          <a:prstGeom prst="bentConnector3">
+            <a:avLst/>
+          </a:prstGeom>
+          <a:ln>
+            <a:tailEnd type="triangle"/>
+          </a:ln>
+        </p:spPr>
+        <p:style>
+          <a:lnRef idx="1">
+            <a:schemeClr val="accent1"/>
+          </a:lnRef>
+          <a:fillRef idx="0">
+            <a:schemeClr val="accent1"/>
+          </a:fillRef>
+          <a:effectRef idx="0">
+            <a:schemeClr val="accent1"/>
+          </a:effectRef>
+          <a:fontRef idx="minor">
+            <a:schemeClr val="tx1"/>
+          </a:fontRef>
+        </p:style>
+      </p:cxnSp>
+      <p:cxnSp>
+        <p:nvCxnSpPr>
+          <p:cNvPr id="45" name="Connector: Elbow 44">
+            <a:extLst>
+              <a:ext uri="{FF2B5EF4-FFF2-40B4-BE49-F238E27FC236}">
+                <a16:creationId xmlns:a16="http://schemas.microsoft.com/office/drawing/2014/main" id="{D12C9844-EF39-4865-B8A7-616E19E21D16}"/>
+              </a:ext>
+            </a:extLst>
+          </p:cNvPr>
+          <p:cNvCxnSpPr>
+            <a:cxnSpLocks/>
+            <a:stCxn id="39" idx="3"/>
+            <a:endCxn id="2" idx="2"/>
+          </p:cNvCxnSpPr>
+          <p:nvPr/>
+        </p:nvCxnSpPr>
+        <p:spPr>
+          <a:xfrm flipV="1">
+            <a:off x="4610100" y="571500"/>
+            <a:ext cx="228600" cy="2114550"/>
+          </a:xfrm>
+          <a:prstGeom prst="bentConnector2">
+            <a:avLst/>
+          </a:prstGeom>
+          <a:ln>
+            <a:tailEnd type="triangle"/>
+          </a:ln>
+        </p:spPr>
+        <p:style>
+          <a:lnRef idx="1">
+            <a:schemeClr val="accent1"/>
+          </a:lnRef>
+          <a:fillRef idx="0">
+            <a:schemeClr val="accent1"/>
+          </a:fillRef>
+          <a:effectRef idx="0">
+            <a:schemeClr val="accent1"/>
+          </a:effectRef>
+          <a:fontRef idx="minor">
+            <a:schemeClr val="tx1"/>
+          </a:fontRef>
+        </p:style>
+      </p:cxnSp>
+      <p:cxnSp>
+        <p:nvCxnSpPr>
+          <p:cNvPr id="47" name="Connector: Elbow 46">
+            <a:extLst>
+              <a:ext uri="{FF2B5EF4-FFF2-40B4-BE49-F238E27FC236}">
+                <a16:creationId xmlns:a16="http://schemas.microsoft.com/office/drawing/2014/main" id="{799FEDC3-2CA9-468B-BD42-DD607666870D}"/>
+              </a:ext>
+            </a:extLst>
+          </p:cNvPr>
+          <p:cNvCxnSpPr>
+            <a:cxnSpLocks/>
+            <a:stCxn id="37" idx="1"/>
+            <a:endCxn id="31" idx="1"/>
+          </p:cNvCxnSpPr>
+          <p:nvPr/>
+        </p:nvCxnSpPr>
+        <p:spPr>
+          <a:xfrm rot="10800000">
+            <a:off x="5638800" y="1200150"/>
+            <a:ext cx="12700" cy="1257300"/>
+          </a:xfrm>
+          <a:prstGeom prst="bentConnector3">
+            <a:avLst>
+              <a:gd name="adj1" fmla="val 1800000"/>
+            </a:avLst>
+          </a:prstGeom>
+          <a:ln>
+            <a:tailEnd type="triangle"/>
+          </a:ln>
+        </p:spPr>
+        <p:style>
+          <a:lnRef idx="1">
+            <a:schemeClr val="accent1"/>
+          </a:lnRef>
+          <a:fillRef idx="0">
+            <a:schemeClr val="accent1"/>
+          </a:fillRef>
+          <a:effectRef idx="0">
+            <a:schemeClr val="accent1"/>
+          </a:effectRef>
+          <a:fontRef idx="minor">
+            <a:schemeClr val="tx1"/>
+          </a:fontRef>
+        </p:style>
+      </p:cxnSp>
+      <p:cxnSp>
+        <p:nvCxnSpPr>
+          <p:cNvPr id="49" name="Connector: Elbow 48">
+            <a:extLst>
+              <a:ext uri="{FF2B5EF4-FFF2-40B4-BE49-F238E27FC236}">
+                <a16:creationId xmlns:a16="http://schemas.microsoft.com/office/drawing/2014/main" id="{EF57EDE3-2C9D-4C0A-A015-9893F6F6CD39}"/>
+              </a:ext>
+            </a:extLst>
+          </p:cNvPr>
+          <p:cNvCxnSpPr>
+            <a:cxnSpLocks/>
+            <a:stCxn id="36" idx="1"/>
+            <a:endCxn id="31" idx="1"/>
+          </p:cNvCxnSpPr>
+          <p:nvPr/>
+        </p:nvCxnSpPr>
+        <p:spPr>
+          <a:xfrm rot="10800000">
+            <a:off x="5638800" y="1200150"/>
+            <a:ext cx="12700" cy="685800"/>
+          </a:xfrm>
+          <a:prstGeom prst="bentConnector3">
+            <a:avLst>
+              <a:gd name="adj1" fmla="val 1800000"/>
+            </a:avLst>
+          </a:prstGeom>
+          <a:ln>
+            <a:tailEnd type="triangle"/>
+          </a:ln>
+        </p:spPr>
+        <p:style>
+          <a:lnRef idx="1">
+            <a:schemeClr val="accent1"/>
+          </a:lnRef>
+          <a:fillRef idx="0">
+            <a:schemeClr val="accent1"/>
+          </a:fillRef>
+          <a:effectRef idx="0">
+            <a:schemeClr val="accent1"/>
+          </a:effectRef>
+          <a:fontRef idx="minor">
+            <a:schemeClr val="tx1"/>
+          </a:fontRef>
+        </p:style>
+      </p:cxnSp>
+      <p:grpSp>
+        <p:nvGrpSpPr>
+          <p:cNvPr id="171" name="Group 170">
+            <a:extLst>
+              <a:ext uri="{FF2B5EF4-FFF2-40B4-BE49-F238E27FC236}">
+                <a16:creationId xmlns:a16="http://schemas.microsoft.com/office/drawing/2014/main" id="{BB332EE0-44E5-4CE5-AB2A-ACF54D794DA8}"/>
+              </a:ext>
+            </a:extLst>
+          </p:cNvPr>
+          <p:cNvGrpSpPr/>
+          <p:nvPr/>
+        </p:nvGrpSpPr>
+        <p:grpSpPr>
+          <a:xfrm>
+            <a:off x="7696200" y="1485900"/>
+            <a:ext cx="1600200" cy="1371600"/>
+            <a:chOff x="8039100" y="1485900"/>
+            <a:chExt cx="1600200" cy="1371600"/>
+          </a:xfrm>
+        </p:grpSpPr>
+        <p:sp>
+          <p:nvSpPr>
+            <p:cNvPr id="51" name="Rectangle 50">
+              <a:extLst>
+                <a:ext uri="{FF2B5EF4-FFF2-40B4-BE49-F238E27FC236}">
+                  <a16:creationId xmlns:a16="http://schemas.microsoft.com/office/drawing/2014/main" id="{669A4F61-C957-4E3A-8E58-D10B95095044}"/>
+                </a:ext>
+              </a:extLst>
+            </p:cNvPr>
+            <p:cNvSpPr/>
+            <p:nvPr/>
+          </p:nvSpPr>
+          <p:spPr>
+            <a:xfrm>
+              <a:off x="8039100" y="1485900"/>
+              <a:ext cx="1600200" cy="228600"/>
+            </a:xfrm>
+            <a:prstGeom prst="rect">
+              <a:avLst/>
+            </a:prstGeom>
+            <a:solidFill>
+              <a:schemeClr val="accent5"/>
+            </a:solidFill>
+          </p:spPr>
+          <p:style>
+            <a:lnRef idx="2">
+              <a:schemeClr val="accent1">
+                <a:shade val="50000"/>
+              </a:schemeClr>
+            </a:lnRef>
+            <a:fillRef idx="1">
+              <a:schemeClr val="accent1"/>
+            </a:fillRef>
+            <a:effectRef idx="0">
+              <a:schemeClr val="accent1"/>
+            </a:effectRef>
+            <a:fontRef idx="minor">
+              <a:schemeClr val="lt1"/>
+            </a:fontRef>
+          </p:style>
+          <p:txBody>
+            <a:bodyPr rtlCol="0" anchor="ctr"/>
+            <a:lstStyle/>
+            <a:p>
+              <a:pPr algn="ctr"/>
+              <a:r>
+                <a:rPr lang="en-US" sz="1200" dirty="0" err="1"/>
+                <a:t>AttachmentInput</a:t>
+              </a:r>
+              <a:endParaRPr lang="en-US" sz="1200" dirty="0"/>
+            </a:p>
+          </p:txBody>
+        </p:sp>
+        <p:sp>
+          <p:nvSpPr>
+            <p:cNvPr id="52" name="Rectangle 51">
+              <a:extLst>
+                <a:ext uri="{FF2B5EF4-FFF2-40B4-BE49-F238E27FC236}">
+                  <a16:creationId xmlns:a16="http://schemas.microsoft.com/office/drawing/2014/main" id="{211AF8C9-62BC-49A8-B2EC-6AB0120540E6}"/>
+                </a:ext>
+              </a:extLst>
+            </p:cNvPr>
+            <p:cNvSpPr/>
+            <p:nvPr/>
+          </p:nvSpPr>
+          <p:spPr>
+            <a:xfrm>
+              <a:off x="8039100" y="1714500"/>
+              <a:ext cx="1600200" cy="228600"/>
+            </a:xfrm>
+            <a:prstGeom prst="rect">
+              <a:avLst/>
+            </a:prstGeom>
+            <a:solidFill>
+              <a:schemeClr val="accent5"/>
+            </a:solidFill>
+          </p:spPr>
+          <p:style>
+            <a:lnRef idx="2">
+              <a:schemeClr val="accent1">
+                <a:shade val="50000"/>
+              </a:schemeClr>
+            </a:lnRef>
+            <a:fillRef idx="1">
+              <a:schemeClr val="accent1"/>
+            </a:fillRef>
+            <a:effectRef idx="0">
+              <a:schemeClr val="accent1"/>
+            </a:effectRef>
+            <a:fontRef idx="minor">
+              <a:schemeClr val="lt1"/>
+            </a:fontRef>
+          </p:style>
+          <p:txBody>
+            <a:bodyPr rtlCol="0" anchor="ctr"/>
+            <a:lstStyle/>
+            <a:p>
+              <a:pPr algn="ctr"/>
+              <a:r>
+                <a:rPr lang="en-US" sz="1200" dirty="0" err="1"/>
+                <a:t>ChoiceInput</a:t>
+              </a:r>
+              <a:endParaRPr lang="en-US" sz="1200" dirty="0"/>
+            </a:p>
+          </p:txBody>
+        </p:sp>
+        <p:sp>
+          <p:nvSpPr>
+            <p:cNvPr id="53" name="Rectangle 52">
+              <a:extLst>
+                <a:ext uri="{FF2B5EF4-FFF2-40B4-BE49-F238E27FC236}">
+                  <a16:creationId xmlns:a16="http://schemas.microsoft.com/office/drawing/2014/main" id="{A7C8380B-0E65-476F-A24B-EF49E746D765}"/>
+                </a:ext>
+              </a:extLst>
+            </p:cNvPr>
+            <p:cNvSpPr/>
+            <p:nvPr/>
+          </p:nvSpPr>
+          <p:spPr>
+            <a:xfrm>
+              <a:off x="8039100" y="1943100"/>
+              <a:ext cx="1600200" cy="228600"/>
+            </a:xfrm>
+            <a:prstGeom prst="rect">
+              <a:avLst/>
+            </a:prstGeom>
+            <a:solidFill>
+              <a:schemeClr val="accent5"/>
+            </a:solidFill>
+          </p:spPr>
+          <p:style>
+            <a:lnRef idx="2">
+              <a:schemeClr val="accent1">
+                <a:shade val="50000"/>
+              </a:schemeClr>
+            </a:lnRef>
+            <a:fillRef idx="1">
+              <a:schemeClr val="accent1"/>
+            </a:fillRef>
+            <a:effectRef idx="0">
+              <a:schemeClr val="accent1"/>
+            </a:effectRef>
+            <a:fontRef idx="minor">
+              <a:schemeClr val="lt1"/>
+            </a:fontRef>
+          </p:style>
+          <p:txBody>
+            <a:bodyPr rtlCol="0" anchor="ctr"/>
+            <a:lstStyle/>
+            <a:p>
+              <a:pPr algn="ctr"/>
+              <a:r>
+                <a:rPr lang="en-US" sz="1200" dirty="0" err="1"/>
+                <a:t>ConfirmInput</a:t>
+              </a:r>
+              <a:endParaRPr lang="en-US" sz="1200" dirty="0"/>
+            </a:p>
+          </p:txBody>
+        </p:sp>
+        <p:sp>
+          <p:nvSpPr>
+            <p:cNvPr id="54" name="Rectangle 53">
+              <a:extLst>
+                <a:ext uri="{FF2B5EF4-FFF2-40B4-BE49-F238E27FC236}">
+                  <a16:creationId xmlns:a16="http://schemas.microsoft.com/office/drawing/2014/main" id="{92405AC3-F7E2-4216-8CF4-0E614F4091D3}"/>
+                </a:ext>
+              </a:extLst>
+            </p:cNvPr>
+            <p:cNvSpPr/>
+            <p:nvPr/>
+          </p:nvSpPr>
+          <p:spPr>
+            <a:xfrm>
+              <a:off x="8039100" y="2171700"/>
+              <a:ext cx="1600200" cy="228600"/>
+            </a:xfrm>
+            <a:prstGeom prst="rect">
+              <a:avLst/>
+            </a:prstGeom>
+            <a:solidFill>
+              <a:schemeClr val="accent5"/>
+            </a:solidFill>
+          </p:spPr>
+          <p:style>
+            <a:lnRef idx="2">
+              <a:schemeClr val="accent1">
+                <a:shade val="50000"/>
+              </a:schemeClr>
+            </a:lnRef>
+            <a:fillRef idx="1">
+              <a:schemeClr val="accent1"/>
+            </a:fillRef>
+            <a:effectRef idx="0">
+              <a:schemeClr val="accent1"/>
+            </a:effectRef>
+            <a:fontRef idx="minor">
+              <a:schemeClr val="lt1"/>
+            </a:fontRef>
+          </p:style>
+          <p:txBody>
+            <a:bodyPr rtlCol="0" anchor="ctr"/>
+            <a:lstStyle/>
+            <a:p>
+              <a:pPr algn="ctr"/>
+              <a:r>
+                <a:rPr lang="en-US" sz="1200" dirty="0" err="1"/>
+                <a:t>DateTimeInput</a:t>
+              </a:r>
+              <a:endParaRPr lang="en-US" sz="1200" dirty="0"/>
+            </a:p>
+          </p:txBody>
+        </p:sp>
+        <p:sp>
+          <p:nvSpPr>
+            <p:cNvPr id="55" name="Rectangle 54">
+              <a:extLst>
+                <a:ext uri="{FF2B5EF4-FFF2-40B4-BE49-F238E27FC236}">
+                  <a16:creationId xmlns:a16="http://schemas.microsoft.com/office/drawing/2014/main" id="{AEF25626-E3B8-4A4C-B557-CD3335EF36C0}"/>
+                </a:ext>
+              </a:extLst>
+            </p:cNvPr>
+            <p:cNvSpPr/>
+            <p:nvPr/>
+          </p:nvSpPr>
+          <p:spPr>
+            <a:xfrm>
+              <a:off x="8039100" y="2400300"/>
+              <a:ext cx="1600200" cy="228600"/>
+            </a:xfrm>
+            <a:prstGeom prst="rect">
+              <a:avLst/>
+            </a:prstGeom>
+            <a:solidFill>
+              <a:schemeClr val="accent5"/>
+            </a:solidFill>
+          </p:spPr>
+          <p:style>
+            <a:lnRef idx="2">
+              <a:schemeClr val="accent1">
+                <a:shade val="50000"/>
+              </a:schemeClr>
+            </a:lnRef>
+            <a:fillRef idx="1">
+              <a:schemeClr val="accent1"/>
+            </a:fillRef>
+            <a:effectRef idx="0">
+              <a:schemeClr val="accent1"/>
+            </a:effectRef>
+            <a:fontRef idx="minor">
+              <a:schemeClr val="lt1"/>
+            </a:fontRef>
+          </p:style>
+          <p:txBody>
+            <a:bodyPr rtlCol="0" anchor="ctr"/>
+            <a:lstStyle/>
+            <a:p>
+              <a:pPr algn="ctr"/>
+              <a:r>
+                <a:rPr lang="en-US" sz="1200" dirty="0" err="1"/>
+                <a:t>NumberInput</a:t>
+              </a:r>
+              <a:endParaRPr lang="en-US" sz="1200" dirty="0"/>
+            </a:p>
+          </p:txBody>
+        </p:sp>
+        <p:sp>
+          <p:nvSpPr>
+            <p:cNvPr id="56" name="Rectangle 55">
+              <a:extLst>
+                <a:ext uri="{FF2B5EF4-FFF2-40B4-BE49-F238E27FC236}">
+                  <a16:creationId xmlns:a16="http://schemas.microsoft.com/office/drawing/2014/main" id="{02E1084C-A6D1-4675-90D2-6D3A7D76D4C0}"/>
+                </a:ext>
+              </a:extLst>
+            </p:cNvPr>
+            <p:cNvSpPr/>
+            <p:nvPr/>
+          </p:nvSpPr>
+          <p:spPr>
+            <a:xfrm>
+              <a:off x="8039100" y="2628900"/>
+              <a:ext cx="1600200" cy="228600"/>
+            </a:xfrm>
+            <a:prstGeom prst="rect">
+              <a:avLst/>
+            </a:prstGeom>
+            <a:solidFill>
+              <a:schemeClr val="accent5"/>
+            </a:solidFill>
+          </p:spPr>
+          <p:style>
+            <a:lnRef idx="2">
+              <a:schemeClr val="accent1">
+                <a:shade val="50000"/>
+              </a:schemeClr>
+            </a:lnRef>
+            <a:fillRef idx="1">
+              <a:schemeClr val="accent1"/>
+            </a:fillRef>
+            <a:effectRef idx="0">
+              <a:schemeClr val="accent1"/>
+            </a:effectRef>
+            <a:fontRef idx="minor">
+              <a:schemeClr val="lt1"/>
+            </a:fontRef>
+          </p:style>
+          <p:txBody>
+            <a:bodyPr rtlCol="0" anchor="ctr"/>
+            <a:lstStyle/>
+            <a:p>
+              <a:pPr algn="ctr"/>
+              <a:r>
+                <a:rPr lang="en-US" sz="1200" dirty="0" err="1"/>
+                <a:t>TextInput</a:t>
+              </a:r>
+              <a:endParaRPr lang="en-US" sz="1200" dirty="0"/>
+            </a:p>
+          </p:txBody>
+        </p:sp>
+      </p:grpSp>
+      <p:cxnSp>
+        <p:nvCxnSpPr>
+          <p:cNvPr id="58" name="Connector: Elbow 57">
+            <a:extLst>
+              <a:ext uri="{FF2B5EF4-FFF2-40B4-BE49-F238E27FC236}">
+                <a16:creationId xmlns:a16="http://schemas.microsoft.com/office/drawing/2014/main" id="{E1DDD822-0F34-4B54-B3F3-66E85B6EBCEF}"/>
+              </a:ext>
+            </a:extLst>
+          </p:cNvPr>
+          <p:cNvCxnSpPr>
+            <a:cxnSpLocks/>
+            <a:stCxn id="51" idx="1"/>
+            <a:endCxn id="38" idx="1"/>
+          </p:cNvCxnSpPr>
+          <p:nvPr/>
+        </p:nvCxnSpPr>
+        <p:spPr>
+          <a:xfrm rot="10800000">
+            <a:off x="7696200" y="1200150"/>
+            <a:ext cx="12700" cy="400050"/>
+          </a:xfrm>
+          <a:prstGeom prst="bentConnector3">
+            <a:avLst>
+              <a:gd name="adj1" fmla="val 1800000"/>
+            </a:avLst>
+          </a:prstGeom>
+          <a:ln>
+            <a:tailEnd type="triangle"/>
+          </a:ln>
+        </p:spPr>
+        <p:style>
+          <a:lnRef idx="1">
+            <a:schemeClr val="accent1"/>
+          </a:lnRef>
+          <a:fillRef idx="0">
+            <a:schemeClr val="accent1"/>
+          </a:fillRef>
+          <a:effectRef idx="0">
+            <a:schemeClr val="accent1"/>
+          </a:effectRef>
+          <a:fontRef idx="minor">
+            <a:schemeClr val="tx1"/>
+          </a:fontRef>
+        </p:style>
+      </p:cxnSp>
+      <p:sp>
+        <p:nvSpPr>
+          <p:cNvPr id="74" name="Rectangle 73">
+            <a:extLst>
+              <a:ext uri="{FF2B5EF4-FFF2-40B4-BE49-F238E27FC236}">
+                <a16:creationId xmlns:a16="http://schemas.microsoft.com/office/drawing/2014/main" id="{22F1E850-FFD6-452F-B1C3-505AB8B723D9}"/>
+              </a:ext>
+            </a:extLst>
+          </p:cNvPr>
+          <p:cNvSpPr/>
+          <p:nvPr/>
+        </p:nvSpPr>
+        <p:spPr>
+          <a:xfrm>
+            <a:off x="9867900" y="1028700"/>
+            <a:ext cx="1600200" cy="228600"/>
+          </a:xfrm>
+          <a:prstGeom prst="rect">
+            <a:avLst/>
+          </a:prstGeom>
+          <a:solidFill>
+            <a:schemeClr val="accent5"/>
+          </a:solidFill>
+        </p:spPr>
+        <p:style>
+          <a:lnRef idx="2">
+            <a:schemeClr val="accent1">
+              <a:shade val="50000"/>
+            </a:schemeClr>
+          </a:lnRef>
+          <a:fillRef idx="1">
+            <a:schemeClr val="accent1"/>
+          </a:fillRef>
+          <a:effectRef idx="0">
+            <a:schemeClr val="accent1"/>
+          </a:effectRef>
+          <a:fontRef idx="minor">
+            <a:schemeClr val="lt1"/>
+          </a:fontRef>
+        </p:style>
+        <p:txBody>
+          <a:bodyPr rtlCol="0" anchor="ctr"/>
+          <a:lstStyle/>
+          <a:p>
+            <a:pPr algn="ctr"/>
+            <a:r>
+              <a:rPr lang="en-US" sz="1200" i="1" dirty="0" err="1"/>
+              <a:t>BaseInvokeDialog</a:t>
+            </a:r>
+            <a:endParaRPr lang="en-US" sz="1200" i="1" dirty="0"/>
+          </a:p>
+        </p:txBody>
+      </p:sp>
+      <p:cxnSp>
+        <p:nvCxnSpPr>
+          <p:cNvPr id="76" name="Connector: Elbow 75">
+            <a:extLst>
+              <a:ext uri="{FF2B5EF4-FFF2-40B4-BE49-F238E27FC236}">
+                <a16:creationId xmlns:a16="http://schemas.microsoft.com/office/drawing/2014/main" id="{5FACCD61-614E-452E-94DE-FB557FC73C69}"/>
+              </a:ext>
+            </a:extLst>
+          </p:cNvPr>
+          <p:cNvCxnSpPr>
+            <a:cxnSpLocks/>
+            <a:stCxn id="74" idx="0"/>
+            <a:endCxn id="2" idx="2"/>
+          </p:cNvCxnSpPr>
+          <p:nvPr/>
+        </p:nvCxnSpPr>
+        <p:spPr>
+          <a:xfrm rot="16200000" flipV="1">
+            <a:off x="7524750" y="-2114550"/>
+            <a:ext cx="457200" cy="5829300"/>
+          </a:xfrm>
+          <a:prstGeom prst="bentConnector3">
+            <a:avLst/>
+          </a:prstGeom>
+          <a:ln>
+            <a:tailEnd type="triangle"/>
+          </a:ln>
+        </p:spPr>
+        <p:style>
+          <a:lnRef idx="1">
+            <a:schemeClr val="accent1"/>
+          </a:lnRef>
+          <a:fillRef idx="0">
+            <a:schemeClr val="accent1"/>
+          </a:fillRef>
+          <a:effectRef idx="0">
+            <a:schemeClr val="accent1"/>
+          </a:effectRef>
+          <a:fontRef idx="minor">
+            <a:schemeClr val="tx1"/>
+          </a:fontRef>
+        </p:style>
+      </p:cxnSp>
+      <p:cxnSp>
+        <p:nvCxnSpPr>
+          <p:cNvPr id="80" name="Connector: Elbow 79">
+            <a:extLst>
+              <a:ext uri="{FF2B5EF4-FFF2-40B4-BE49-F238E27FC236}">
+                <a16:creationId xmlns:a16="http://schemas.microsoft.com/office/drawing/2014/main" id="{C9D77B8B-7AD7-495F-8B2A-4FD219A55513}"/>
+              </a:ext>
+            </a:extLst>
+          </p:cNvPr>
+          <p:cNvCxnSpPr>
+            <a:cxnSpLocks/>
+            <a:stCxn id="77" idx="1"/>
+            <a:endCxn id="74" idx="1"/>
+          </p:cNvCxnSpPr>
+          <p:nvPr/>
+        </p:nvCxnSpPr>
+        <p:spPr>
+          <a:xfrm rot="10800000">
+            <a:off x="9867900" y="1143000"/>
+            <a:ext cx="12700" cy="342900"/>
+          </a:xfrm>
+          <a:prstGeom prst="bentConnector3">
+            <a:avLst>
+              <a:gd name="adj1" fmla="val 1800000"/>
+            </a:avLst>
+          </a:prstGeom>
+          <a:ln>
+            <a:tailEnd type="triangle"/>
+          </a:ln>
+        </p:spPr>
+        <p:style>
+          <a:lnRef idx="1">
+            <a:schemeClr val="accent1"/>
+          </a:lnRef>
+          <a:fillRef idx="0">
+            <a:schemeClr val="accent1"/>
+          </a:fillRef>
+          <a:effectRef idx="0">
+            <a:schemeClr val="accent1"/>
+          </a:effectRef>
+          <a:fontRef idx="minor">
+            <a:schemeClr val="tx1"/>
+          </a:fontRef>
+        </p:style>
+      </p:cxnSp>
+      <p:cxnSp>
+        <p:nvCxnSpPr>
+          <p:cNvPr id="90" name="Connector: Elbow 89">
+            <a:extLst>
+              <a:ext uri="{FF2B5EF4-FFF2-40B4-BE49-F238E27FC236}">
+                <a16:creationId xmlns:a16="http://schemas.microsoft.com/office/drawing/2014/main" id="{4D59EB4F-95F5-4B1F-9E0A-0E85635490FE}"/>
+              </a:ext>
+            </a:extLst>
+          </p:cNvPr>
+          <p:cNvCxnSpPr>
+            <a:cxnSpLocks/>
+            <a:stCxn id="81" idx="3"/>
+            <a:endCxn id="2" idx="3"/>
+          </p:cNvCxnSpPr>
+          <p:nvPr/>
+        </p:nvCxnSpPr>
+        <p:spPr>
+          <a:xfrm flipH="1" flipV="1">
+            <a:off x="5638800" y="400050"/>
+            <a:ext cx="5829300" cy="1657350"/>
+          </a:xfrm>
+          <a:prstGeom prst="bentConnector3">
+            <a:avLst>
+              <a:gd name="adj1" fmla="val -3922"/>
+            </a:avLst>
+          </a:prstGeom>
+          <a:ln>
+            <a:tailEnd type="triangle"/>
+          </a:ln>
+        </p:spPr>
+        <p:style>
+          <a:lnRef idx="1">
+            <a:schemeClr val="accent1"/>
+          </a:lnRef>
+          <a:fillRef idx="0">
+            <a:schemeClr val="accent1"/>
+          </a:fillRef>
+          <a:effectRef idx="0">
+            <a:schemeClr val="accent1"/>
+          </a:effectRef>
+          <a:fontRef idx="minor">
+            <a:schemeClr val="tx1"/>
+          </a:fontRef>
+        </p:style>
+      </p:cxnSp>
+      <p:grpSp>
+        <p:nvGrpSpPr>
+          <p:cNvPr id="170" name="Group 169">
+            <a:extLst>
+              <a:ext uri="{FF2B5EF4-FFF2-40B4-BE49-F238E27FC236}">
+                <a16:creationId xmlns:a16="http://schemas.microsoft.com/office/drawing/2014/main" id="{65A22A66-8565-4EAC-8A04-064E8294A02E}"/>
+              </a:ext>
+            </a:extLst>
+          </p:cNvPr>
+          <p:cNvGrpSpPr/>
+          <p:nvPr/>
+        </p:nvGrpSpPr>
+        <p:grpSpPr>
+          <a:xfrm>
+            <a:off x="9867900" y="1371600"/>
+            <a:ext cx="1600200" cy="457200"/>
+            <a:chOff x="10096500" y="1371600"/>
+            <a:chExt cx="1600200" cy="457200"/>
+          </a:xfrm>
+        </p:grpSpPr>
+        <p:sp>
+          <p:nvSpPr>
+            <p:cNvPr id="77" name="Rectangle 76">
+              <a:extLst>
+                <a:ext uri="{FF2B5EF4-FFF2-40B4-BE49-F238E27FC236}">
+                  <a16:creationId xmlns:a16="http://schemas.microsoft.com/office/drawing/2014/main" id="{C166C85A-BEAF-49FA-A673-7FF2930AE04E}"/>
+                </a:ext>
+              </a:extLst>
+            </p:cNvPr>
+            <p:cNvSpPr/>
+            <p:nvPr/>
+          </p:nvSpPr>
+          <p:spPr>
+            <a:xfrm>
+              <a:off x="10096500" y="1371600"/>
+              <a:ext cx="1600200" cy="228600"/>
+            </a:xfrm>
+            <a:prstGeom prst="rect">
+              <a:avLst/>
+            </a:prstGeom>
+            <a:solidFill>
+              <a:schemeClr val="accent5"/>
+            </a:solidFill>
+          </p:spPr>
+          <p:style>
+            <a:lnRef idx="2">
+              <a:schemeClr val="accent1">
+                <a:shade val="50000"/>
+              </a:schemeClr>
+            </a:lnRef>
+            <a:fillRef idx="1">
+              <a:schemeClr val="accent1"/>
+            </a:fillRef>
+            <a:effectRef idx="0">
+              <a:schemeClr val="accent1"/>
+            </a:effectRef>
+            <a:fontRef idx="minor">
+              <a:schemeClr val="lt1"/>
+            </a:fontRef>
+          </p:style>
+          <p:txBody>
+            <a:bodyPr rtlCol="0" anchor="ctr"/>
+            <a:lstStyle/>
+            <a:p>
+              <a:pPr algn="ctr"/>
+              <a:r>
+                <a:rPr lang="en-US" sz="1200" dirty="0" err="1"/>
+                <a:t>BeginDialog</a:t>
+              </a:r>
+              <a:endParaRPr lang="en-US" sz="1200" dirty="0"/>
+            </a:p>
+          </p:txBody>
+        </p:sp>
+        <p:sp>
+          <p:nvSpPr>
+            <p:cNvPr id="114" name="Rectangle 113">
+              <a:extLst>
+                <a:ext uri="{FF2B5EF4-FFF2-40B4-BE49-F238E27FC236}">
+                  <a16:creationId xmlns:a16="http://schemas.microsoft.com/office/drawing/2014/main" id="{22712A93-B115-4890-B025-6317EE86F79E}"/>
+                </a:ext>
+              </a:extLst>
+            </p:cNvPr>
+            <p:cNvSpPr/>
+            <p:nvPr/>
+          </p:nvSpPr>
+          <p:spPr>
+            <a:xfrm>
+              <a:off x="10096500" y="1600200"/>
+              <a:ext cx="1600200" cy="228600"/>
+            </a:xfrm>
+            <a:prstGeom prst="rect">
+              <a:avLst/>
+            </a:prstGeom>
+            <a:solidFill>
+              <a:schemeClr val="accent5"/>
+            </a:solidFill>
+          </p:spPr>
+          <p:style>
+            <a:lnRef idx="2">
+              <a:schemeClr val="accent1">
+                <a:shade val="50000"/>
+              </a:schemeClr>
+            </a:lnRef>
+            <a:fillRef idx="1">
+              <a:schemeClr val="accent1"/>
+            </a:fillRef>
+            <a:effectRef idx="0">
+              <a:schemeClr val="accent1"/>
+            </a:effectRef>
+            <a:fontRef idx="minor">
+              <a:schemeClr val="lt1"/>
+            </a:fontRef>
+          </p:style>
+          <p:txBody>
+            <a:bodyPr rtlCol="0" anchor="ctr"/>
+            <a:lstStyle/>
+            <a:p>
+              <a:pPr algn="ctr"/>
+              <a:r>
+                <a:rPr lang="en-US" sz="1200" dirty="0" err="1"/>
+                <a:t>ReplaceDialog</a:t>
+              </a:r>
+              <a:endParaRPr lang="en-US" sz="1200" dirty="0"/>
+            </a:p>
+          </p:txBody>
+        </p:sp>
+      </p:grpSp>
+      <p:grpSp>
+        <p:nvGrpSpPr>
+          <p:cNvPr id="169" name="Group 168">
+            <a:extLst>
+              <a:ext uri="{FF2B5EF4-FFF2-40B4-BE49-F238E27FC236}">
+                <a16:creationId xmlns:a16="http://schemas.microsoft.com/office/drawing/2014/main" id="{E8B09F2E-7394-4C6B-96B4-57605AF3DE83}"/>
+              </a:ext>
+            </a:extLst>
+          </p:cNvPr>
+          <p:cNvGrpSpPr/>
+          <p:nvPr/>
+        </p:nvGrpSpPr>
+        <p:grpSpPr>
+          <a:xfrm>
+            <a:off x="9867900" y="1943100"/>
+            <a:ext cx="1600200" cy="4572000"/>
+            <a:chOff x="10096500" y="1943100"/>
+            <a:chExt cx="1600200" cy="4572000"/>
+          </a:xfrm>
+        </p:grpSpPr>
+        <p:sp>
+          <p:nvSpPr>
+            <p:cNvPr id="81" name="Rectangle 80">
+              <a:extLst>
+                <a:ext uri="{FF2B5EF4-FFF2-40B4-BE49-F238E27FC236}">
+                  <a16:creationId xmlns:a16="http://schemas.microsoft.com/office/drawing/2014/main" id="{2E4CE3C2-873D-4982-808A-B845C17522E4}"/>
+                </a:ext>
+              </a:extLst>
+            </p:cNvPr>
+            <p:cNvSpPr/>
+            <p:nvPr/>
+          </p:nvSpPr>
+          <p:spPr>
+            <a:xfrm>
+              <a:off x="10096500" y="1943100"/>
+              <a:ext cx="1600200" cy="228600"/>
+            </a:xfrm>
+            <a:prstGeom prst="rect">
+              <a:avLst/>
+            </a:prstGeom>
+            <a:solidFill>
+              <a:schemeClr val="accent5"/>
+            </a:solidFill>
+          </p:spPr>
+          <p:style>
+            <a:lnRef idx="2">
+              <a:schemeClr val="accent1">
+                <a:shade val="50000"/>
+              </a:schemeClr>
+            </a:lnRef>
+            <a:fillRef idx="1">
+              <a:schemeClr val="accent1"/>
+            </a:fillRef>
+            <a:effectRef idx="0">
+              <a:schemeClr val="accent1"/>
+            </a:effectRef>
+            <a:fontRef idx="minor">
+              <a:schemeClr val="lt1"/>
+            </a:fontRef>
+          </p:style>
+          <p:txBody>
+            <a:bodyPr rtlCol="0" anchor="ctr"/>
+            <a:lstStyle/>
+            <a:p>
+              <a:pPr algn="ctr"/>
+              <a:r>
+                <a:rPr lang="en-US" sz="1200" dirty="0" err="1"/>
+                <a:t>CancelAllDialogs</a:t>
+              </a:r>
+              <a:endParaRPr lang="en-US" sz="1200" dirty="0"/>
+            </a:p>
+          </p:txBody>
+        </p:sp>
+        <p:sp>
+          <p:nvSpPr>
+            <p:cNvPr id="82" name="Rectangle 81">
+              <a:extLst>
+                <a:ext uri="{FF2B5EF4-FFF2-40B4-BE49-F238E27FC236}">
+                  <a16:creationId xmlns:a16="http://schemas.microsoft.com/office/drawing/2014/main" id="{96F987CC-3E43-4FA1-B126-4C8352DDB56C}"/>
+                </a:ext>
+              </a:extLst>
+            </p:cNvPr>
+            <p:cNvSpPr/>
+            <p:nvPr/>
+          </p:nvSpPr>
+          <p:spPr>
+            <a:xfrm>
+              <a:off x="10096500" y="2171700"/>
+              <a:ext cx="1600200" cy="228600"/>
+            </a:xfrm>
+            <a:prstGeom prst="rect">
+              <a:avLst/>
+            </a:prstGeom>
+            <a:solidFill>
+              <a:schemeClr val="accent5"/>
+            </a:solidFill>
+          </p:spPr>
+          <p:style>
+            <a:lnRef idx="2">
+              <a:schemeClr val="accent1">
+                <a:shade val="50000"/>
+              </a:schemeClr>
+            </a:lnRef>
+            <a:fillRef idx="1">
+              <a:schemeClr val="accent1"/>
+            </a:fillRef>
+            <a:effectRef idx="0">
+              <a:schemeClr val="accent1"/>
+            </a:effectRef>
+            <a:fontRef idx="minor">
+              <a:schemeClr val="lt1"/>
+            </a:fontRef>
+          </p:style>
+          <p:txBody>
+            <a:bodyPr rtlCol="0" anchor="ctr"/>
+            <a:lstStyle/>
+            <a:p>
+              <a:pPr algn="ctr"/>
+              <a:r>
+                <a:rPr lang="en-US" sz="1200" dirty="0" err="1"/>
+                <a:t>CodeAction</a:t>
+              </a:r>
+              <a:endParaRPr lang="en-US" sz="1200" dirty="0"/>
+            </a:p>
+          </p:txBody>
+        </p:sp>
+        <p:sp>
+          <p:nvSpPr>
+            <p:cNvPr id="83" name="Rectangle 82">
+              <a:extLst>
+                <a:ext uri="{FF2B5EF4-FFF2-40B4-BE49-F238E27FC236}">
+                  <a16:creationId xmlns:a16="http://schemas.microsoft.com/office/drawing/2014/main" id="{F3A3C692-8892-429D-AE99-DCAC94605614}"/>
+                </a:ext>
+              </a:extLst>
+            </p:cNvPr>
+            <p:cNvSpPr/>
+            <p:nvPr/>
+          </p:nvSpPr>
+          <p:spPr>
+            <a:xfrm>
+              <a:off x="10096500" y="2400300"/>
+              <a:ext cx="1600200" cy="228600"/>
+            </a:xfrm>
+            <a:prstGeom prst="rect">
+              <a:avLst/>
+            </a:prstGeom>
+            <a:solidFill>
+              <a:schemeClr val="accent5"/>
+            </a:solidFill>
+          </p:spPr>
+          <p:style>
+            <a:lnRef idx="2">
+              <a:schemeClr val="accent1">
+                <a:shade val="50000"/>
+              </a:schemeClr>
+            </a:lnRef>
+            <a:fillRef idx="1">
+              <a:schemeClr val="accent1"/>
+            </a:fillRef>
+            <a:effectRef idx="0">
+              <a:schemeClr val="accent1"/>
+            </a:effectRef>
+            <a:fontRef idx="minor">
+              <a:schemeClr val="lt1"/>
+            </a:fontRef>
+          </p:style>
+          <p:txBody>
+            <a:bodyPr rtlCol="0" anchor="ctr"/>
+            <a:lstStyle/>
+            <a:p>
+              <a:pPr algn="ctr"/>
+              <a:r>
+                <a:rPr lang="en-US" sz="1200" dirty="0" err="1"/>
+                <a:t>DebugBreak</a:t>
+              </a:r>
+              <a:endParaRPr lang="en-US" sz="1200" dirty="0"/>
+            </a:p>
+          </p:txBody>
+        </p:sp>
+        <p:sp>
+          <p:nvSpPr>
+            <p:cNvPr id="84" name="Rectangle 83">
+              <a:extLst>
+                <a:ext uri="{FF2B5EF4-FFF2-40B4-BE49-F238E27FC236}">
+                  <a16:creationId xmlns:a16="http://schemas.microsoft.com/office/drawing/2014/main" id="{F5B72F66-2F41-4029-AED4-A589CB14C478}"/>
+                </a:ext>
+              </a:extLst>
+            </p:cNvPr>
+            <p:cNvSpPr/>
+            <p:nvPr/>
+          </p:nvSpPr>
+          <p:spPr>
+            <a:xfrm>
+              <a:off x="10096500" y="2628900"/>
+              <a:ext cx="1600200" cy="228600"/>
+            </a:xfrm>
+            <a:prstGeom prst="rect">
+              <a:avLst/>
+            </a:prstGeom>
+            <a:solidFill>
+              <a:schemeClr val="accent5"/>
+            </a:solidFill>
+          </p:spPr>
+          <p:style>
+            <a:lnRef idx="2">
+              <a:schemeClr val="accent1">
+                <a:shade val="50000"/>
+              </a:schemeClr>
+            </a:lnRef>
+            <a:fillRef idx="1">
+              <a:schemeClr val="accent1"/>
+            </a:fillRef>
+            <a:effectRef idx="0">
+              <a:schemeClr val="accent1"/>
+            </a:effectRef>
+            <a:fontRef idx="minor">
+              <a:schemeClr val="lt1"/>
+            </a:fontRef>
+          </p:style>
+          <p:txBody>
+            <a:bodyPr rtlCol="0" anchor="ctr"/>
+            <a:lstStyle/>
+            <a:p>
+              <a:pPr algn="ctr"/>
+              <a:r>
+                <a:rPr lang="en-US" sz="1200" dirty="0" err="1"/>
+                <a:t>DeleteProperty</a:t>
+              </a:r>
+              <a:endParaRPr lang="en-US" sz="1200" dirty="0"/>
+            </a:p>
+          </p:txBody>
+        </p:sp>
+        <p:sp>
+          <p:nvSpPr>
+            <p:cNvPr id="85" name="Rectangle 84">
+              <a:extLst>
+                <a:ext uri="{FF2B5EF4-FFF2-40B4-BE49-F238E27FC236}">
+                  <a16:creationId xmlns:a16="http://schemas.microsoft.com/office/drawing/2014/main" id="{0BD5D55F-C5E7-4553-BD81-27E1D69ECC38}"/>
+                </a:ext>
+              </a:extLst>
+            </p:cNvPr>
+            <p:cNvSpPr/>
+            <p:nvPr/>
+          </p:nvSpPr>
+          <p:spPr>
+            <a:xfrm>
+              <a:off x="10096500" y="2857500"/>
+              <a:ext cx="1600200" cy="228600"/>
+            </a:xfrm>
+            <a:prstGeom prst="rect">
+              <a:avLst/>
+            </a:prstGeom>
+            <a:solidFill>
+              <a:schemeClr val="accent5"/>
+            </a:solidFill>
+          </p:spPr>
+          <p:style>
+            <a:lnRef idx="2">
+              <a:schemeClr val="accent1">
+                <a:shade val="50000"/>
+              </a:schemeClr>
+            </a:lnRef>
+            <a:fillRef idx="1">
+              <a:schemeClr val="accent1"/>
+            </a:fillRef>
+            <a:effectRef idx="0">
+              <a:schemeClr val="accent1"/>
+            </a:effectRef>
+            <a:fontRef idx="minor">
+              <a:schemeClr val="lt1"/>
+            </a:fontRef>
+          </p:style>
+          <p:txBody>
+            <a:bodyPr rtlCol="0" anchor="ctr"/>
+            <a:lstStyle/>
+            <a:p>
+              <a:pPr algn="ctr"/>
+              <a:r>
+                <a:rPr lang="en-US" sz="1200" dirty="0" err="1"/>
+                <a:t>EditActions</a:t>
+              </a:r>
+              <a:endParaRPr lang="en-US" sz="1200" dirty="0"/>
+            </a:p>
+          </p:txBody>
+        </p:sp>
+        <p:sp>
+          <p:nvSpPr>
+            <p:cNvPr id="99" name="Rectangle 98">
+              <a:extLst>
+                <a:ext uri="{FF2B5EF4-FFF2-40B4-BE49-F238E27FC236}">
+                  <a16:creationId xmlns:a16="http://schemas.microsoft.com/office/drawing/2014/main" id="{90A14FFC-F044-4A2D-8D25-602CDFF1A125}"/>
+                </a:ext>
+              </a:extLst>
+            </p:cNvPr>
+            <p:cNvSpPr/>
+            <p:nvPr/>
+          </p:nvSpPr>
+          <p:spPr>
+            <a:xfrm>
+              <a:off x="10096500" y="3086100"/>
+              <a:ext cx="1600200" cy="228600"/>
+            </a:xfrm>
+            <a:prstGeom prst="rect">
+              <a:avLst/>
+            </a:prstGeom>
+            <a:solidFill>
+              <a:schemeClr val="accent5"/>
+            </a:solidFill>
+          </p:spPr>
+          <p:style>
+            <a:lnRef idx="2">
+              <a:schemeClr val="accent1">
+                <a:shade val="50000"/>
+              </a:schemeClr>
+            </a:lnRef>
+            <a:fillRef idx="1">
+              <a:schemeClr val="accent1"/>
+            </a:fillRef>
+            <a:effectRef idx="0">
+              <a:schemeClr val="accent1"/>
+            </a:effectRef>
+            <a:fontRef idx="minor">
+              <a:schemeClr val="lt1"/>
+            </a:fontRef>
+          </p:style>
+          <p:txBody>
+            <a:bodyPr rtlCol="0" anchor="ctr"/>
+            <a:lstStyle/>
+            <a:p>
+              <a:pPr algn="ctr"/>
+              <a:r>
+                <a:rPr lang="en-US" sz="1200" dirty="0" err="1"/>
+                <a:t>EditArray</a:t>
+              </a:r>
+              <a:endParaRPr lang="en-US" sz="1200" dirty="0"/>
+            </a:p>
+          </p:txBody>
+        </p:sp>
+        <p:sp>
+          <p:nvSpPr>
+            <p:cNvPr id="102" name="Rectangle 101">
+              <a:extLst>
+                <a:ext uri="{FF2B5EF4-FFF2-40B4-BE49-F238E27FC236}">
+                  <a16:creationId xmlns:a16="http://schemas.microsoft.com/office/drawing/2014/main" id="{085A0E81-125D-486F-9D58-B8C5FB1E14D2}"/>
+                </a:ext>
+              </a:extLst>
+            </p:cNvPr>
+            <p:cNvSpPr/>
+            <p:nvPr/>
+          </p:nvSpPr>
+          <p:spPr>
+            <a:xfrm>
+              <a:off x="10096500" y="3314700"/>
+              <a:ext cx="1600200" cy="228600"/>
+            </a:xfrm>
+            <a:prstGeom prst="rect">
+              <a:avLst/>
+            </a:prstGeom>
+            <a:solidFill>
+              <a:schemeClr val="accent5"/>
+            </a:solidFill>
+          </p:spPr>
+          <p:style>
+            <a:lnRef idx="2">
+              <a:schemeClr val="accent1">
+                <a:shade val="50000"/>
+              </a:schemeClr>
+            </a:lnRef>
+            <a:fillRef idx="1">
+              <a:schemeClr val="accent1"/>
+            </a:fillRef>
+            <a:effectRef idx="0">
+              <a:schemeClr val="accent1"/>
+            </a:effectRef>
+            <a:fontRef idx="minor">
+              <a:schemeClr val="lt1"/>
+            </a:fontRef>
+          </p:style>
+          <p:txBody>
+            <a:bodyPr rtlCol="0" anchor="ctr"/>
+            <a:lstStyle/>
+            <a:p>
+              <a:pPr algn="ctr"/>
+              <a:r>
+                <a:rPr lang="en-US" sz="1200" dirty="0" err="1"/>
+                <a:t>EmitEvent</a:t>
+              </a:r>
+              <a:endParaRPr lang="en-US" sz="1200" dirty="0"/>
+            </a:p>
+          </p:txBody>
+        </p:sp>
+        <p:sp>
+          <p:nvSpPr>
+            <p:cNvPr id="103" name="Rectangle 102">
+              <a:extLst>
+                <a:ext uri="{FF2B5EF4-FFF2-40B4-BE49-F238E27FC236}">
+                  <a16:creationId xmlns:a16="http://schemas.microsoft.com/office/drawing/2014/main" id="{1F387030-9BBC-4AAB-9384-97C9EEEBA062}"/>
+                </a:ext>
+              </a:extLst>
+            </p:cNvPr>
+            <p:cNvSpPr/>
+            <p:nvPr/>
+          </p:nvSpPr>
+          <p:spPr>
+            <a:xfrm>
+              <a:off x="10096500" y="3543300"/>
+              <a:ext cx="1600200" cy="228600"/>
+            </a:xfrm>
+            <a:prstGeom prst="rect">
+              <a:avLst/>
+            </a:prstGeom>
+            <a:solidFill>
+              <a:schemeClr val="accent5"/>
+            </a:solidFill>
+          </p:spPr>
+          <p:style>
+            <a:lnRef idx="2">
+              <a:schemeClr val="accent1">
+                <a:shade val="50000"/>
+              </a:schemeClr>
+            </a:lnRef>
+            <a:fillRef idx="1">
+              <a:schemeClr val="accent1"/>
+            </a:fillRef>
+            <a:effectRef idx="0">
+              <a:schemeClr val="accent1"/>
+            </a:effectRef>
+            <a:fontRef idx="minor">
+              <a:schemeClr val="lt1"/>
+            </a:fontRef>
+          </p:style>
+          <p:txBody>
+            <a:bodyPr rtlCol="0" anchor="ctr"/>
+            <a:lstStyle/>
+            <a:p>
+              <a:pPr algn="ctr"/>
+              <a:r>
+                <a:rPr lang="en-US" sz="1200" dirty="0" err="1"/>
+                <a:t>EndDialog</a:t>
+              </a:r>
+              <a:endParaRPr lang="en-US" sz="1200" dirty="0"/>
+            </a:p>
+          </p:txBody>
+        </p:sp>
+        <p:sp>
+          <p:nvSpPr>
+            <p:cNvPr id="104" name="Rectangle 103">
+              <a:extLst>
+                <a:ext uri="{FF2B5EF4-FFF2-40B4-BE49-F238E27FC236}">
+                  <a16:creationId xmlns:a16="http://schemas.microsoft.com/office/drawing/2014/main" id="{456B9A4D-E6F3-492B-ADC6-020865A9280F}"/>
+                </a:ext>
+              </a:extLst>
+            </p:cNvPr>
+            <p:cNvSpPr/>
+            <p:nvPr/>
+          </p:nvSpPr>
+          <p:spPr>
+            <a:xfrm>
+              <a:off x="10096500" y="3771900"/>
+              <a:ext cx="1600200" cy="228600"/>
+            </a:xfrm>
+            <a:prstGeom prst="rect">
+              <a:avLst/>
+            </a:prstGeom>
+            <a:solidFill>
+              <a:schemeClr val="accent5"/>
+            </a:solidFill>
+          </p:spPr>
+          <p:style>
+            <a:lnRef idx="2">
+              <a:schemeClr val="accent1">
+                <a:shade val="50000"/>
+              </a:schemeClr>
+            </a:lnRef>
+            <a:fillRef idx="1">
+              <a:schemeClr val="accent1"/>
+            </a:fillRef>
+            <a:effectRef idx="0">
+              <a:schemeClr val="accent1"/>
+            </a:effectRef>
+            <a:fontRef idx="minor">
+              <a:schemeClr val="lt1"/>
+            </a:fontRef>
+          </p:style>
+          <p:txBody>
+            <a:bodyPr rtlCol="0" anchor="ctr"/>
+            <a:lstStyle/>
+            <a:p>
+              <a:pPr algn="ctr"/>
+              <a:r>
+                <a:rPr lang="en-US" sz="1200" dirty="0" err="1"/>
+                <a:t>EndTurn</a:t>
+              </a:r>
+              <a:endParaRPr lang="en-US" sz="1200" dirty="0"/>
+            </a:p>
+          </p:txBody>
+        </p:sp>
+        <p:sp>
+          <p:nvSpPr>
+            <p:cNvPr id="106" name="Rectangle 105">
+              <a:extLst>
+                <a:ext uri="{FF2B5EF4-FFF2-40B4-BE49-F238E27FC236}">
+                  <a16:creationId xmlns:a16="http://schemas.microsoft.com/office/drawing/2014/main" id="{142156A5-F6BA-4F26-89B8-6DC0DF75211F}"/>
+                </a:ext>
+              </a:extLst>
+            </p:cNvPr>
+            <p:cNvSpPr/>
+            <p:nvPr/>
+          </p:nvSpPr>
+          <p:spPr>
+            <a:xfrm>
+              <a:off x="10096500" y="4000500"/>
+              <a:ext cx="1600200" cy="228600"/>
+            </a:xfrm>
+            <a:prstGeom prst="rect">
+              <a:avLst/>
+            </a:prstGeom>
+            <a:solidFill>
+              <a:schemeClr val="accent5"/>
+            </a:solidFill>
+          </p:spPr>
+          <p:style>
+            <a:lnRef idx="2">
+              <a:schemeClr val="accent1">
+                <a:shade val="50000"/>
+              </a:schemeClr>
+            </a:lnRef>
+            <a:fillRef idx="1">
+              <a:schemeClr val="accent1"/>
+            </a:fillRef>
+            <a:effectRef idx="0">
+              <a:schemeClr val="accent1"/>
+            </a:effectRef>
+            <a:fontRef idx="minor">
+              <a:schemeClr val="lt1"/>
+            </a:fontRef>
+          </p:style>
+          <p:txBody>
+            <a:bodyPr rtlCol="0" anchor="ctr"/>
+            <a:lstStyle/>
+            <a:p>
+              <a:pPr algn="ctr"/>
+              <a:r>
+                <a:rPr lang="en-US" sz="1200" dirty="0"/>
+                <a:t>Foreach</a:t>
+              </a:r>
+            </a:p>
+          </p:txBody>
+        </p:sp>
+        <p:sp>
+          <p:nvSpPr>
+            <p:cNvPr id="107" name="Rectangle 106">
+              <a:extLst>
+                <a:ext uri="{FF2B5EF4-FFF2-40B4-BE49-F238E27FC236}">
+                  <a16:creationId xmlns:a16="http://schemas.microsoft.com/office/drawing/2014/main" id="{8B73EE16-0245-4693-AF1E-11F76917BE3A}"/>
+                </a:ext>
+              </a:extLst>
+            </p:cNvPr>
+            <p:cNvSpPr/>
+            <p:nvPr/>
+          </p:nvSpPr>
+          <p:spPr>
+            <a:xfrm>
+              <a:off x="10096500" y="4229100"/>
+              <a:ext cx="1600200" cy="228600"/>
+            </a:xfrm>
+            <a:prstGeom prst="rect">
+              <a:avLst/>
+            </a:prstGeom>
+            <a:solidFill>
+              <a:schemeClr val="accent5"/>
+            </a:solidFill>
+          </p:spPr>
+          <p:style>
+            <a:lnRef idx="2">
+              <a:schemeClr val="accent1">
+                <a:shade val="50000"/>
+              </a:schemeClr>
+            </a:lnRef>
+            <a:fillRef idx="1">
+              <a:schemeClr val="accent1"/>
+            </a:fillRef>
+            <a:effectRef idx="0">
+              <a:schemeClr val="accent1"/>
+            </a:effectRef>
+            <a:fontRef idx="minor">
+              <a:schemeClr val="lt1"/>
+            </a:fontRef>
+          </p:style>
+          <p:txBody>
+            <a:bodyPr rtlCol="0" anchor="ctr"/>
+            <a:lstStyle/>
+            <a:p>
+              <a:pPr algn="ctr"/>
+              <a:r>
+                <a:rPr lang="en-US" sz="1200" dirty="0" err="1"/>
+                <a:t>ForeachPage</a:t>
+              </a:r>
+              <a:endParaRPr lang="en-US" sz="1200" dirty="0"/>
+            </a:p>
+          </p:txBody>
+        </p:sp>
+        <p:sp>
+          <p:nvSpPr>
+            <p:cNvPr id="108" name="Rectangle 107">
+              <a:extLst>
+                <a:ext uri="{FF2B5EF4-FFF2-40B4-BE49-F238E27FC236}">
+                  <a16:creationId xmlns:a16="http://schemas.microsoft.com/office/drawing/2014/main" id="{9B3E4C64-DB31-40FD-8CD1-128A03511C47}"/>
+                </a:ext>
+              </a:extLst>
+            </p:cNvPr>
+            <p:cNvSpPr/>
+            <p:nvPr/>
+          </p:nvSpPr>
+          <p:spPr>
+            <a:xfrm>
+              <a:off x="10096500" y="4457700"/>
+              <a:ext cx="1600200" cy="228600"/>
+            </a:xfrm>
+            <a:prstGeom prst="rect">
+              <a:avLst/>
+            </a:prstGeom>
+            <a:solidFill>
+              <a:schemeClr val="accent5"/>
+            </a:solidFill>
+          </p:spPr>
+          <p:style>
+            <a:lnRef idx="2">
+              <a:schemeClr val="accent1">
+                <a:shade val="50000"/>
+              </a:schemeClr>
+            </a:lnRef>
+            <a:fillRef idx="1">
+              <a:schemeClr val="accent1"/>
+            </a:fillRef>
+            <a:effectRef idx="0">
+              <a:schemeClr val="accent1"/>
+            </a:effectRef>
+            <a:fontRef idx="minor">
+              <a:schemeClr val="lt1"/>
+            </a:fontRef>
+          </p:style>
+          <p:txBody>
+            <a:bodyPr rtlCol="0" anchor="ctr"/>
+            <a:lstStyle/>
+            <a:p>
+              <a:pPr algn="ctr"/>
+              <a:r>
+                <a:rPr lang="en-US" sz="1200" dirty="0" err="1"/>
+                <a:t>HttpRequest</a:t>
+              </a:r>
+              <a:endParaRPr lang="en-US" sz="1200" dirty="0"/>
+            </a:p>
+          </p:txBody>
+        </p:sp>
+        <p:sp>
+          <p:nvSpPr>
+            <p:cNvPr id="109" name="Rectangle 108">
+              <a:extLst>
+                <a:ext uri="{FF2B5EF4-FFF2-40B4-BE49-F238E27FC236}">
+                  <a16:creationId xmlns:a16="http://schemas.microsoft.com/office/drawing/2014/main" id="{714E4E12-8DD8-42DF-B508-996C866F767B}"/>
+                </a:ext>
+              </a:extLst>
+            </p:cNvPr>
+            <p:cNvSpPr/>
+            <p:nvPr/>
+          </p:nvSpPr>
+          <p:spPr>
+            <a:xfrm>
+              <a:off x="10096500" y="4686300"/>
+              <a:ext cx="1600200" cy="228600"/>
+            </a:xfrm>
+            <a:prstGeom prst="rect">
+              <a:avLst/>
+            </a:prstGeom>
+            <a:solidFill>
+              <a:schemeClr val="accent5"/>
+            </a:solidFill>
+          </p:spPr>
+          <p:style>
+            <a:lnRef idx="2">
+              <a:schemeClr val="accent1">
+                <a:shade val="50000"/>
+              </a:schemeClr>
+            </a:lnRef>
+            <a:fillRef idx="1">
+              <a:schemeClr val="accent1"/>
+            </a:fillRef>
+            <a:effectRef idx="0">
+              <a:schemeClr val="accent1"/>
+            </a:effectRef>
+            <a:fontRef idx="minor">
+              <a:schemeClr val="lt1"/>
+            </a:fontRef>
+          </p:style>
+          <p:txBody>
+            <a:bodyPr rtlCol="0" anchor="ctr"/>
+            <a:lstStyle/>
+            <a:p>
+              <a:pPr algn="ctr"/>
+              <a:r>
+                <a:rPr lang="en-US" sz="1200" dirty="0" err="1"/>
+                <a:t>IfCondition</a:t>
+              </a:r>
+              <a:endParaRPr lang="en-US" sz="1200" dirty="0"/>
+            </a:p>
+          </p:txBody>
+        </p:sp>
+        <p:sp>
+          <p:nvSpPr>
+            <p:cNvPr id="110" name="Rectangle 109">
+              <a:extLst>
+                <a:ext uri="{FF2B5EF4-FFF2-40B4-BE49-F238E27FC236}">
+                  <a16:creationId xmlns:a16="http://schemas.microsoft.com/office/drawing/2014/main" id="{5B582BE4-E8B5-4340-8766-47768D5337F7}"/>
+                </a:ext>
+              </a:extLst>
+            </p:cNvPr>
+            <p:cNvSpPr/>
+            <p:nvPr/>
+          </p:nvSpPr>
+          <p:spPr>
+            <a:xfrm>
+              <a:off x="10096500" y="4914900"/>
+              <a:ext cx="1600200" cy="228600"/>
+            </a:xfrm>
+            <a:prstGeom prst="rect">
+              <a:avLst/>
+            </a:prstGeom>
+            <a:solidFill>
+              <a:schemeClr val="accent5"/>
+            </a:solidFill>
+          </p:spPr>
+          <p:style>
+            <a:lnRef idx="2">
+              <a:schemeClr val="accent1">
+                <a:shade val="50000"/>
+              </a:schemeClr>
+            </a:lnRef>
+            <a:fillRef idx="1">
+              <a:schemeClr val="accent1"/>
+            </a:fillRef>
+            <a:effectRef idx="0">
+              <a:schemeClr val="accent1"/>
+            </a:effectRef>
+            <a:fontRef idx="minor">
+              <a:schemeClr val="lt1"/>
+            </a:fontRef>
+          </p:style>
+          <p:txBody>
+            <a:bodyPr rtlCol="0" anchor="ctr"/>
+            <a:lstStyle/>
+            <a:p>
+              <a:pPr algn="ctr"/>
+              <a:r>
+                <a:rPr lang="en-US" sz="1200" dirty="0" err="1"/>
+                <a:t>InitProperty</a:t>
+              </a:r>
+              <a:endParaRPr lang="en-US" sz="1200" dirty="0"/>
+            </a:p>
+          </p:txBody>
+        </p:sp>
+        <p:sp>
+          <p:nvSpPr>
+            <p:cNvPr id="111" name="Rectangle 110">
+              <a:extLst>
+                <a:ext uri="{FF2B5EF4-FFF2-40B4-BE49-F238E27FC236}">
+                  <a16:creationId xmlns:a16="http://schemas.microsoft.com/office/drawing/2014/main" id="{961C4812-0A27-4430-AD37-72A5950F50FC}"/>
+                </a:ext>
+              </a:extLst>
+            </p:cNvPr>
+            <p:cNvSpPr/>
+            <p:nvPr/>
+          </p:nvSpPr>
+          <p:spPr>
+            <a:xfrm>
+              <a:off x="10096500" y="5143500"/>
+              <a:ext cx="1600200" cy="228600"/>
+            </a:xfrm>
+            <a:prstGeom prst="rect">
+              <a:avLst/>
+            </a:prstGeom>
+            <a:solidFill>
+              <a:schemeClr val="accent5"/>
+            </a:solidFill>
+          </p:spPr>
+          <p:style>
+            <a:lnRef idx="2">
+              <a:schemeClr val="accent1">
+                <a:shade val="50000"/>
+              </a:schemeClr>
+            </a:lnRef>
+            <a:fillRef idx="1">
+              <a:schemeClr val="accent1"/>
+            </a:fillRef>
+            <a:effectRef idx="0">
+              <a:schemeClr val="accent1"/>
+            </a:effectRef>
+            <a:fontRef idx="minor">
+              <a:schemeClr val="lt1"/>
+            </a:fontRef>
+          </p:style>
+          <p:txBody>
+            <a:bodyPr rtlCol="0" anchor="ctr"/>
+            <a:lstStyle/>
+            <a:p>
+              <a:pPr algn="ctr"/>
+              <a:r>
+                <a:rPr lang="en-US" sz="1200" dirty="0" err="1"/>
+                <a:t>LogAction</a:t>
+              </a:r>
+              <a:endParaRPr lang="en-US" sz="1200" dirty="0"/>
+            </a:p>
+          </p:txBody>
+        </p:sp>
+        <p:sp>
+          <p:nvSpPr>
+            <p:cNvPr id="112" name="Rectangle 111">
+              <a:extLst>
+                <a:ext uri="{FF2B5EF4-FFF2-40B4-BE49-F238E27FC236}">
+                  <a16:creationId xmlns:a16="http://schemas.microsoft.com/office/drawing/2014/main" id="{52CC6072-0FC6-4FE7-8BEB-26A4C66EBCAD}"/>
+                </a:ext>
+              </a:extLst>
+            </p:cNvPr>
+            <p:cNvSpPr/>
+            <p:nvPr/>
+          </p:nvSpPr>
+          <p:spPr>
+            <a:xfrm>
+              <a:off x="10096500" y="5372100"/>
+              <a:ext cx="1600200" cy="228600"/>
+            </a:xfrm>
+            <a:prstGeom prst="rect">
+              <a:avLst/>
+            </a:prstGeom>
+            <a:solidFill>
+              <a:schemeClr val="accent5"/>
+            </a:solidFill>
+          </p:spPr>
+          <p:style>
+            <a:lnRef idx="2">
+              <a:schemeClr val="accent1">
+                <a:shade val="50000"/>
+              </a:schemeClr>
+            </a:lnRef>
+            <a:fillRef idx="1">
+              <a:schemeClr val="accent1"/>
+            </a:fillRef>
+            <a:effectRef idx="0">
+              <a:schemeClr val="accent1"/>
+            </a:effectRef>
+            <a:fontRef idx="minor">
+              <a:schemeClr val="lt1"/>
+            </a:fontRef>
+          </p:style>
+          <p:txBody>
+            <a:bodyPr rtlCol="0" anchor="ctr"/>
+            <a:lstStyle/>
+            <a:p>
+              <a:pPr algn="ctr"/>
+              <a:r>
+                <a:rPr lang="en-US" sz="1200" dirty="0" err="1"/>
+                <a:t>RepeatDialog</a:t>
+              </a:r>
+              <a:endParaRPr lang="en-US" sz="1200" dirty="0"/>
+            </a:p>
+          </p:txBody>
+        </p:sp>
+        <p:sp>
+          <p:nvSpPr>
+            <p:cNvPr id="115" name="Rectangle 114">
+              <a:extLst>
+                <a:ext uri="{FF2B5EF4-FFF2-40B4-BE49-F238E27FC236}">
+                  <a16:creationId xmlns:a16="http://schemas.microsoft.com/office/drawing/2014/main" id="{E8FE3272-46C6-4AE2-A508-A7C5DE80B8E6}"/>
+                </a:ext>
+              </a:extLst>
+            </p:cNvPr>
+            <p:cNvSpPr/>
+            <p:nvPr/>
+          </p:nvSpPr>
+          <p:spPr>
+            <a:xfrm>
+              <a:off x="10096500" y="5600700"/>
+              <a:ext cx="1600200" cy="228600"/>
+            </a:xfrm>
+            <a:prstGeom prst="rect">
+              <a:avLst/>
+            </a:prstGeom>
+            <a:solidFill>
+              <a:schemeClr val="accent5"/>
+            </a:solidFill>
+          </p:spPr>
+          <p:style>
+            <a:lnRef idx="2">
+              <a:schemeClr val="accent1">
+                <a:shade val="50000"/>
+              </a:schemeClr>
+            </a:lnRef>
+            <a:fillRef idx="1">
+              <a:schemeClr val="accent1"/>
+            </a:fillRef>
+            <a:effectRef idx="0">
+              <a:schemeClr val="accent1"/>
+            </a:effectRef>
+            <a:fontRef idx="minor">
+              <a:schemeClr val="lt1"/>
+            </a:fontRef>
+          </p:style>
+          <p:txBody>
+            <a:bodyPr rtlCol="0" anchor="ctr"/>
+            <a:lstStyle/>
+            <a:p>
+              <a:pPr algn="ctr"/>
+              <a:r>
+                <a:rPr lang="en-US" sz="1200" dirty="0" err="1"/>
+                <a:t>SendActivity</a:t>
+              </a:r>
+              <a:endParaRPr lang="en-US" sz="1200" dirty="0"/>
+            </a:p>
+          </p:txBody>
+        </p:sp>
+        <p:sp>
+          <p:nvSpPr>
+            <p:cNvPr id="116" name="Rectangle 115">
+              <a:extLst>
+                <a:ext uri="{FF2B5EF4-FFF2-40B4-BE49-F238E27FC236}">
+                  <a16:creationId xmlns:a16="http://schemas.microsoft.com/office/drawing/2014/main" id="{EBE2E497-2962-4BB6-B13E-D5BAAF72ADBE}"/>
+                </a:ext>
+              </a:extLst>
+            </p:cNvPr>
+            <p:cNvSpPr/>
+            <p:nvPr/>
+          </p:nvSpPr>
+          <p:spPr>
+            <a:xfrm>
+              <a:off x="10096500" y="5829300"/>
+              <a:ext cx="1600200" cy="228600"/>
+            </a:xfrm>
+            <a:prstGeom prst="rect">
+              <a:avLst/>
+            </a:prstGeom>
+            <a:solidFill>
+              <a:schemeClr val="accent5"/>
+            </a:solidFill>
+          </p:spPr>
+          <p:style>
+            <a:lnRef idx="2">
+              <a:schemeClr val="accent1">
+                <a:shade val="50000"/>
+              </a:schemeClr>
+            </a:lnRef>
+            <a:fillRef idx="1">
+              <a:schemeClr val="accent1"/>
+            </a:fillRef>
+            <a:effectRef idx="0">
+              <a:schemeClr val="accent1"/>
+            </a:effectRef>
+            <a:fontRef idx="minor">
+              <a:schemeClr val="lt1"/>
+            </a:fontRef>
+          </p:style>
+          <p:txBody>
+            <a:bodyPr rtlCol="0" anchor="ctr"/>
+            <a:lstStyle/>
+            <a:p>
+              <a:pPr algn="ctr"/>
+              <a:r>
+                <a:rPr lang="en-US" sz="1200" dirty="0" err="1"/>
+                <a:t>SetProperty</a:t>
+              </a:r>
+              <a:endParaRPr lang="en-US" sz="1200" dirty="0"/>
+            </a:p>
+          </p:txBody>
+        </p:sp>
+        <p:sp>
+          <p:nvSpPr>
+            <p:cNvPr id="117" name="Rectangle 116">
+              <a:extLst>
+                <a:ext uri="{FF2B5EF4-FFF2-40B4-BE49-F238E27FC236}">
+                  <a16:creationId xmlns:a16="http://schemas.microsoft.com/office/drawing/2014/main" id="{0EFA465C-136B-477E-A40C-CD5F57FCB0FA}"/>
+                </a:ext>
+              </a:extLst>
+            </p:cNvPr>
+            <p:cNvSpPr/>
+            <p:nvPr/>
+          </p:nvSpPr>
+          <p:spPr>
+            <a:xfrm>
+              <a:off x="10096500" y="6057900"/>
+              <a:ext cx="1600200" cy="228600"/>
+            </a:xfrm>
+            <a:prstGeom prst="rect">
+              <a:avLst/>
+            </a:prstGeom>
+            <a:solidFill>
+              <a:schemeClr val="accent5"/>
+            </a:solidFill>
+          </p:spPr>
+          <p:style>
+            <a:lnRef idx="2">
+              <a:schemeClr val="accent1">
+                <a:shade val="50000"/>
+              </a:schemeClr>
+            </a:lnRef>
+            <a:fillRef idx="1">
+              <a:schemeClr val="accent1"/>
+            </a:fillRef>
+            <a:effectRef idx="0">
+              <a:schemeClr val="accent1"/>
+            </a:effectRef>
+            <a:fontRef idx="minor">
+              <a:schemeClr val="lt1"/>
+            </a:fontRef>
+          </p:style>
+          <p:txBody>
+            <a:bodyPr rtlCol="0" anchor="ctr"/>
+            <a:lstStyle/>
+            <a:p>
+              <a:pPr algn="ctr"/>
+              <a:r>
+                <a:rPr lang="en-US" sz="1200" dirty="0" err="1"/>
+                <a:t>SwitchCondition</a:t>
+              </a:r>
+              <a:endParaRPr lang="en-US" sz="1200" dirty="0"/>
+            </a:p>
+          </p:txBody>
+        </p:sp>
+        <p:sp>
+          <p:nvSpPr>
+            <p:cNvPr id="118" name="Rectangle 117">
+              <a:extLst>
+                <a:ext uri="{FF2B5EF4-FFF2-40B4-BE49-F238E27FC236}">
+                  <a16:creationId xmlns:a16="http://schemas.microsoft.com/office/drawing/2014/main" id="{F60BD05B-E29C-4D91-9EC2-5759B58F984D}"/>
+                </a:ext>
+              </a:extLst>
+            </p:cNvPr>
+            <p:cNvSpPr/>
+            <p:nvPr/>
+          </p:nvSpPr>
+          <p:spPr>
+            <a:xfrm>
+              <a:off x="10096500" y="6286500"/>
+              <a:ext cx="1600200" cy="228600"/>
+            </a:xfrm>
+            <a:prstGeom prst="rect">
+              <a:avLst/>
+            </a:prstGeom>
+            <a:solidFill>
+              <a:schemeClr val="accent5"/>
+            </a:solidFill>
+          </p:spPr>
+          <p:style>
+            <a:lnRef idx="2">
+              <a:schemeClr val="accent1">
+                <a:shade val="50000"/>
+              </a:schemeClr>
+            </a:lnRef>
+            <a:fillRef idx="1">
+              <a:schemeClr val="accent1"/>
+            </a:fillRef>
+            <a:effectRef idx="0">
+              <a:schemeClr val="accent1"/>
+            </a:effectRef>
+            <a:fontRef idx="minor">
+              <a:schemeClr val="lt1"/>
+            </a:fontRef>
+          </p:style>
+          <p:txBody>
+            <a:bodyPr rtlCol="0" anchor="ctr"/>
+            <a:lstStyle/>
+            <a:p>
+              <a:pPr algn="ctr"/>
+              <a:r>
+                <a:rPr lang="en-US" sz="1200" dirty="0" err="1"/>
+                <a:t>TraceActivity</a:t>
+              </a:r>
+              <a:endParaRPr lang="en-US" sz="1200" dirty="0"/>
+            </a:p>
+          </p:txBody>
+        </p:sp>
+      </p:grpSp>
+      <p:sp>
+        <p:nvSpPr>
+          <p:cNvPr id="138" name="Rectangle 137">
+            <a:extLst>
+              <a:ext uri="{FF2B5EF4-FFF2-40B4-BE49-F238E27FC236}">
+                <a16:creationId xmlns:a16="http://schemas.microsoft.com/office/drawing/2014/main" id="{A8F19425-9D45-49E0-A0B7-6674988A8302}"/>
+              </a:ext>
+            </a:extLst>
+          </p:cNvPr>
+          <p:cNvSpPr/>
+          <p:nvPr/>
+        </p:nvSpPr>
+        <p:spPr>
+          <a:xfrm>
+            <a:off x="5067300" y="3314700"/>
+            <a:ext cx="1600200" cy="342900"/>
+          </a:xfrm>
+          <a:prstGeom prst="rect">
+            <a:avLst/>
+          </a:prstGeom>
+          <a:solidFill>
+            <a:schemeClr val="accent5"/>
+          </a:solidFill>
+        </p:spPr>
+        <p:style>
+          <a:lnRef idx="2">
+            <a:schemeClr val="accent1">
+              <a:shade val="50000"/>
+            </a:schemeClr>
+          </a:lnRef>
+          <a:fillRef idx="1">
+            <a:schemeClr val="accent1"/>
+          </a:fillRef>
+          <a:effectRef idx="0">
+            <a:schemeClr val="accent1"/>
+          </a:effectRef>
+          <a:fontRef idx="minor">
+            <a:schemeClr val="lt1"/>
+          </a:fontRef>
+        </p:style>
+        <p:txBody>
+          <a:bodyPr rtlCol="0" anchor="ctr"/>
+          <a:lstStyle/>
+          <a:p>
+            <a:pPr algn="ctr"/>
+            <a:r>
+              <a:rPr lang="en-US" sz="1200" dirty="0" err="1"/>
+              <a:t>QnAMakerDialog</a:t>
+            </a:r>
+            <a:endParaRPr lang="en-US" sz="1200" dirty="0"/>
+          </a:p>
+        </p:txBody>
+      </p:sp>
+      <p:cxnSp>
+        <p:nvCxnSpPr>
+          <p:cNvPr id="140" name="Connector: Elbow 139">
+            <a:extLst>
+              <a:ext uri="{FF2B5EF4-FFF2-40B4-BE49-F238E27FC236}">
+                <a16:creationId xmlns:a16="http://schemas.microsoft.com/office/drawing/2014/main" id="{D697F18E-65F6-4EF5-9A8F-83325C955755}"/>
+              </a:ext>
+            </a:extLst>
+          </p:cNvPr>
+          <p:cNvCxnSpPr>
+            <a:cxnSpLocks/>
+            <a:stCxn id="138" idx="1"/>
+            <a:endCxn id="2" idx="2"/>
+          </p:cNvCxnSpPr>
+          <p:nvPr/>
+        </p:nvCxnSpPr>
+        <p:spPr>
+          <a:xfrm rot="10800000">
+            <a:off x="4838700" y="571500"/>
+            <a:ext cx="228600" cy="2914650"/>
+          </a:xfrm>
+          <a:prstGeom prst="bentConnector2">
+            <a:avLst/>
+          </a:prstGeom>
+          <a:ln>
+            <a:tailEnd type="triangle"/>
+          </a:ln>
+        </p:spPr>
+        <p:style>
+          <a:lnRef idx="1">
+            <a:schemeClr val="accent1"/>
+          </a:lnRef>
+          <a:fillRef idx="0">
+            <a:schemeClr val="accent1"/>
+          </a:fillRef>
+          <a:effectRef idx="0">
+            <a:schemeClr val="accent1"/>
+          </a:effectRef>
+          <a:fontRef idx="minor">
+            <a:schemeClr val="tx1"/>
+          </a:fontRef>
+        </p:style>
+      </p:cxnSp>
+      <p:sp>
+        <p:nvSpPr>
+          <p:cNvPr id="148" name="Rectangle 147">
+            <a:extLst>
+              <a:ext uri="{FF2B5EF4-FFF2-40B4-BE49-F238E27FC236}">
+                <a16:creationId xmlns:a16="http://schemas.microsoft.com/office/drawing/2014/main" id="{CEA5A0DD-6BDF-4EB4-BBBC-E1302C4799EF}"/>
+              </a:ext>
+            </a:extLst>
+          </p:cNvPr>
+          <p:cNvSpPr/>
+          <p:nvPr/>
+        </p:nvSpPr>
+        <p:spPr>
+          <a:xfrm>
+            <a:off x="5638800" y="571500"/>
+            <a:ext cx="1600200" cy="228600"/>
+          </a:xfrm>
+          <a:prstGeom prst="rect">
+            <a:avLst/>
+          </a:prstGeom>
+          <a:noFill/>
+          <a:ln>
+            <a:noFill/>
+          </a:ln>
+        </p:spPr>
+        <p:style>
+          <a:lnRef idx="2">
+            <a:schemeClr val="accent1">
+              <a:shade val="50000"/>
+            </a:schemeClr>
+          </a:lnRef>
+          <a:fillRef idx="1">
+            <a:schemeClr val="accent1"/>
+          </a:fillRef>
+          <a:effectRef idx="0">
+            <a:schemeClr val="accent1"/>
+          </a:effectRef>
+          <a:fontRef idx="minor">
+            <a:schemeClr val="lt1"/>
+          </a:fontRef>
+        </p:style>
+        <p:txBody>
+          <a:bodyPr rtlCol="0" anchor="ctr"/>
+          <a:lstStyle/>
+          <a:p>
+            <a:pPr algn="ctr"/>
+            <a:r>
+              <a:rPr lang="en-US" sz="1200" dirty="0">
+                <a:solidFill>
+                  <a:schemeClr val="tx1"/>
+                </a:solidFill>
+              </a:rPr>
+              <a:t>Composites</a:t>
+            </a:r>
+          </a:p>
+        </p:txBody>
+      </p:sp>
+      <p:sp>
+        <p:nvSpPr>
+          <p:cNvPr id="149" name="Rectangle 148">
+            <a:extLst>
+              <a:ext uri="{FF2B5EF4-FFF2-40B4-BE49-F238E27FC236}">
+                <a16:creationId xmlns:a16="http://schemas.microsoft.com/office/drawing/2014/main" id="{801AF27D-997C-4EB0-8CF3-5C5A7D1CC322}"/>
+              </a:ext>
+            </a:extLst>
+          </p:cNvPr>
+          <p:cNvSpPr/>
+          <p:nvPr/>
+        </p:nvSpPr>
+        <p:spPr>
+          <a:xfrm>
+            <a:off x="7696200" y="571500"/>
+            <a:ext cx="1600200" cy="228600"/>
+          </a:xfrm>
+          <a:prstGeom prst="rect">
+            <a:avLst/>
+          </a:prstGeom>
+          <a:noFill/>
+          <a:ln>
+            <a:noFill/>
+          </a:ln>
+        </p:spPr>
+        <p:style>
+          <a:lnRef idx="2">
+            <a:schemeClr val="accent1">
+              <a:shade val="50000"/>
+            </a:schemeClr>
+          </a:lnRef>
+          <a:fillRef idx="1">
+            <a:schemeClr val="accent1"/>
+          </a:fillRef>
+          <a:effectRef idx="0">
+            <a:schemeClr val="accent1"/>
+          </a:effectRef>
+          <a:fontRef idx="minor">
+            <a:schemeClr val="lt1"/>
+          </a:fontRef>
+        </p:style>
+        <p:txBody>
+          <a:bodyPr rtlCol="0" anchor="ctr"/>
+          <a:lstStyle/>
+          <a:p>
+            <a:pPr algn="ctr"/>
+            <a:r>
+              <a:rPr lang="en-US" sz="1200" dirty="0">
+                <a:solidFill>
+                  <a:schemeClr val="tx1"/>
+                </a:solidFill>
+              </a:rPr>
+              <a:t>“New” prompts</a:t>
+            </a:r>
+          </a:p>
+        </p:txBody>
+      </p:sp>
+      <p:sp>
+        <p:nvSpPr>
+          <p:cNvPr id="150" name="Rectangle 149">
+            <a:extLst>
+              <a:ext uri="{FF2B5EF4-FFF2-40B4-BE49-F238E27FC236}">
+                <a16:creationId xmlns:a16="http://schemas.microsoft.com/office/drawing/2014/main" id="{615ABC16-4BD9-4FFE-88FF-444503D045EF}"/>
+              </a:ext>
+            </a:extLst>
+          </p:cNvPr>
+          <p:cNvSpPr/>
+          <p:nvPr/>
+        </p:nvSpPr>
+        <p:spPr>
+          <a:xfrm>
+            <a:off x="495300" y="571500"/>
+            <a:ext cx="1600200" cy="228600"/>
+          </a:xfrm>
+          <a:prstGeom prst="rect">
+            <a:avLst/>
+          </a:prstGeom>
+          <a:noFill/>
+          <a:ln>
+            <a:noFill/>
+          </a:ln>
+        </p:spPr>
+        <p:style>
+          <a:lnRef idx="2">
+            <a:schemeClr val="accent1">
+              <a:shade val="50000"/>
+            </a:schemeClr>
+          </a:lnRef>
+          <a:fillRef idx="1">
+            <a:schemeClr val="accent1"/>
+          </a:fillRef>
+          <a:effectRef idx="0">
+            <a:schemeClr val="accent1"/>
+          </a:effectRef>
+          <a:fontRef idx="minor">
+            <a:schemeClr val="lt1"/>
+          </a:fontRef>
+        </p:style>
+        <p:txBody>
+          <a:bodyPr rtlCol="0" anchor="ctr"/>
+          <a:lstStyle/>
+          <a:p>
+            <a:pPr algn="ctr"/>
+            <a:r>
+              <a:rPr lang="en-US" sz="1200" dirty="0">
+                <a:solidFill>
+                  <a:schemeClr val="tx1"/>
+                </a:solidFill>
+              </a:rPr>
+              <a:t>“Old” prompts</a:t>
+            </a:r>
+          </a:p>
+        </p:txBody>
+      </p:sp>
+      <p:sp>
+        <p:nvSpPr>
+          <p:cNvPr id="174" name="Rectangle 173">
+            <a:extLst>
+              <a:ext uri="{FF2B5EF4-FFF2-40B4-BE49-F238E27FC236}">
+                <a16:creationId xmlns:a16="http://schemas.microsoft.com/office/drawing/2014/main" id="{AC9B81B3-21EC-48F9-A368-5041459D5764}"/>
+              </a:ext>
+            </a:extLst>
+          </p:cNvPr>
+          <p:cNvSpPr/>
+          <p:nvPr/>
+        </p:nvSpPr>
+        <p:spPr>
+          <a:xfrm>
+            <a:off x="3009900" y="1600200"/>
+            <a:ext cx="1600200" cy="228600"/>
+          </a:xfrm>
+          <a:prstGeom prst="rect">
+            <a:avLst/>
+          </a:prstGeom>
+          <a:noFill/>
+          <a:ln>
+            <a:noFill/>
+          </a:ln>
+        </p:spPr>
+        <p:style>
+          <a:lnRef idx="2">
+            <a:schemeClr val="accent1">
+              <a:shade val="50000"/>
+            </a:schemeClr>
+          </a:lnRef>
+          <a:fillRef idx="1">
+            <a:schemeClr val="accent1"/>
+          </a:fillRef>
+          <a:effectRef idx="0">
+            <a:schemeClr val="accent1"/>
+          </a:effectRef>
+          <a:fontRef idx="minor">
+            <a:schemeClr val="lt1"/>
+          </a:fontRef>
+        </p:style>
+        <p:txBody>
+          <a:bodyPr rtlCol="0" anchor="ctr"/>
+          <a:lstStyle/>
+          <a:p>
+            <a:pPr algn="ctr"/>
+            <a:r>
+              <a:rPr lang="en-US" sz="1200" dirty="0">
+                <a:solidFill>
+                  <a:schemeClr val="tx1"/>
+                </a:solidFill>
+              </a:rPr>
+              <a:t>OAuth Prompts</a:t>
+            </a:r>
+          </a:p>
+        </p:txBody>
+      </p:sp>
+      <p:sp>
+        <p:nvSpPr>
+          <p:cNvPr id="177" name="TextBox 176">
+            <a:extLst>
+              <a:ext uri="{FF2B5EF4-FFF2-40B4-BE49-F238E27FC236}">
+                <a16:creationId xmlns:a16="http://schemas.microsoft.com/office/drawing/2014/main" id="{1C2B487D-852C-4AAE-A7DD-E81057734637}"/>
+              </a:ext>
+            </a:extLst>
+          </p:cNvPr>
+          <p:cNvSpPr txBox="1"/>
+          <p:nvPr/>
+        </p:nvSpPr>
+        <p:spPr>
+          <a:xfrm>
+            <a:off x="7124700" y="3512403"/>
+            <a:ext cx="2253887" cy="830997"/>
+          </a:xfrm>
+          <a:prstGeom prst="rect">
+            <a:avLst/>
+          </a:prstGeom>
+          <a:solidFill>
+            <a:schemeClr val="bg1"/>
+          </a:solidFill>
+          <a:ln>
+            <a:solidFill>
+              <a:schemeClr val="tx1"/>
+            </a:solidFill>
+          </a:ln>
+        </p:spPr>
+        <p:txBody>
+          <a:bodyPr wrap="none" rtlCol="0">
+            <a:spAutoFit/>
+          </a:bodyPr>
+          <a:lstStyle/>
+          <a:p>
+            <a:r>
+              <a:rPr lang="en-US" sz="1200" dirty="0"/>
+              <a:t>Sequences are the replacement</a:t>
+            </a:r>
+          </a:p>
+          <a:p>
+            <a:r>
+              <a:rPr lang="en-US" sz="1200" dirty="0"/>
+              <a:t>for waterfall dialogs. Actions are</a:t>
+            </a:r>
+          </a:p>
+          <a:p>
+            <a:r>
+              <a:rPr lang="en-US" sz="1200" dirty="0"/>
+              <a:t>like steps in an implied waterfall</a:t>
+            </a:r>
+          </a:p>
+          <a:p>
+            <a:r>
+              <a:rPr lang="en-US" sz="1200" dirty="0"/>
+              <a:t>dialog.</a:t>
+            </a:r>
+          </a:p>
+        </p:txBody>
+      </p:sp>
+      <p:cxnSp>
+        <p:nvCxnSpPr>
+          <p:cNvPr id="179" name="Straight Connector 178">
+            <a:extLst>
+              <a:ext uri="{FF2B5EF4-FFF2-40B4-BE49-F238E27FC236}">
+                <a16:creationId xmlns:a16="http://schemas.microsoft.com/office/drawing/2014/main" id="{71392F71-F44D-4409-9858-3758A2CE0D87}"/>
+              </a:ext>
+            </a:extLst>
+          </p:cNvPr>
+          <p:cNvCxnSpPr>
+            <a:cxnSpLocks/>
+            <a:stCxn id="177" idx="3"/>
+          </p:cNvCxnSpPr>
+          <p:nvPr/>
+        </p:nvCxnSpPr>
+        <p:spPr>
+          <a:xfrm>
+            <a:off x="9378587" y="3927902"/>
+            <a:ext cx="146413" cy="0"/>
+          </a:xfrm>
+          <a:prstGeom prst="line">
+            <a:avLst/>
+          </a:prstGeom>
+        </p:spPr>
+        <p:style>
+          <a:lnRef idx="1">
+            <a:schemeClr val="accent1"/>
+          </a:lnRef>
+          <a:fillRef idx="0">
+            <a:schemeClr val="accent1"/>
+          </a:fillRef>
+          <a:effectRef idx="0">
+            <a:schemeClr val="accent1"/>
+          </a:effectRef>
+          <a:fontRef idx="minor">
+            <a:schemeClr val="tx1"/>
+          </a:fontRef>
+        </p:style>
+      </p:cxnSp>
+      <p:sp>
+        <p:nvSpPr>
+          <p:cNvPr id="184" name="Rectangle 183">
+            <a:extLst>
+              <a:ext uri="{FF2B5EF4-FFF2-40B4-BE49-F238E27FC236}">
+                <a16:creationId xmlns:a16="http://schemas.microsoft.com/office/drawing/2014/main" id="{22CF43E0-5DE9-4B86-BA4F-0E31434C7563}"/>
+              </a:ext>
+            </a:extLst>
+          </p:cNvPr>
+          <p:cNvSpPr/>
+          <p:nvPr/>
+        </p:nvSpPr>
+        <p:spPr>
+          <a:xfrm>
+            <a:off x="9867900" y="571500"/>
+            <a:ext cx="1600200" cy="228600"/>
+          </a:xfrm>
+          <a:prstGeom prst="rect">
+            <a:avLst/>
+          </a:prstGeom>
+          <a:noFill/>
+          <a:ln>
+            <a:noFill/>
+          </a:ln>
+        </p:spPr>
+        <p:style>
+          <a:lnRef idx="2">
+            <a:schemeClr val="accent1">
+              <a:shade val="50000"/>
+            </a:schemeClr>
+          </a:lnRef>
+          <a:fillRef idx="1">
+            <a:schemeClr val="accent1"/>
+          </a:fillRef>
+          <a:effectRef idx="0">
+            <a:schemeClr val="accent1"/>
+          </a:effectRef>
+          <a:fontRef idx="minor">
+            <a:schemeClr val="lt1"/>
+          </a:fontRef>
+        </p:style>
+        <p:txBody>
+          <a:bodyPr rtlCol="0" anchor="ctr"/>
+          <a:lstStyle/>
+          <a:p>
+            <a:pPr algn="ctr"/>
+            <a:r>
+              <a:rPr lang="en-US" sz="1200" dirty="0">
+                <a:solidFill>
+                  <a:schemeClr val="tx1"/>
+                </a:solidFill>
+              </a:rPr>
+              <a:t>Actions</a:t>
+            </a:r>
+          </a:p>
+        </p:txBody>
+      </p:sp>
+      <p:sp>
+        <p:nvSpPr>
+          <p:cNvPr id="78" name="TextBox 77">
+            <a:extLst>
+              <a:ext uri="{FF2B5EF4-FFF2-40B4-BE49-F238E27FC236}">
+                <a16:creationId xmlns:a16="http://schemas.microsoft.com/office/drawing/2014/main" id="{C772FC8E-052B-46EB-BE07-D9996C088027}"/>
+              </a:ext>
+            </a:extLst>
+          </p:cNvPr>
+          <p:cNvSpPr txBox="1"/>
+          <p:nvPr/>
+        </p:nvSpPr>
+        <p:spPr>
+          <a:xfrm>
+            <a:off x="7156813" y="4541103"/>
+            <a:ext cx="2161297" cy="646331"/>
+          </a:xfrm>
+          <a:prstGeom prst="rect">
+            <a:avLst/>
+          </a:prstGeom>
+          <a:solidFill>
+            <a:schemeClr val="bg1"/>
+          </a:solidFill>
+          <a:ln>
+            <a:solidFill>
+              <a:schemeClr val="tx1"/>
+            </a:solidFill>
+          </a:ln>
+        </p:spPr>
+        <p:txBody>
+          <a:bodyPr wrap="none" rtlCol="0">
+            <a:spAutoFit/>
+          </a:bodyPr>
+          <a:lstStyle/>
+          <a:p>
+            <a:r>
+              <a:rPr lang="en-US" sz="1200" dirty="0"/>
+              <a:t>Actions in the composer are</a:t>
+            </a:r>
+          </a:p>
+          <a:p>
+            <a:r>
+              <a:rPr lang="en-US" sz="1200" dirty="0"/>
+              <a:t>grouped by category and visible</a:t>
+            </a:r>
+          </a:p>
+          <a:p>
+            <a:r>
+              <a:rPr lang="en-US" sz="1200" dirty="0"/>
+              <a:t>only in the appropriate context.</a:t>
+            </a:r>
+          </a:p>
+        </p:txBody>
+      </p:sp>
+      <p:cxnSp>
+        <p:nvCxnSpPr>
+          <p:cNvPr id="15" name="Straight Connector 14">
+            <a:extLst>
+              <a:ext uri="{FF2B5EF4-FFF2-40B4-BE49-F238E27FC236}">
+                <a16:creationId xmlns:a16="http://schemas.microsoft.com/office/drawing/2014/main" id="{BBF38888-853B-423C-AF61-20F648FE3298}"/>
+              </a:ext>
+            </a:extLst>
+          </p:cNvPr>
+          <p:cNvCxnSpPr>
+            <a:stCxn id="78" idx="3"/>
+          </p:cNvCxnSpPr>
+          <p:nvPr/>
+        </p:nvCxnSpPr>
+        <p:spPr>
+          <a:xfrm flipV="1">
+            <a:off x="9318110" y="4800600"/>
+            <a:ext cx="206890" cy="63669"/>
+          </a:xfrm>
+          <a:prstGeom prst="line">
+            <a:avLst/>
+          </a:prstGeom>
+        </p:spPr>
+        <p:style>
+          <a:lnRef idx="1">
+            <a:schemeClr val="accent1"/>
+          </a:lnRef>
+          <a:fillRef idx="0">
+            <a:schemeClr val="accent1"/>
+          </a:fillRef>
+          <a:effectRef idx="0">
+            <a:schemeClr val="accent1"/>
+          </a:effectRef>
+          <a:fontRef idx="minor">
+            <a:schemeClr val="tx1"/>
+          </a:fontRef>
+        </p:style>
+      </p:cxnSp>
+    </p:spTree>
+    <p:extLst>
+      <p:ext uri="{BB962C8B-B14F-4D97-AF65-F5344CB8AC3E}">
+        <p14:creationId xmlns:p14="http://schemas.microsoft.com/office/powerpoint/2010/main" val="3623657709"/>
+      </p:ext>
+    </p:extLst>
+  </p:cSld>
+  <p:clrMapOvr>
+    <a:masterClrMapping/>
+  </p:clrMapOvr>
+</p:sld>
+</file>
+
 <file path=ppt/theme/theme1.xml><?xml version="1.0" encoding="utf-8"?>
 <a:theme xmlns:a="http://schemas.openxmlformats.org/drawingml/2006/main" name="Office Theme">
   <a:themeElements>

</xml_diff>

<commit_message>
Release 'live' 10-17-2019 (#1774)
</commit_message>
<xml_diff>
--- a/styleguide/dialogs/work-in-progress/dialog-diagrams.pptx
+++ b/styleguide/dialogs/work-in-progress/dialog-diagrams.pptx
@@ -7,6 +7,7 @@
   <p:sldIdLst>
     <p:sldId id="256" r:id="rId2"/>
     <p:sldId id="257" r:id="rId3"/>
+    <p:sldId id="258" r:id="rId4"/>
   </p:sldIdLst>
   <p:sldSz cx="12192000" cy="6858000"/>
   <p:notesSz cx="6858000" cy="9144000"/>
@@ -260,7 +261,7 @@
           <a:p>
             <a:fld id="{5E7A417E-3F10-4EE6-A8E6-5AC370CB751F}" type="datetimeFigureOut">
               <a:rPr lang="en-US" smtClean="0"/>
-              <a:t>8/12/2019</a:t>
+              <a:t>10/16/2019</a:t>
             </a:fld>
             <a:endParaRPr lang="en-US"/>
           </a:p>
@@ -458,7 +459,7 @@
           <a:p>
             <a:fld id="{5E7A417E-3F10-4EE6-A8E6-5AC370CB751F}" type="datetimeFigureOut">
               <a:rPr lang="en-US" smtClean="0"/>
-              <a:t>8/12/2019</a:t>
+              <a:t>10/16/2019</a:t>
             </a:fld>
             <a:endParaRPr lang="en-US"/>
           </a:p>
@@ -666,7 +667,7 @@
           <a:p>
             <a:fld id="{5E7A417E-3F10-4EE6-A8E6-5AC370CB751F}" type="datetimeFigureOut">
               <a:rPr lang="en-US" smtClean="0"/>
-              <a:t>8/12/2019</a:t>
+              <a:t>10/16/2019</a:t>
             </a:fld>
             <a:endParaRPr lang="en-US"/>
           </a:p>
@@ -864,7 +865,7 @@
           <a:p>
             <a:fld id="{5E7A417E-3F10-4EE6-A8E6-5AC370CB751F}" type="datetimeFigureOut">
               <a:rPr lang="en-US" smtClean="0"/>
-              <a:t>8/12/2019</a:t>
+              <a:t>10/16/2019</a:t>
             </a:fld>
             <a:endParaRPr lang="en-US"/>
           </a:p>
@@ -1139,7 +1140,7 @@
           <a:p>
             <a:fld id="{5E7A417E-3F10-4EE6-A8E6-5AC370CB751F}" type="datetimeFigureOut">
               <a:rPr lang="en-US" smtClean="0"/>
-              <a:t>8/12/2019</a:t>
+              <a:t>10/16/2019</a:t>
             </a:fld>
             <a:endParaRPr lang="en-US"/>
           </a:p>
@@ -1404,7 +1405,7 @@
           <a:p>
             <a:fld id="{5E7A417E-3F10-4EE6-A8E6-5AC370CB751F}" type="datetimeFigureOut">
               <a:rPr lang="en-US" smtClean="0"/>
-              <a:t>8/12/2019</a:t>
+              <a:t>10/16/2019</a:t>
             </a:fld>
             <a:endParaRPr lang="en-US"/>
           </a:p>
@@ -1816,7 +1817,7 @@
           <a:p>
             <a:fld id="{5E7A417E-3F10-4EE6-A8E6-5AC370CB751F}" type="datetimeFigureOut">
               <a:rPr lang="en-US" smtClean="0"/>
-              <a:t>8/12/2019</a:t>
+              <a:t>10/16/2019</a:t>
             </a:fld>
             <a:endParaRPr lang="en-US"/>
           </a:p>
@@ -1957,7 +1958,7 @@
           <a:p>
             <a:fld id="{5E7A417E-3F10-4EE6-A8E6-5AC370CB751F}" type="datetimeFigureOut">
               <a:rPr lang="en-US" smtClean="0"/>
-              <a:t>8/12/2019</a:t>
+              <a:t>10/16/2019</a:t>
             </a:fld>
             <a:endParaRPr lang="en-US"/>
           </a:p>
@@ -2070,7 +2071,7 @@
           <a:p>
             <a:fld id="{5E7A417E-3F10-4EE6-A8E6-5AC370CB751F}" type="datetimeFigureOut">
               <a:rPr lang="en-US" smtClean="0"/>
-              <a:t>8/12/2019</a:t>
+              <a:t>10/16/2019</a:t>
             </a:fld>
             <a:endParaRPr lang="en-US"/>
           </a:p>
@@ -2381,7 +2382,7 @@
           <a:p>
             <a:fld id="{5E7A417E-3F10-4EE6-A8E6-5AC370CB751F}" type="datetimeFigureOut">
               <a:rPr lang="en-US" smtClean="0"/>
-              <a:t>8/12/2019</a:t>
+              <a:t>10/16/2019</a:t>
             </a:fld>
             <a:endParaRPr lang="en-US"/>
           </a:p>
@@ -2669,7 +2670,7 @@
           <a:p>
             <a:fld id="{5E7A417E-3F10-4EE6-A8E6-5AC370CB751F}" type="datetimeFigureOut">
               <a:rPr lang="en-US" smtClean="0"/>
-              <a:t>8/12/2019</a:t>
+              <a:t>10/16/2019</a:t>
             </a:fld>
             <a:endParaRPr lang="en-US"/>
           </a:p>
@@ -2910,7 +2911,7 @@
           <a:p>
             <a:fld id="{5E7A417E-3F10-4EE6-A8E6-5AC370CB751F}" type="datetimeFigureOut">
               <a:rPr lang="en-US" smtClean="0"/>
-              <a:t>8/12/2019</a:t>
+              <a:t>10/16/2019</a:t>
             </a:fld>
             <a:endParaRPr lang="en-US"/>
           </a:p>
@@ -5129,6 +5130,3846 @@
 </p:sld>
 </file>
 
+<file path=ppt/slides/slide3.xml><?xml version="1.0" encoding="utf-8"?>
+<p:sld xmlns:a="http://schemas.openxmlformats.org/drawingml/2006/main" xmlns:r="http://schemas.openxmlformats.org/officeDocument/2006/relationships" xmlns:p="http://schemas.openxmlformats.org/presentationml/2006/main">
+  <p:cSld>
+    <p:spTree>
+      <p:nvGrpSpPr>
+        <p:cNvPr id="1" name=""/>
+        <p:cNvGrpSpPr/>
+        <p:nvPr/>
+      </p:nvGrpSpPr>
+      <p:grpSpPr>
+        <a:xfrm>
+          <a:off x="0" y="0"/>
+          <a:ext cx="0" cy="0"/>
+          <a:chOff x="0" y="0"/>
+          <a:chExt cx="0" cy="0"/>
+        </a:xfrm>
+      </p:grpSpPr>
+      <p:sp>
+        <p:nvSpPr>
+          <p:cNvPr id="185" name="Rectangle 184">
+            <a:extLst>
+              <a:ext uri="{FF2B5EF4-FFF2-40B4-BE49-F238E27FC236}">
+                <a16:creationId xmlns:a16="http://schemas.microsoft.com/office/drawing/2014/main" id="{9E7A60E2-06E2-4216-B6F1-38BB24997C0E}"/>
+              </a:ext>
+            </a:extLst>
+          </p:cNvPr>
+          <p:cNvSpPr/>
+          <p:nvPr/>
+        </p:nvSpPr>
+        <p:spPr>
+          <a:xfrm>
+            <a:off x="5295900" y="914400"/>
+            <a:ext cx="2044700" cy="1885950"/>
+          </a:xfrm>
+          <a:prstGeom prst="rect">
+            <a:avLst/>
+          </a:prstGeom>
+          <a:solidFill>
+            <a:schemeClr val="accent6">
+              <a:lumMod val="20000"/>
+              <a:lumOff val="80000"/>
+            </a:schemeClr>
+          </a:solidFill>
+          <a:ln w="12700">
+            <a:solidFill>
+              <a:schemeClr val="accent1">
+                <a:lumMod val="75000"/>
+              </a:schemeClr>
+            </a:solidFill>
+          </a:ln>
+        </p:spPr>
+        <p:style>
+          <a:lnRef idx="2">
+            <a:schemeClr val="accent1">
+              <a:shade val="50000"/>
+            </a:schemeClr>
+          </a:lnRef>
+          <a:fillRef idx="1">
+            <a:schemeClr val="accent1"/>
+          </a:fillRef>
+          <a:effectRef idx="0">
+            <a:schemeClr val="accent1"/>
+          </a:effectRef>
+          <a:fontRef idx="minor">
+            <a:schemeClr val="lt1"/>
+          </a:fontRef>
+        </p:style>
+        <p:txBody>
+          <a:bodyPr rtlCol="0" anchor="ctr"/>
+          <a:lstStyle/>
+          <a:p>
+            <a:pPr algn="ctr"/>
+            <a:endParaRPr lang="en-US"/>
+          </a:p>
+        </p:txBody>
+      </p:sp>
+      <p:sp>
+        <p:nvSpPr>
+          <p:cNvPr id="176" name="Rectangle 175">
+            <a:extLst>
+              <a:ext uri="{FF2B5EF4-FFF2-40B4-BE49-F238E27FC236}">
+                <a16:creationId xmlns:a16="http://schemas.microsoft.com/office/drawing/2014/main" id="{46AC58E3-C761-4232-8A15-922CB23F90FF}"/>
+              </a:ext>
+            </a:extLst>
+          </p:cNvPr>
+          <p:cNvSpPr/>
+          <p:nvPr/>
+        </p:nvSpPr>
+        <p:spPr>
+          <a:xfrm>
+            <a:off x="9525000" y="914400"/>
+            <a:ext cx="2286000" cy="5715000"/>
+          </a:xfrm>
+          <a:prstGeom prst="rect">
+            <a:avLst/>
+          </a:prstGeom>
+          <a:solidFill>
+            <a:schemeClr val="accent1">
+              <a:lumMod val="20000"/>
+              <a:lumOff val="80000"/>
+            </a:schemeClr>
+          </a:solidFill>
+          <a:ln w="12700">
+            <a:solidFill>
+              <a:schemeClr val="accent1">
+                <a:lumMod val="75000"/>
+              </a:schemeClr>
+            </a:solidFill>
+          </a:ln>
+        </p:spPr>
+        <p:style>
+          <a:lnRef idx="2">
+            <a:schemeClr val="accent1">
+              <a:shade val="50000"/>
+            </a:schemeClr>
+          </a:lnRef>
+          <a:fillRef idx="1">
+            <a:schemeClr val="accent1"/>
+          </a:fillRef>
+          <a:effectRef idx="0">
+            <a:schemeClr val="accent1"/>
+          </a:effectRef>
+          <a:fontRef idx="minor">
+            <a:schemeClr val="lt1"/>
+          </a:fontRef>
+        </p:style>
+        <p:txBody>
+          <a:bodyPr rtlCol="0" anchor="ctr"/>
+          <a:lstStyle/>
+          <a:p>
+            <a:pPr algn="ctr"/>
+            <a:endParaRPr lang="en-US"/>
+          </a:p>
+        </p:txBody>
+      </p:sp>
+      <p:sp>
+        <p:nvSpPr>
+          <p:cNvPr id="2" name="Rectangle 1">
+            <a:extLst>
+              <a:ext uri="{FF2B5EF4-FFF2-40B4-BE49-F238E27FC236}">
+                <a16:creationId xmlns:a16="http://schemas.microsoft.com/office/drawing/2014/main" id="{14A5457B-157B-4C6A-A516-3DEC2026CFF5}"/>
+              </a:ext>
+            </a:extLst>
+          </p:cNvPr>
+          <p:cNvSpPr/>
+          <p:nvPr/>
+        </p:nvSpPr>
+        <p:spPr>
+          <a:xfrm>
+            <a:off x="4038600" y="228600"/>
+            <a:ext cx="1600200" cy="342900"/>
+          </a:xfrm>
+          <a:prstGeom prst="rect">
+            <a:avLst/>
+          </a:prstGeom>
+          <a:solidFill>
+            <a:schemeClr val="accent2"/>
+          </a:solidFill>
+        </p:spPr>
+        <p:style>
+          <a:lnRef idx="2">
+            <a:schemeClr val="accent1">
+              <a:shade val="50000"/>
+            </a:schemeClr>
+          </a:lnRef>
+          <a:fillRef idx="1">
+            <a:schemeClr val="accent1"/>
+          </a:fillRef>
+          <a:effectRef idx="0">
+            <a:schemeClr val="accent1"/>
+          </a:effectRef>
+          <a:fontRef idx="minor">
+            <a:schemeClr val="lt1"/>
+          </a:fontRef>
+        </p:style>
+        <p:txBody>
+          <a:bodyPr rtlCol="0" anchor="ctr"/>
+          <a:lstStyle/>
+          <a:p>
+            <a:pPr algn="ctr"/>
+            <a:r>
+              <a:rPr lang="en-US" sz="1200" i="1" dirty="0"/>
+              <a:t>Dialog</a:t>
+            </a:r>
+          </a:p>
+        </p:txBody>
+      </p:sp>
+      <p:sp>
+        <p:nvSpPr>
+          <p:cNvPr id="3" name="Rectangle 2">
+            <a:extLst>
+              <a:ext uri="{FF2B5EF4-FFF2-40B4-BE49-F238E27FC236}">
+                <a16:creationId xmlns:a16="http://schemas.microsoft.com/office/drawing/2014/main" id="{31CF3F0B-7E44-4931-A033-ED4DA98D23A3}"/>
+              </a:ext>
+            </a:extLst>
+          </p:cNvPr>
+          <p:cNvSpPr/>
+          <p:nvPr/>
+        </p:nvSpPr>
+        <p:spPr>
+          <a:xfrm>
+            <a:off x="495300" y="1028700"/>
+            <a:ext cx="1600200" cy="342900"/>
+          </a:xfrm>
+          <a:prstGeom prst="rect">
+            <a:avLst/>
+          </a:prstGeom>
+          <a:solidFill>
+            <a:schemeClr val="accent2"/>
+          </a:solidFill>
+          <a:ln>
+            <a:headEnd type="triangle"/>
+            <a:tailEnd type="none"/>
+          </a:ln>
+        </p:spPr>
+        <p:style>
+          <a:lnRef idx="2">
+            <a:schemeClr val="accent1">
+              <a:shade val="50000"/>
+            </a:schemeClr>
+          </a:lnRef>
+          <a:fillRef idx="1">
+            <a:schemeClr val="accent1"/>
+          </a:fillRef>
+          <a:effectRef idx="0">
+            <a:schemeClr val="accent1"/>
+          </a:effectRef>
+          <a:fontRef idx="minor">
+            <a:schemeClr val="lt1"/>
+          </a:fontRef>
+        </p:style>
+        <p:txBody>
+          <a:bodyPr rtlCol="0" anchor="ctr"/>
+          <a:lstStyle/>
+          <a:p>
+            <a:pPr algn="ctr"/>
+            <a:r>
+              <a:rPr lang="en-US" sz="1200" i="1" dirty="0"/>
+              <a:t>Prompt</a:t>
+            </a:r>
+          </a:p>
+        </p:txBody>
+      </p:sp>
+      <p:sp>
+        <p:nvSpPr>
+          <p:cNvPr id="4" name="Rectangle 3">
+            <a:extLst>
+              <a:ext uri="{FF2B5EF4-FFF2-40B4-BE49-F238E27FC236}">
+                <a16:creationId xmlns:a16="http://schemas.microsoft.com/office/drawing/2014/main" id="{186BEA9A-55AE-4230-9DDD-00780B210F14}"/>
+              </a:ext>
+            </a:extLst>
+          </p:cNvPr>
+          <p:cNvSpPr/>
+          <p:nvPr/>
+        </p:nvSpPr>
+        <p:spPr>
+          <a:xfrm>
+            <a:off x="495300" y="1485900"/>
+            <a:ext cx="1600200" cy="228600"/>
+          </a:xfrm>
+          <a:prstGeom prst="rect">
+            <a:avLst/>
+          </a:prstGeom>
+          <a:solidFill>
+            <a:schemeClr val="accent2"/>
+          </a:solidFill>
+          <a:ln>
+            <a:headEnd type="triangle"/>
+            <a:tailEnd type="none"/>
+          </a:ln>
+        </p:spPr>
+        <p:style>
+          <a:lnRef idx="2">
+            <a:schemeClr val="accent1">
+              <a:shade val="50000"/>
+            </a:schemeClr>
+          </a:lnRef>
+          <a:fillRef idx="1">
+            <a:schemeClr val="accent1"/>
+          </a:fillRef>
+          <a:effectRef idx="0">
+            <a:schemeClr val="accent1"/>
+          </a:effectRef>
+          <a:fontRef idx="minor">
+            <a:schemeClr val="lt1"/>
+          </a:fontRef>
+        </p:style>
+        <p:txBody>
+          <a:bodyPr rtlCol="0" anchor="ctr"/>
+          <a:lstStyle/>
+          <a:p>
+            <a:pPr algn="ctr"/>
+            <a:r>
+              <a:rPr lang="en-US" sz="1200" i="1" dirty="0" err="1"/>
+              <a:t>ActivityPrompt</a:t>
+            </a:r>
+            <a:endParaRPr lang="en-US" sz="1200" i="1" dirty="0"/>
+          </a:p>
+        </p:txBody>
+      </p:sp>
+      <p:grpSp>
+        <p:nvGrpSpPr>
+          <p:cNvPr id="172" name="Group 171">
+            <a:extLst>
+              <a:ext uri="{FF2B5EF4-FFF2-40B4-BE49-F238E27FC236}">
+                <a16:creationId xmlns:a16="http://schemas.microsoft.com/office/drawing/2014/main" id="{F365C81E-6E4C-40F4-AEF9-521A3D734AF3}"/>
+              </a:ext>
+            </a:extLst>
+          </p:cNvPr>
+          <p:cNvGrpSpPr/>
+          <p:nvPr/>
+        </p:nvGrpSpPr>
+        <p:grpSpPr>
+          <a:xfrm>
+            <a:off x="495300" y="1828800"/>
+            <a:ext cx="1600200" cy="1371600"/>
+            <a:chOff x="723900" y="1828800"/>
+            <a:chExt cx="1600200" cy="1371600"/>
+          </a:xfrm>
+        </p:grpSpPr>
+        <p:sp>
+          <p:nvSpPr>
+            <p:cNvPr id="5" name="Rectangle 4">
+              <a:extLst>
+                <a:ext uri="{FF2B5EF4-FFF2-40B4-BE49-F238E27FC236}">
+                  <a16:creationId xmlns:a16="http://schemas.microsoft.com/office/drawing/2014/main" id="{D6C203E6-5DB5-496D-B940-9CF36BEA8914}"/>
+                </a:ext>
+              </a:extLst>
+            </p:cNvPr>
+            <p:cNvSpPr/>
+            <p:nvPr/>
+          </p:nvSpPr>
+          <p:spPr>
+            <a:xfrm>
+              <a:off x="723900" y="1828800"/>
+              <a:ext cx="1600200" cy="228600"/>
+            </a:xfrm>
+            <a:prstGeom prst="rect">
+              <a:avLst/>
+            </a:prstGeom>
+            <a:solidFill>
+              <a:schemeClr val="accent2"/>
+            </a:solidFill>
+            <a:ln>
+              <a:headEnd type="triangle"/>
+              <a:tailEnd type="none"/>
+            </a:ln>
+          </p:spPr>
+          <p:style>
+            <a:lnRef idx="2">
+              <a:schemeClr val="accent1">
+                <a:shade val="50000"/>
+              </a:schemeClr>
+            </a:lnRef>
+            <a:fillRef idx="1">
+              <a:schemeClr val="accent1"/>
+            </a:fillRef>
+            <a:effectRef idx="0">
+              <a:schemeClr val="accent1"/>
+            </a:effectRef>
+            <a:fontRef idx="minor">
+              <a:schemeClr val="lt1"/>
+            </a:fontRef>
+          </p:style>
+          <p:txBody>
+            <a:bodyPr rtlCol="0" anchor="ctr"/>
+            <a:lstStyle/>
+            <a:p>
+              <a:pPr algn="ctr"/>
+              <a:r>
+                <a:rPr lang="en-US" sz="1200" dirty="0" err="1"/>
+                <a:t>AttachmentPrompt</a:t>
+              </a:r>
+              <a:endParaRPr lang="en-US" sz="1200" dirty="0"/>
+            </a:p>
+          </p:txBody>
+        </p:sp>
+        <p:sp>
+          <p:nvSpPr>
+            <p:cNvPr id="6" name="Rectangle 5">
+              <a:extLst>
+                <a:ext uri="{FF2B5EF4-FFF2-40B4-BE49-F238E27FC236}">
+                  <a16:creationId xmlns:a16="http://schemas.microsoft.com/office/drawing/2014/main" id="{885771FC-2728-4036-972E-4188F13C9CBF}"/>
+                </a:ext>
+              </a:extLst>
+            </p:cNvPr>
+            <p:cNvSpPr/>
+            <p:nvPr/>
+          </p:nvSpPr>
+          <p:spPr>
+            <a:xfrm>
+              <a:off x="723900" y="2057400"/>
+              <a:ext cx="1600200" cy="228600"/>
+            </a:xfrm>
+            <a:prstGeom prst="rect">
+              <a:avLst/>
+            </a:prstGeom>
+            <a:solidFill>
+              <a:schemeClr val="accent2"/>
+            </a:solidFill>
+            <a:ln>
+              <a:headEnd type="triangle"/>
+              <a:tailEnd type="none"/>
+            </a:ln>
+          </p:spPr>
+          <p:style>
+            <a:lnRef idx="2">
+              <a:schemeClr val="accent1">
+                <a:shade val="50000"/>
+              </a:schemeClr>
+            </a:lnRef>
+            <a:fillRef idx="1">
+              <a:schemeClr val="accent1"/>
+            </a:fillRef>
+            <a:effectRef idx="0">
+              <a:schemeClr val="accent1"/>
+            </a:effectRef>
+            <a:fontRef idx="minor">
+              <a:schemeClr val="lt1"/>
+            </a:fontRef>
+          </p:style>
+          <p:txBody>
+            <a:bodyPr rtlCol="0" anchor="ctr"/>
+            <a:lstStyle/>
+            <a:p>
+              <a:pPr algn="ctr"/>
+              <a:r>
+                <a:rPr lang="en-US" sz="1200" dirty="0" err="1"/>
+                <a:t>ChoicePrompt</a:t>
+              </a:r>
+              <a:endParaRPr lang="en-US" sz="1200" dirty="0"/>
+            </a:p>
+          </p:txBody>
+        </p:sp>
+        <p:sp>
+          <p:nvSpPr>
+            <p:cNvPr id="7" name="Rectangle 6">
+              <a:extLst>
+                <a:ext uri="{FF2B5EF4-FFF2-40B4-BE49-F238E27FC236}">
+                  <a16:creationId xmlns:a16="http://schemas.microsoft.com/office/drawing/2014/main" id="{E15FBD0C-DB9A-475B-884B-028646E484AB}"/>
+                </a:ext>
+              </a:extLst>
+            </p:cNvPr>
+            <p:cNvSpPr/>
+            <p:nvPr/>
+          </p:nvSpPr>
+          <p:spPr>
+            <a:xfrm>
+              <a:off x="723900" y="2286000"/>
+              <a:ext cx="1600200" cy="228600"/>
+            </a:xfrm>
+            <a:prstGeom prst="rect">
+              <a:avLst/>
+            </a:prstGeom>
+            <a:solidFill>
+              <a:schemeClr val="accent2"/>
+            </a:solidFill>
+            <a:ln>
+              <a:headEnd type="triangle"/>
+              <a:tailEnd type="none"/>
+            </a:ln>
+          </p:spPr>
+          <p:style>
+            <a:lnRef idx="2">
+              <a:schemeClr val="accent1">
+                <a:shade val="50000"/>
+              </a:schemeClr>
+            </a:lnRef>
+            <a:fillRef idx="1">
+              <a:schemeClr val="accent1"/>
+            </a:fillRef>
+            <a:effectRef idx="0">
+              <a:schemeClr val="accent1"/>
+            </a:effectRef>
+            <a:fontRef idx="minor">
+              <a:schemeClr val="lt1"/>
+            </a:fontRef>
+          </p:style>
+          <p:txBody>
+            <a:bodyPr rtlCol="0" anchor="ctr"/>
+            <a:lstStyle/>
+            <a:p>
+              <a:pPr algn="ctr"/>
+              <a:r>
+                <a:rPr lang="en-US" sz="1200" dirty="0" err="1"/>
+                <a:t>ConfirmPrompt</a:t>
+              </a:r>
+              <a:endParaRPr lang="en-US" sz="1200" dirty="0"/>
+            </a:p>
+          </p:txBody>
+        </p:sp>
+        <p:sp>
+          <p:nvSpPr>
+            <p:cNvPr id="8" name="Rectangle 7">
+              <a:extLst>
+                <a:ext uri="{FF2B5EF4-FFF2-40B4-BE49-F238E27FC236}">
+                  <a16:creationId xmlns:a16="http://schemas.microsoft.com/office/drawing/2014/main" id="{7042A6E2-D6C5-43A0-9C75-4309D725A384}"/>
+                </a:ext>
+              </a:extLst>
+            </p:cNvPr>
+            <p:cNvSpPr/>
+            <p:nvPr/>
+          </p:nvSpPr>
+          <p:spPr>
+            <a:xfrm>
+              <a:off x="723900" y="2514600"/>
+              <a:ext cx="1600200" cy="228600"/>
+            </a:xfrm>
+            <a:prstGeom prst="rect">
+              <a:avLst/>
+            </a:prstGeom>
+            <a:solidFill>
+              <a:schemeClr val="accent2"/>
+            </a:solidFill>
+            <a:ln>
+              <a:headEnd type="triangle"/>
+              <a:tailEnd type="none"/>
+            </a:ln>
+          </p:spPr>
+          <p:style>
+            <a:lnRef idx="2">
+              <a:schemeClr val="accent1">
+                <a:shade val="50000"/>
+              </a:schemeClr>
+            </a:lnRef>
+            <a:fillRef idx="1">
+              <a:schemeClr val="accent1"/>
+            </a:fillRef>
+            <a:effectRef idx="0">
+              <a:schemeClr val="accent1"/>
+            </a:effectRef>
+            <a:fontRef idx="minor">
+              <a:schemeClr val="lt1"/>
+            </a:fontRef>
+          </p:style>
+          <p:txBody>
+            <a:bodyPr rtlCol="0" anchor="ctr"/>
+            <a:lstStyle/>
+            <a:p>
+              <a:pPr algn="ctr"/>
+              <a:r>
+                <a:rPr lang="en-US" sz="1200" dirty="0" err="1"/>
+                <a:t>DateTimePrompt</a:t>
+              </a:r>
+              <a:endParaRPr lang="en-US" sz="1200" dirty="0"/>
+            </a:p>
+          </p:txBody>
+        </p:sp>
+        <p:sp>
+          <p:nvSpPr>
+            <p:cNvPr id="9" name="Rectangle 8">
+              <a:extLst>
+                <a:ext uri="{FF2B5EF4-FFF2-40B4-BE49-F238E27FC236}">
+                  <a16:creationId xmlns:a16="http://schemas.microsoft.com/office/drawing/2014/main" id="{2D366A59-A88A-4317-A5C6-A91172A9978A}"/>
+                </a:ext>
+              </a:extLst>
+            </p:cNvPr>
+            <p:cNvSpPr/>
+            <p:nvPr/>
+          </p:nvSpPr>
+          <p:spPr>
+            <a:xfrm>
+              <a:off x="723900" y="2743200"/>
+              <a:ext cx="1600200" cy="228600"/>
+            </a:xfrm>
+            <a:prstGeom prst="rect">
+              <a:avLst/>
+            </a:prstGeom>
+            <a:solidFill>
+              <a:schemeClr val="accent2"/>
+            </a:solidFill>
+            <a:ln>
+              <a:headEnd type="triangle"/>
+              <a:tailEnd type="none"/>
+            </a:ln>
+          </p:spPr>
+          <p:style>
+            <a:lnRef idx="2">
+              <a:schemeClr val="accent1">
+                <a:shade val="50000"/>
+              </a:schemeClr>
+            </a:lnRef>
+            <a:fillRef idx="1">
+              <a:schemeClr val="accent1"/>
+            </a:fillRef>
+            <a:effectRef idx="0">
+              <a:schemeClr val="accent1"/>
+            </a:effectRef>
+            <a:fontRef idx="minor">
+              <a:schemeClr val="lt1"/>
+            </a:fontRef>
+          </p:style>
+          <p:txBody>
+            <a:bodyPr rtlCol="0" anchor="ctr"/>
+            <a:lstStyle/>
+            <a:p>
+              <a:pPr algn="ctr"/>
+              <a:r>
+                <a:rPr lang="en-US" sz="1200" dirty="0" err="1"/>
+                <a:t>NumberPrompt</a:t>
+              </a:r>
+              <a:endParaRPr lang="en-US" sz="1200" dirty="0"/>
+            </a:p>
+          </p:txBody>
+        </p:sp>
+        <p:sp>
+          <p:nvSpPr>
+            <p:cNvPr id="10" name="Rectangle 9">
+              <a:extLst>
+                <a:ext uri="{FF2B5EF4-FFF2-40B4-BE49-F238E27FC236}">
+                  <a16:creationId xmlns:a16="http://schemas.microsoft.com/office/drawing/2014/main" id="{CE6C50C1-7A43-4EAB-B227-8CB3C92916B5}"/>
+                </a:ext>
+              </a:extLst>
+            </p:cNvPr>
+            <p:cNvSpPr/>
+            <p:nvPr/>
+          </p:nvSpPr>
+          <p:spPr>
+            <a:xfrm>
+              <a:off x="723900" y="2971800"/>
+              <a:ext cx="1600200" cy="228600"/>
+            </a:xfrm>
+            <a:prstGeom prst="rect">
+              <a:avLst/>
+            </a:prstGeom>
+            <a:solidFill>
+              <a:schemeClr val="accent2"/>
+            </a:solidFill>
+            <a:ln>
+              <a:headEnd type="triangle"/>
+              <a:tailEnd type="none"/>
+            </a:ln>
+          </p:spPr>
+          <p:style>
+            <a:lnRef idx="2">
+              <a:schemeClr val="accent1">
+                <a:shade val="50000"/>
+              </a:schemeClr>
+            </a:lnRef>
+            <a:fillRef idx="1">
+              <a:schemeClr val="accent1"/>
+            </a:fillRef>
+            <a:effectRef idx="0">
+              <a:schemeClr val="accent1"/>
+            </a:effectRef>
+            <a:fontRef idx="minor">
+              <a:schemeClr val="lt1"/>
+            </a:fontRef>
+          </p:style>
+          <p:txBody>
+            <a:bodyPr rtlCol="0" anchor="ctr"/>
+            <a:lstStyle/>
+            <a:p>
+              <a:pPr algn="ctr"/>
+              <a:r>
+                <a:rPr lang="en-US" sz="1200" dirty="0" err="1"/>
+                <a:t>TextPrompt</a:t>
+              </a:r>
+              <a:endParaRPr lang="en-US" sz="1200" dirty="0"/>
+            </a:p>
+          </p:txBody>
+        </p:sp>
+      </p:grpSp>
+      <p:cxnSp>
+        <p:nvCxnSpPr>
+          <p:cNvPr id="12" name="Connector: Elbow 11">
+            <a:extLst>
+              <a:ext uri="{FF2B5EF4-FFF2-40B4-BE49-F238E27FC236}">
+                <a16:creationId xmlns:a16="http://schemas.microsoft.com/office/drawing/2014/main" id="{8F6678F3-C0A1-40E3-8677-7E211287C3C9}"/>
+              </a:ext>
+            </a:extLst>
+          </p:cNvPr>
+          <p:cNvCxnSpPr>
+            <a:cxnSpLocks/>
+            <a:stCxn id="3" idx="3"/>
+            <a:endCxn id="4" idx="3"/>
+          </p:cNvCxnSpPr>
+          <p:nvPr/>
+        </p:nvCxnSpPr>
+        <p:spPr>
+          <a:xfrm>
+            <a:off x="2095500" y="1200150"/>
+            <a:ext cx="12700" cy="400050"/>
+          </a:xfrm>
+          <a:prstGeom prst="bentConnector3">
+            <a:avLst>
+              <a:gd name="adj1" fmla="val 1800000"/>
+            </a:avLst>
+          </a:prstGeom>
+          <a:ln>
+            <a:headEnd type="triangle"/>
+            <a:tailEnd type="none"/>
+          </a:ln>
+        </p:spPr>
+        <p:style>
+          <a:lnRef idx="1">
+            <a:schemeClr val="accent1"/>
+          </a:lnRef>
+          <a:fillRef idx="0">
+            <a:schemeClr val="accent1"/>
+          </a:fillRef>
+          <a:effectRef idx="0">
+            <a:schemeClr val="accent1"/>
+          </a:effectRef>
+          <a:fontRef idx="minor">
+            <a:schemeClr val="tx1"/>
+          </a:fontRef>
+        </p:style>
+      </p:cxnSp>
+      <p:cxnSp>
+        <p:nvCxnSpPr>
+          <p:cNvPr id="14" name="Connector: Elbow 13">
+            <a:extLst>
+              <a:ext uri="{FF2B5EF4-FFF2-40B4-BE49-F238E27FC236}">
+                <a16:creationId xmlns:a16="http://schemas.microsoft.com/office/drawing/2014/main" id="{A4EB4675-0FF6-4C18-A828-9376545BAE52}"/>
+              </a:ext>
+            </a:extLst>
+          </p:cNvPr>
+          <p:cNvCxnSpPr>
+            <a:cxnSpLocks/>
+            <a:stCxn id="3" idx="3"/>
+            <a:endCxn id="5" idx="3"/>
+          </p:cNvCxnSpPr>
+          <p:nvPr/>
+        </p:nvCxnSpPr>
+        <p:spPr>
+          <a:xfrm>
+            <a:off x="2095500" y="1200150"/>
+            <a:ext cx="12700" cy="742950"/>
+          </a:xfrm>
+          <a:prstGeom prst="bentConnector3">
+            <a:avLst>
+              <a:gd name="adj1" fmla="val 1800000"/>
+            </a:avLst>
+          </a:prstGeom>
+          <a:ln>
+            <a:headEnd type="triangle"/>
+            <a:tailEnd type="none"/>
+          </a:ln>
+        </p:spPr>
+        <p:style>
+          <a:lnRef idx="1">
+            <a:schemeClr val="accent1"/>
+          </a:lnRef>
+          <a:fillRef idx="0">
+            <a:schemeClr val="accent1"/>
+          </a:fillRef>
+          <a:effectRef idx="0">
+            <a:schemeClr val="accent1"/>
+          </a:effectRef>
+          <a:fontRef idx="minor">
+            <a:schemeClr val="tx1"/>
+          </a:fontRef>
+        </p:style>
+      </p:cxnSp>
+      <p:cxnSp>
+        <p:nvCxnSpPr>
+          <p:cNvPr id="26" name="Connector: Elbow 25">
+            <a:extLst>
+              <a:ext uri="{FF2B5EF4-FFF2-40B4-BE49-F238E27FC236}">
+                <a16:creationId xmlns:a16="http://schemas.microsoft.com/office/drawing/2014/main" id="{23C22E53-F894-4A86-8627-EFB945B58000}"/>
+              </a:ext>
+            </a:extLst>
+          </p:cNvPr>
+          <p:cNvCxnSpPr>
+            <a:cxnSpLocks/>
+            <a:stCxn id="3" idx="0"/>
+            <a:endCxn id="2" idx="2"/>
+          </p:cNvCxnSpPr>
+          <p:nvPr/>
+        </p:nvCxnSpPr>
+        <p:spPr>
+          <a:xfrm rot="5400000" flipH="1" flipV="1">
+            <a:off x="2838450" y="-971550"/>
+            <a:ext cx="457200" cy="3543300"/>
+          </a:xfrm>
+          <a:prstGeom prst="bentConnector3">
+            <a:avLst/>
+          </a:prstGeom>
+          <a:ln>
+            <a:tailEnd type="triangle"/>
+          </a:ln>
+        </p:spPr>
+        <p:style>
+          <a:lnRef idx="1">
+            <a:schemeClr val="accent1"/>
+          </a:lnRef>
+          <a:fillRef idx="0">
+            <a:schemeClr val="accent1"/>
+          </a:fillRef>
+          <a:effectRef idx="0">
+            <a:schemeClr val="accent1"/>
+          </a:effectRef>
+          <a:fontRef idx="minor">
+            <a:schemeClr val="tx1"/>
+          </a:fontRef>
+        </p:style>
+      </p:cxnSp>
+      <p:sp>
+        <p:nvSpPr>
+          <p:cNvPr id="27" name="Rectangle 26">
+            <a:extLst>
+              <a:ext uri="{FF2B5EF4-FFF2-40B4-BE49-F238E27FC236}">
+                <a16:creationId xmlns:a16="http://schemas.microsoft.com/office/drawing/2014/main" id="{88764262-BA1A-423A-8D84-46ADD3B467F8}"/>
+              </a:ext>
+            </a:extLst>
+          </p:cNvPr>
+          <p:cNvSpPr/>
+          <p:nvPr/>
+        </p:nvSpPr>
+        <p:spPr>
+          <a:xfrm>
+            <a:off x="3009900" y="1943100"/>
+            <a:ext cx="1600200" cy="342900"/>
+          </a:xfrm>
+          <a:prstGeom prst="rect">
+            <a:avLst/>
+          </a:prstGeom>
+          <a:solidFill>
+            <a:schemeClr val="accent2"/>
+          </a:solidFill>
+          <a:ln>
+            <a:headEnd type="triangle"/>
+            <a:tailEnd type="none"/>
+          </a:ln>
+        </p:spPr>
+        <p:style>
+          <a:lnRef idx="2">
+            <a:schemeClr val="accent1">
+              <a:shade val="50000"/>
+            </a:schemeClr>
+          </a:lnRef>
+          <a:fillRef idx="1">
+            <a:schemeClr val="accent1"/>
+          </a:fillRef>
+          <a:effectRef idx="0">
+            <a:schemeClr val="accent1"/>
+          </a:effectRef>
+          <a:fontRef idx="minor">
+            <a:schemeClr val="lt1"/>
+          </a:fontRef>
+        </p:style>
+        <p:txBody>
+          <a:bodyPr rtlCol="0" anchor="ctr"/>
+          <a:lstStyle/>
+          <a:p>
+            <a:pPr algn="ctr"/>
+            <a:r>
+              <a:rPr lang="en-US" sz="1200" dirty="0" err="1"/>
+              <a:t>OAuthPrompt</a:t>
+            </a:r>
+            <a:endParaRPr lang="en-US" sz="1200" dirty="0"/>
+          </a:p>
+        </p:txBody>
+      </p:sp>
+      <p:cxnSp>
+        <p:nvCxnSpPr>
+          <p:cNvPr id="29" name="Connector: Elbow 28">
+            <a:extLst>
+              <a:ext uri="{FF2B5EF4-FFF2-40B4-BE49-F238E27FC236}">
+                <a16:creationId xmlns:a16="http://schemas.microsoft.com/office/drawing/2014/main" id="{A59C3755-6A6A-449A-A451-27B8AEBCDAFA}"/>
+              </a:ext>
+            </a:extLst>
+          </p:cNvPr>
+          <p:cNvCxnSpPr>
+            <a:cxnSpLocks/>
+            <a:stCxn id="27" idx="3"/>
+            <a:endCxn id="2" idx="2"/>
+          </p:cNvCxnSpPr>
+          <p:nvPr/>
+        </p:nvCxnSpPr>
+        <p:spPr>
+          <a:xfrm flipV="1">
+            <a:off x="4610100" y="571500"/>
+            <a:ext cx="228600" cy="1543050"/>
+          </a:xfrm>
+          <a:prstGeom prst="bentConnector2">
+            <a:avLst/>
+          </a:prstGeom>
+          <a:ln>
+            <a:tailEnd type="triangle"/>
+          </a:ln>
+        </p:spPr>
+        <p:style>
+          <a:lnRef idx="1">
+            <a:schemeClr val="accent1"/>
+          </a:lnRef>
+          <a:fillRef idx="0">
+            <a:schemeClr val="accent1"/>
+          </a:fillRef>
+          <a:effectRef idx="0">
+            <a:schemeClr val="accent1"/>
+          </a:effectRef>
+          <a:fontRef idx="minor">
+            <a:schemeClr val="tx1"/>
+          </a:fontRef>
+        </p:style>
+      </p:cxnSp>
+      <p:sp>
+        <p:nvSpPr>
+          <p:cNvPr id="30" name="Rectangle 29">
+            <a:extLst>
+              <a:ext uri="{FF2B5EF4-FFF2-40B4-BE49-F238E27FC236}">
+                <a16:creationId xmlns:a16="http://schemas.microsoft.com/office/drawing/2014/main" id="{1DFA52FE-D874-4796-8A1A-C30E805ECB1D}"/>
+              </a:ext>
+            </a:extLst>
+          </p:cNvPr>
+          <p:cNvSpPr/>
+          <p:nvPr/>
+        </p:nvSpPr>
+        <p:spPr>
+          <a:xfrm>
+            <a:off x="2552700" y="1028700"/>
+            <a:ext cx="1600200" cy="342900"/>
+          </a:xfrm>
+          <a:prstGeom prst="rect">
+            <a:avLst/>
+          </a:prstGeom>
+          <a:solidFill>
+            <a:schemeClr val="accent2"/>
+          </a:solidFill>
+        </p:spPr>
+        <p:style>
+          <a:lnRef idx="2">
+            <a:schemeClr val="accent1">
+              <a:shade val="50000"/>
+            </a:schemeClr>
+          </a:lnRef>
+          <a:fillRef idx="1">
+            <a:schemeClr val="accent1"/>
+          </a:fillRef>
+          <a:effectRef idx="0">
+            <a:schemeClr val="accent1"/>
+          </a:effectRef>
+          <a:fontRef idx="minor">
+            <a:schemeClr val="lt1"/>
+          </a:fontRef>
+        </p:style>
+        <p:txBody>
+          <a:bodyPr rtlCol="0" anchor="ctr"/>
+          <a:lstStyle/>
+          <a:p>
+            <a:pPr algn="ctr"/>
+            <a:r>
+              <a:rPr lang="en-US" sz="1200" dirty="0" err="1"/>
+              <a:t>WaterfallDialog</a:t>
+            </a:r>
+            <a:endParaRPr lang="en-US" sz="1200" dirty="0"/>
+          </a:p>
+        </p:txBody>
+      </p:sp>
+      <p:sp>
+        <p:nvSpPr>
+          <p:cNvPr id="31" name="Rectangle 30">
+            <a:extLst>
+              <a:ext uri="{FF2B5EF4-FFF2-40B4-BE49-F238E27FC236}">
+                <a16:creationId xmlns:a16="http://schemas.microsoft.com/office/drawing/2014/main" id="{744B6EF3-DF45-467B-A9F4-96FB6BCCBE81}"/>
+              </a:ext>
+            </a:extLst>
+          </p:cNvPr>
+          <p:cNvSpPr/>
+          <p:nvPr/>
+        </p:nvSpPr>
+        <p:spPr>
+          <a:xfrm>
+            <a:off x="5638800" y="1028700"/>
+            <a:ext cx="1600200" cy="342900"/>
+          </a:xfrm>
+          <a:prstGeom prst="rect">
+            <a:avLst/>
+          </a:prstGeom>
+          <a:solidFill>
+            <a:schemeClr val="accent6"/>
+          </a:solidFill>
+        </p:spPr>
+        <p:style>
+          <a:lnRef idx="2">
+            <a:schemeClr val="accent1">
+              <a:shade val="50000"/>
+            </a:schemeClr>
+          </a:lnRef>
+          <a:fillRef idx="1">
+            <a:schemeClr val="accent1"/>
+          </a:fillRef>
+          <a:effectRef idx="0">
+            <a:schemeClr val="accent1"/>
+          </a:effectRef>
+          <a:fontRef idx="minor">
+            <a:schemeClr val="lt1"/>
+          </a:fontRef>
+        </p:style>
+        <p:txBody>
+          <a:bodyPr rtlCol="0" anchor="ctr"/>
+          <a:lstStyle/>
+          <a:p>
+            <a:pPr algn="ctr"/>
+            <a:r>
+              <a:rPr lang="en-US" sz="1200" i="1" dirty="0" err="1"/>
+              <a:t>DialogContainer</a:t>
+            </a:r>
+            <a:endParaRPr lang="en-US" sz="1200" i="1" dirty="0"/>
+          </a:p>
+        </p:txBody>
+      </p:sp>
+      <p:cxnSp>
+        <p:nvCxnSpPr>
+          <p:cNvPr id="33" name="Connector: Elbow 32">
+            <a:extLst>
+              <a:ext uri="{FF2B5EF4-FFF2-40B4-BE49-F238E27FC236}">
+                <a16:creationId xmlns:a16="http://schemas.microsoft.com/office/drawing/2014/main" id="{764688A8-07D3-47FC-AB75-54A1678A4354}"/>
+              </a:ext>
+            </a:extLst>
+          </p:cNvPr>
+          <p:cNvCxnSpPr>
+            <a:cxnSpLocks/>
+            <a:stCxn id="31" idx="0"/>
+            <a:endCxn id="2" idx="2"/>
+          </p:cNvCxnSpPr>
+          <p:nvPr/>
+        </p:nvCxnSpPr>
+        <p:spPr>
+          <a:xfrm rot="16200000" flipV="1">
+            <a:off x="5410200" y="0"/>
+            <a:ext cx="457200" cy="1600200"/>
+          </a:xfrm>
+          <a:prstGeom prst="bentConnector3">
+            <a:avLst/>
+          </a:prstGeom>
+          <a:ln>
+            <a:tailEnd type="triangle"/>
+          </a:ln>
+        </p:spPr>
+        <p:style>
+          <a:lnRef idx="1">
+            <a:schemeClr val="accent1"/>
+          </a:lnRef>
+          <a:fillRef idx="0">
+            <a:schemeClr val="accent1"/>
+          </a:fillRef>
+          <a:effectRef idx="0">
+            <a:schemeClr val="accent1"/>
+          </a:effectRef>
+          <a:fontRef idx="minor">
+            <a:schemeClr val="tx1"/>
+          </a:fontRef>
+        </p:style>
+      </p:cxnSp>
+      <p:cxnSp>
+        <p:nvCxnSpPr>
+          <p:cNvPr id="35" name="Connector: Elbow 34">
+            <a:extLst>
+              <a:ext uri="{FF2B5EF4-FFF2-40B4-BE49-F238E27FC236}">
+                <a16:creationId xmlns:a16="http://schemas.microsoft.com/office/drawing/2014/main" id="{8DA24480-8C0A-41EA-B8EC-8271CCA5B4CA}"/>
+              </a:ext>
+            </a:extLst>
+          </p:cNvPr>
+          <p:cNvCxnSpPr>
+            <a:cxnSpLocks/>
+            <a:stCxn id="30" idx="0"/>
+            <a:endCxn id="2" idx="2"/>
+          </p:cNvCxnSpPr>
+          <p:nvPr/>
+        </p:nvCxnSpPr>
+        <p:spPr>
+          <a:xfrm rot="5400000" flipH="1" flipV="1">
+            <a:off x="3867150" y="57150"/>
+            <a:ext cx="457200" cy="1485900"/>
+          </a:xfrm>
+          <a:prstGeom prst="bentConnector3">
+            <a:avLst/>
+          </a:prstGeom>
+          <a:ln>
+            <a:tailEnd type="triangle"/>
+          </a:ln>
+        </p:spPr>
+        <p:style>
+          <a:lnRef idx="1">
+            <a:schemeClr val="accent1"/>
+          </a:lnRef>
+          <a:fillRef idx="0">
+            <a:schemeClr val="accent1"/>
+          </a:fillRef>
+          <a:effectRef idx="0">
+            <a:schemeClr val="accent1"/>
+          </a:effectRef>
+          <a:fontRef idx="minor">
+            <a:schemeClr val="tx1"/>
+          </a:fontRef>
+        </p:style>
+      </p:cxnSp>
+      <p:sp>
+        <p:nvSpPr>
+          <p:cNvPr id="36" name="Rectangle 35">
+            <a:extLst>
+              <a:ext uri="{FF2B5EF4-FFF2-40B4-BE49-F238E27FC236}">
+                <a16:creationId xmlns:a16="http://schemas.microsoft.com/office/drawing/2014/main" id="{26146FC0-A6AF-4196-84EF-C77EAD769153}"/>
+              </a:ext>
+            </a:extLst>
+          </p:cNvPr>
+          <p:cNvSpPr/>
+          <p:nvPr/>
+        </p:nvSpPr>
+        <p:spPr>
+          <a:xfrm>
+            <a:off x="5638800" y="1714500"/>
+            <a:ext cx="1600200" cy="342900"/>
+          </a:xfrm>
+          <a:prstGeom prst="rect">
+            <a:avLst/>
+          </a:prstGeom>
+          <a:solidFill>
+            <a:schemeClr val="accent2"/>
+          </a:solidFill>
+        </p:spPr>
+        <p:style>
+          <a:lnRef idx="2">
+            <a:schemeClr val="accent1">
+              <a:shade val="50000"/>
+            </a:schemeClr>
+          </a:lnRef>
+          <a:fillRef idx="1">
+            <a:schemeClr val="accent1"/>
+          </a:fillRef>
+          <a:effectRef idx="0">
+            <a:schemeClr val="accent1"/>
+          </a:effectRef>
+          <a:fontRef idx="minor">
+            <a:schemeClr val="lt1"/>
+          </a:fontRef>
+        </p:style>
+        <p:txBody>
+          <a:bodyPr rtlCol="0" anchor="ctr"/>
+          <a:lstStyle/>
+          <a:p>
+            <a:pPr algn="ctr"/>
+            <a:r>
+              <a:rPr lang="en-US" sz="1200" dirty="0" err="1"/>
+              <a:t>ComponentDialog</a:t>
+            </a:r>
+            <a:endParaRPr lang="en-US" sz="1200" dirty="0"/>
+          </a:p>
+        </p:txBody>
+      </p:sp>
+      <p:sp>
+        <p:nvSpPr>
+          <p:cNvPr id="37" name="Rectangle 36">
+            <a:extLst>
+              <a:ext uri="{FF2B5EF4-FFF2-40B4-BE49-F238E27FC236}">
+                <a16:creationId xmlns:a16="http://schemas.microsoft.com/office/drawing/2014/main" id="{D33E5408-756B-45AC-9BD9-DFBCAFC862EE}"/>
+              </a:ext>
+            </a:extLst>
+          </p:cNvPr>
+          <p:cNvSpPr/>
+          <p:nvPr/>
+        </p:nvSpPr>
+        <p:spPr>
+          <a:xfrm>
+            <a:off x="5638800" y="2286000"/>
+            <a:ext cx="1600200" cy="342900"/>
+          </a:xfrm>
+          <a:prstGeom prst="rect">
+            <a:avLst/>
+          </a:prstGeom>
+          <a:solidFill>
+            <a:schemeClr val="accent5"/>
+          </a:solidFill>
+        </p:spPr>
+        <p:style>
+          <a:lnRef idx="2">
+            <a:schemeClr val="accent1">
+              <a:shade val="50000"/>
+            </a:schemeClr>
+          </a:lnRef>
+          <a:fillRef idx="1">
+            <a:schemeClr val="accent1"/>
+          </a:fillRef>
+          <a:effectRef idx="0">
+            <a:schemeClr val="accent1"/>
+          </a:effectRef>
+          <a:fontRef idx="minor">
+            <a:schemeClr val="lt1"/>
+          </a:fontRef>
+        </p:style>
+        <p:txBody>
+          <a:bodyPr rtlCol="0" anchor="ctr"/>
+          <a:lstStyle/>
+          <a:p>
+            <a:pPr algn="ctr"/>
+            <a:r>
+              <a:rPr lang="en-US" sz="1200" dirty="0" err="1"/>
+              <a:t>AdaptiveDialog</a:t>
+            </a:r>
+            <a:endParaRPr lang="en-US" sz="1200" dirty="0"/>
+          </a:p>
+        </p:txBody>
+      </p:sp>
+      <p:sp>
+        <p:nvSpPr>
+          <p:cNvPr id="38" name="Rectangle 37">
+            <a:extLst>
+              <a:ext uri="{FF2B5EF4-FFF2-40B4-BE49-F238E27FC236}">
+                <a16:creationId xmlns:a16="http://schemas.microsoft.com/office/drawing/2014/main" id="{36715E5F-0532-4EEF-903B-045BBB5151A7}"/>
+              </a:ext>
+            </a:extLst>
+          </p:cNvPr>
+          <p:cNvSpPr/>
+          <p:nvPr/>
+        </p:nvSpPr>
+        <p:spPr>
+          <a:xfrm>
+            <a:off x="7696200" y="1028700"/>
+            <a:ext cx="1600200" cy="342900"/>
+          </a:xfrm>
+          <a:prstGeom prst="rect">
+            <a:avLst/>
+          </a:prstGeom>
+          <a:solidFill>
+            <a:schemeClr val="accent5"/>
+          </a:solidFill>
+        </p:spPr>
+        <p:style>
+          <a:lnRef idx="2">
+            <a:schemeClr val="accent1">
+              <a:shade val="50000"/>
+            </a:schemeClr>
+          </a:lnRef>
+          <a:fillRef idx="1">
+            <a:schemeClr val="accent1"/>
+          </a:fillRef>
+          <a:effectRef idx="0">
+            <a:schemeClr val="accent1"/>
+          </a:effectRef>
+          <a:fontRef idx="minor">
+            <a:schemeClr val="lt1"/>
+          </a:fontRef>
+        </p:style>
+        <p:txBody>
+          <a:bodyPr rtlCol="0" anchor="ctr"/>
+          <a:lstStyle/>
+          <a:p>
+            <a:pPr algn="ctr"/>
+            <a:r>
+              <a:rPr lang="en-US" sz="1200" i="1" dirty="0" err="1"/>
+              <a:t>InputDialog</a:t>
+            </a:r>
+            <a:endParaRPr lang="en-US" sz="1200" i="1" dirty="0"/>
+          </a:p>
+        </p:txBody>
+      </p:sp>
+      <p:sp>
+        <p:nvSpPr>
+          <p:cNvPr id="39" name="Rectangle 38">
+            <a:extLst>
+              <a:ext uri="{FF2B5EF4-FFF2-40B4-BE49-F238E27FC236}">
+                <a16:creationId xmlns:a16="http://schemas.microsoft.com/office/drawing/2014/main" id="{62EB7AB5-AC41-40C1-8953-75026956EC40}"/>
+              </a:ext>
+            </a:extLst>
+          </p:cNvPr>
+          <p:cNvSpPr/>
+          <p:nvPr/>
+        </p:nvSpPr>
+        <p:spPr>
+          <a:xfrm>
+            <a:off x="3009900" y="2514600"/>
+            <a:ext cx="1600200" cy="342900"/>
+          </a:xfrm>
+          <a:prstGeom prst="rect">
+            <a:avLst/>
+          </a:prstGeom>
+          <a:solidFill>
+            <a:schemeClr val="accent5"/>
+          </a:solidFill>
+        </p:spPr>
+        <p:style>
+          <a:lnRef idx="2">
+            <a:schemeClr val="accent1">
+              <a:shade val="50000"/>
+            </a:schemeClr>
+          </a:lnRef>
+          <a:fillRef idx="1">
+            <a:schemeClr val="accent1"/>
+          </a:fillRef>
+          <a:effectRef idx="0">
+            <a:schemeClr val="accent1"/>
+          </a:effectRef>
+          <a:fontRef idx="minor">
+            <a:schemeClr val="lt1"/>
+          </a:fontRef>
+        </p:style>
+        <p:txBody>
+          <a:bodyPr rtlCol="0" anchor="ctr"/>
+          <a:lstStyle/>
+          <a:p>
+            <a:pPr algn="ctr"/>
+            <a:r>
+              <a:rPr lang="en-US" sz="1200" dirty="0" err="1"/>
+              <a:t>OAuthInput</a:t>
+            </a:r>
+            <a:endParaRPr lang="en-US" sz="1200" dirty="0"/>
+          </a:p>
+        </p:txBody>
+      </p:sp>
+      <p:cxnSp>
+        <p:nvCxnSpPr>
+          <p:cNvPr id="43" name="Connector: Elbow 42">
+            <a:extLst>
+              <a:ext uri="{FF2B5EF4-FFF2-40B4-BE49-F238E27FC236}">
+                <a16:creationId xmlns:a16="http://schemas.microsoft.com/office/drawing/2014/main" id="{E55A8F78-3FA8-4270-85DC-4615D18B1D03}"/>
+              </a:ext>
+            </a:extLst>
+          </p:cNvPr>
+          <p:cNvCxnSpPr>
+            <a:cxnSpLocks/>
+            <a:stCxn id="38" idx="0"/>
+            <a:endCxn id="2" idx="2"/>
+          </p:cNvCxnSpPr>
+          <p:nvPr/>
+        </p:nvCxnSpPr>
+        <p:spPr>
+          <a:xfrm rot="16200000" flipV="1">
+            <a:off x="6438900" y="-1028700"/>
+            <a:ext cx="457200" cy="3657600"/>
+          </a:xfrm>
+          <a:prstGeom prst="bentConnector3">
+            <a:avLst/>
+          </a:prstGeom>
+          <a:ln>
+            <a:tailEnd type="triangle"/>
+          </a:ln>
+        </p:spPr>
+        <p:style>
+          <a:lnRef idx="1">
+            <a:schemeClr val="accent1"/>
+          </a:lnRef>
+          <a:fillRef idx="0">
+            <a:schemeClr val="accent1"/>
+          </a:fillRef>
+          <a:effectRef idx="0">
+            <a:schemeClr val="accent1"/>
+          </a:effectRef>
+          <a:fontRef idx="minor">
+            <a:schemeClr val="tx1"/>
+          </a:fontRef>
+        </p:style>
+      </p:cxnSp>
+      <p:cxnSp>
+        <p:nvCxnSpPr>
+          <p:cNvPr id="45" name="Connector: Elbow 44">
+            <a:extLst>
+              <a:ext uri="{FF2B5EF4-FFF2-40B4-BE49-F238E27FC236}">
+                <a16:creationId xmlns:a16="http://schemas.microsoft.com/office/drawing/2014/main" id="{D12C9844-EF39-4865-B8A7-616E19E21D16}"/>
+              </a:ext>
+            </a:extLst>
+          </p:cNvPr>
+          <p:cNvCxnSpPr>
+            <a:cxnSpLocks/>
+            <a:stCxn id="39" idx="3"/>
+            <a:endCxn id="2" idx="2"/>
+          </p:cNvCxnSpPr>
+          <p:nvPr/>
+        </p:nvCxnSpPr>
+        <p:spPr>
+          <a:xfrm flipV="1">
+            <a:off x="4610100" y="571500"/>
+            <a:ext cx="228600" cy="2114550"/>
+          </a:xfrm>
+          <a:prstGeom prst="bentConnector2">
+            <a:avLst/>
+          </a:prstGeom>
+          <a:ln>
+            <a:tailEnd type="triangle"/>
+          </a:ln>
+        </p:spPr>
+        <p:style>
+          <a:lnRef idx="1">
+            <a:schemeClr val="accent1"/>
+          </a:lnRef>
+          <a:fillRef idx="0">
+            <a:schemeClr val="accent1"/>
+          </a:fillRef>
+          <a:effectRef idx="0">
+            <a:schemeClr val="accent1"/>
+          </a:effectRef>
+          <a:fontRef idx="minor">
+            <a:schemeClr val="tx1"/>
+          </a:fontRef>
+        </p:style>
+      </p:cxnSp>
+      <p:cxnSp>
+        <p:nvCxnSpPr>
+          <p:cNvPr id="47" name="Connector: Elbow 46">
+            <a:extLst>
+              <a:ext uri="{FF2B5EF4-FFF2-40B4-BE49-F238E27FC236}">
+                <a16:creationId xmlns:a16="http://schemas.microsoft.com/office/drawing/2014/main" id="{799FEDC3-2CA9-468B-BD42-DD607666870D}"/>
+              </a:ext>
+            </a:extLst>
+          </p:cNvPr>
+          <p:cNvCxnSpPr>
+            <a:cxnSpLocks/>
+            <a:stCxn id="37" idx="1"/>
+            <a:endCxn id="31" idx="1"/>
+          </p:cNvCxnSpPr>
+          <p:nvPr/>
+        </p:nvCxnSpPr>
+        <p:spPr>
+          <a:xfrm rot="10800000">
+            <a:off x="5638800" y="1200150"/>
+            <a:ext cx="12700" cy="1257300"/>
+          </a:xfrm>
+          <a:prstGeom prst="bentConnector3">
+            <a:avLst>
+              <a:gd name="adj1" fmla="val 1800000"/>
+            </a:avLst>
+          </a:prstGeom>
+          <a:ln>
+            <a:tailEnd type="triangle"/>
+          </a:ln>
+        </p:spPr>
+        <p:style>
+          <a:lnRef idx="1">
+            <a:schemeClr val="accent1"/>
+          </a:lnRef>
+          <a:fillRef idx="0">
+            <a:schemeClr val="accent1"/>
+          </a:fillRef>
+          <a:effectRef idx="0">
+            <a:schemeClr val="accent1"/>
+          </a:effectRef>
+          <a:fontRef idx="minor">
+            <a:schemeClr val="tx1"/>
+          </a:fontRef>
+        </p:style>
+      </p:cxnSp>
+      <p:cxnSp>
+        <p:nvCxnSpPr>
+          <p:cNvPr id="49" name="Connector: Elbow 48">
+            <a:extLst>
+              <a:ext uri="{FF2B5EF4-FFF2-40B4-BE49-F238E27FC236}">
+                <a16:creationId xmlns:a16="http://schemas.microsoft.com/office/drawing/2014/main" id="{EF57EDE3-2C9D-4C0A-A015-9893F6F6CD39}"/>
+              </a:ext>
+            </a:extLst>
+          </p:cNvPr>
+          <p:cNvCxnSpPr>
+            <a:cxnSpLocks/>
+            <a:stCxn id="36" idx="1"/>
+            <a:endCxn id="31" idx="1"/>
+          </p:cNvCxnSpPr>
+          <p:nvPr/>
+        </p:nvCxnSpPr>
+        <p:spPr>
+          <a:xfrm rot="10800000">
+            <a:off x="5638800" y="1200150"/>
+            <a:ext cx="12700" cy="685800"/>
+          </a:xfrm>
+          <a:prstGeom prst="bentConnector3">
+            <a:avLst>
+              <a:gd name="adj1" fmla="val 1800000"/>
+            </a:avLst>
+          </a:prstGeom>
+          <a:ln>
+            <a:tailEnd type="triangle"/>
+          </a:ln>
+        </p:spPr>
+        <p:style>
+          <a:lnRef idx="1">
+            <a:schemeClr val="accent1"/>
+          </a:lnRef>
+          <a:fillRef idx="0">
+            <a:schemeClr val="accent1"/>
+          </a:fillRef>
+          <a:effectRef idx="0">
+            <a:schemeClr val="accent1"/>
+          </a:effectRef>
+          <a:fontRef idx="minor">
+            <a:schemeClr val="tx1"/>
+          </a:fontRef>
+        </p:style>
+      </p:cxnSp>
+      <p:grpSp>
+        <p:nvGrpSpPr>
+          <p:cNvPr id="171" name="Group 170">
+            <a:extLst>
+              <a:ext uri="{FF2B5EF4-FFF2-40B4-BE49-F238E27FC236}">
+                <a16:creationId xmlns:a16="http://schemas.microsoft.com/office/drawing/2014/main" id="{BB332EE0-44E5-4CE5-AB2A-ACF54D794DA8}"/>
+              </a:ext>
+            </a:extLst>
+          </p:cNvPr>
+          <p:cNvGrpSpPr/>
+          <p:nvPr/>
+        </p:nvGrpSpPr>
+        <p:grpSpPr>
+          <a:xfrm>
+            <a:off x="7696200" y="1485900"/>
+            <a:ext cx="1600200" cy="1371600"/>
+            <a:chOff x="8039100" y="1485900"/>
+            <a:chExt cx="1600200" cy="1371600"/>
+          </a:xfrm>
+        </p:grpSpPr>
+        <p:sp>
+          <p:nvSpPr>
+            <p:cNvPr id="51" name="Rectangle 50">
+              <a:extLst>
+                <a:ext uri="{FF2B5EF4-FFF2-40B4-BE49-F238E27FC236}">
+                  <a16:creationId xmlns:a16="http://schemas.microsoft.com/office/drawing/2014/main" id="{669A4F61-C957-4E3A-8E58-D10B95095044}"/>
+                </a:ext>
+              </a:extLst>
+            </p:cNvPr>
+            <p:cNvSpPr/>
+            <p:nvPr/>
+          </p:nvSpPr>
+          <p:spPr>
+            <a:xfrm>
+              <a:off x="8039100" y="1485900"/>
+              <a:ext cx="1600200" cy="228600"/>
+            </a:xfrm>
+            <a:prstGeom prst="rect">
+              <a:avLst/>
+            </a:prstGeom>
+            <a:solidFill>
+              <a:schemeClr val="accent5"/>
+            </a:solidFill>
+          </p:spPr>
+          <p:style>
+            <a:lnRef idx="2">
+              <a:schemeClr val="accent1">
+                <a:shade val="50000"/>
+              </a:schemeClr>
+            </a:lnRef>
+            <a:fillRef idx="1">
+              <a:schemeClr val="accent1"/>
+            </a:fillRef>
+            <a:effectRef idx="0">
+              <a:schemeClr val="accent1"/>
+            </a:effectRef>
+            <a:fontRef idx="minor">
+              <a:schemeClr val="lt1"/>
+            </a:fontRef>
+          </p:style>
+          <p:txBody>
+            <a:bodyPr rtlCol="0" anchor="ctr"/>
+            <a:lstStyle/>
+            <a:p>
+              <a:pPr algn="ctr"/>
+              <a:r>
+                <a:rPr lang="en-US" sz="1200" dirty="0" err="1"/>
+                <a:t>AttachmentInput</a:t>
+              </a:r>
+              <a:endParaRPr lang="en-US" sz="1200" dirty="0"/>
+            </a:p>
+          </p:txBody>
+        </p:sp>
+        <p:sp>
+          <p:nvSpPr>
+            <p:cNvPr id="52" name="Rectangle 51">
+              <a:extLst>
+                <a:ext uri="{FF2B5EF4-FFF2-40B4-BE49-F238E27FC236}">
+                  <a16:creationId xmlns:a16="http://schemas.microsoft.com/office/drawing/2014/main" id="{211AF8C9-62BC-49A8-B2EC-6AB0120540E6}"/>
+                </a:ext>
+              </a:extLst>
+            </p:cNvPr>
+            <p:cNvSpPr/>
+            <p:nvPr/>
+          </p:nvSpPr>
+          <p:spPr>
+            <a:xfrm>
+              <a:off x="8039100" y="1714500"/>
+              <a:ext cx="1600200" cy="228600"/>
+            </a:xfrm>
+            <a:prstGeom prst="rect">
+              <a:avLst/>
+            </a:prstGeom>
+            <a:solidFill>
+              <a:schemeClr val="accent5"/>
+            </a:solidFill>
+          </p:spPr>
+          <p:style>
+            <a:lnRef idx="2">
+              <a:schemeClr val="accent1">
+                <a:shade val="50000"/>
+              </a:schemeClr>
+            </a:lnRef>
+            <a:fillRef idx="1">
+              <a:schemeClr val="accent1"/>
+            </a:fillRef>
+            <a:effectRef idx="0">
+              <a:schemeClr val="accent1"/>
+            </a:effectRef>
+            <a:fontRef idx="minor">
+              <a:schemeClr val="lt1"/>
+            </a:fontRef>
+          </p:style>
+          <p:txBody>
+            <a:bodyPr rtlCol="0" anchor="ctr"/>
+            <a:lstStyle/>
+            <a:p>
+              <a:pPr algn="ctr"/>
+              <a:r>
+                <a:rPr lang="en-US" sz="1200" dirty="0" err="1"/>
+                <a:t>ChoiceInput</a:t>
+              </a:r>
+              <a:endParaRPr lang="en-US" sz="1200" dirty="0"/>
+            </a:p>
+          </p:txBody>
+        </p:sp>
+        <p:sp>
+          <p:nvSpPr>
+            <p:cNvPr id="53" name="Rectangle 52">
+              <a:extLst>
+                <a:ext uri="{FF2B5EF4-FFF2-40B4-BE49-F238E27FC236}">
+                  <a16:creationId xmlns:a16="http://schemas.microsoft.com/office/drawing/2014/main" id="{A7C8380B-0E65-476F-A24B-EF49E746D765}"/>
+                </a:ext>
+              </a:extLst>
+            </p:cNvPr>
+            <p:cNvSpPr/>
+            <p:nvPr/>
+          </p:nvSpPr>
+          <p:spPr>
+            <a:xfrm>
+              <a:off x="8039100" y="1943100"/>
+              <a:ext cx="1600200" cy="228600"/>
+            </a:xfrm>
+            <a:prstGeom prst="rect">
+              <a:avLst/>
+            </a:prstGeom>
+            <a:solidFill>
+              <a:schemeClr val="accent5"/>
+            </a:solidFill>
+          </p:spPr>
+          <p:style>
+            <a:lnRef idx="2">
+              <a:schemeClr val="accent1">
+                <a:shade val="50000"/>
+              </a:schemeClr>
+            </a:lnRef>
+            <a:fillRef idx="1">
+              <a:schemeClr val="accent1"/>
+            </a:fillRef>
+            <a:effectRef idx="0">
+              <a:schemeClr val="accent1"/>
+            </a:effectRef>
+            <a:fontRef idx="minor">
+              <a:schemeClr val="lt1"/>
+            </a:fontRef>
+          </p:style>
+          <p:txBody>
+            <a:bodyPr rtlCol="0" anchor="ctr"/>
+            <a:lstStyle/>
+            <a:p>
+              <a:pPr algn="ctr"/>
+              <a:r>
+                <a:rPr lang="en-US" sz="1200" dirty="0" err="1"/>
+                <a:t>ConfirmInput</a:t>
+              </a:r>
+              <a:endParaRPr lang="en-US" sz="1200" dirty="0"/>
+            </a:p>
+          </p:txBody>
+        </p:sp>
+        <p:sp>
+          <p:nvSpPr>
+            <p:cNvPr id="54" name="Rectangle 53">
+              <a:extLst>
+                <a:ext uri="{FF2B5EF4-FFF2-40B4-BE49-F238E27FC236}">
+                  <a16:creationId xmlns:a16="http://schemas.microsoft.com/office/drawing/2014/main" id="{92405AC3-F7E2-4216-8CF4-0E614F4091D3}"/>
+                </a:ext>
+              </a:extLst>
+            </p:cNvPr>
+            <p:cNvSpPr/>
+            <p:nvPr/>
+          </p:nvSpPr>
+          <p:spPr>
+            <a:xfrm>
+              <a:off x="8039100" y="2171700"/>
+              <a:ext cx="1600200" cy="228600"/>
+            </a:xfrm>
+            <a:prstGeom prst="rect">
+              <a:avLst/>
+            </a:prstGeom>
+            <a:solidFill>
+              <a:schemeClr val="accent5"/>
+            </a:solidFill>
+          </p:spPr>
+          <p:style>
+            <a:lnRef idx="2">
+              <a:schemeClr val="accent1">
+                <a:shade val="50000"/>
+              </a:schemeClr>
+            </a:lnRef>
+            <a:fillRef idx="1">
+              <a:schemeClr val="accent1"/>
+            </a:fillRef>
+            <a:effectRef idx="0">
+              <a:schemeClr val="accent1"/>
+            </a:effectRef>
+            <a:fontRef idx="minor">
+              <a:schemeClr val="lt1"/>
+            </a:fontRef>
+          </p:style>
+          <p:txBody>
+            <a:bodyPr rtlCol="0" anchor="ctr"/>
+            <a:lstStyle/>
+            <a:p>
+              <a:pPr algn="ctr"/>
+              <a:r>
+                <a:rPr lang="en-US" sz="1200" dirty="0" err="1"/>
+                <a:t>DateTimeInput</a:t>
+              </a:r>
+              <a:endParaRPr lang="en-US" sz="1200" dirty="0"/>
+            </a:p>
+          </p:txBody>
+        </p:sp>
+        <p:sp>
+          <p:nvSpPr>
+            <p:cNvPr id="55" name="Rectangle 54">
+              <a:extLst>
+                <a:ext uri="{FF2B5EF4-FFF2-40B4-BE49-F238E27FC236}">
+                  <a16:creationId xmlns:a16="http://schemas.microsoft.com/office/drawing/2014/main" id="{AEF25626-E3B8-4A4C-B557-CD3335EF36C0}"/>
+                </a:ext>
+              </a:extLst>
+            </p:cNvPr>
+            <p:cNvSpPr/>
+            <p:nvPr/>
+          </p:nvSpPr>
+          <p:spPr>
+            <a:xfrm>
+              <a:off x="8039100" y="2400300"/>
+              <a:ext cx="1600200" cy="228600"/>
+            </a:xfrm>
+            <a:prstGeom prst="rect">
+              <a:avLst/>
+            </a:prstGeom>
+            <a:solidFill>
+              <a:schemeClr val="accent5"/>
+            </a:solidFill>
+          </p:spPr>
+          <p:style>
+            <a:lnRef idx="2">
+              <a:schemeClr val="accent1">
+                <a:shade val="50000"/>
+              </a:schemeClr>
+            </a:lnRef>
+            <a:fillRef idx="1">
+              <a:schemeClr val="accent1"/>
+            </a:fillRef>
+            <a:effectRef idx="0">
+              <a:schemeClr val="accent1"/>
+            </a:effectRef>
+            <a:fontRef idx="minor">
+              <a:schemeClr val="lt1"/>
+            </a:fontRef>
+          </p:style>
+          <p:txBody>
+            <a:bodyPr rtlCol="0" anchor="ctr"/>
+            <a:lstStyle/>
+            <a:p>
+              <a:pPr algn="ctr"/>
+              <a:r>
+                <a:rPr lang="en-US" sz="1200" dirty="0" err="1"/>
+                <a:t>NumberInput</a:t>
+              </a:r>
+              <a:endParaRPr lang="en-US" sz="1200" dirty="0"/>
+            </a:p>
+          </p:txBody>
+        </p:sp>
+        <p:sp>
+          <p:nvSpPr>
+            <p:cNvPr id="56" name="Rectangle 55">
+              <a:extLst>
+                <a:ext uri="{FF2B5EF4-FFF2-40B4-BE49-F238E27FC236}">
+                  <a16:creationId xmlns:a16="http://schemas.microsoft.com/office/drawing/2014/main" id="{02E1084C-A6D1-4675-90D2-6D3A7D76D4C0}"/>
+                </a:ext>
+              </a:extLst>
+            </p:cNvPr>
+            <p:cNvSpPr/>
+            <p:nvPr/>
+          </p:nvSpPr>
+          <p:spPr>
+            <a:xfrm>
+              <a:off x="8039100" y="2628900"/>
+              <a:ext cx="1600200" cy="228600"/>
+            </a:xfrm>
+            <a:prstGeom prst="rect">
+              <a:avLst/>
+            </a:prstGeom>
+            <a:solidFill>
+              <a:schemeClr val="accent5"/>
+            </a:solidFill>
+          </p:spPr>
+          <p:style>
+            <a:lnRef idx="2">
+              <a:schemeClr val="accent1">
+                <a:shade val="50000"/>
+              </a:schemeClr>
+            </a:lnRef>
+            <a:fillRef idx="1">
+              <a:schemeClr val="accent1"/>
+            </a:fillRef>
+            <a:effectRef idx="0">
+              <a:schemeClr val="accent1"/>
+            </a:effectRef>
+            <a:fontRef idx="minor">
+              <a:schemeClr val="lt1"/>
+            </a:fontRef>
+          </p:style>
+          <p:txBody>
+            <a:bodyPr rtlCol="0" anchor="ctr"/>
+            <a:lstStyle/>
+            <a:p>
+              <a:pPr algn="ctr"/>
+              <a:r>
+                <a:rPr lang="en-US" sz="1200" dirty="0" err="1"/>
+                <a:t>TextInput</a:t>
+              </a:r>
+              <a:endParaRPr lang="en-US" sz="1200" dirty="0"/>
+            </a:p>
+          </p:txBody>
+        </p:sp>
+      </p:grpSp>
+      <p:cxnSp>
+        <p:nvCxnSpPr>
+          <p:cNvPr id="58" name="Connector: Elbow 57">
+            <a:extLst>
+              <a:ext uri="{FF2B5EF4-FFF2-40B4-BE49-F238E27FC236}">
+                <a16:creationId xmlns:a16="http://schemas.microsoft.com/office/drawing/2014/main" id="{E1DDD822-0F34-4B54-B3F3-66E85B6EBCEF}"/>
+              </a:ext>
+            </a:extLst>
+          </p:cNvPr>
+          <p:cNvCxnSpPr>
+            <a:cxnSpLocks/>
+            <a:stCxn id="51" idx="1"/>
+            <a:endCxn id="38" idx="1"/>
+          </p:cNvCxnSpPr>
+          <p:nvPr/>
+        </p:nvCxnSpPr>
+        <p:spPr>
+          <a:xfrm rot="10800000">
+            <a:off x="7696200" y="1200150"/>
+            <a:ext cx="12700" cy="400050"/>
+          </a:xfrm>
+          <a:prstGeom prst="bentConnector3">
+            <a:avLst>
+              <a:gd name="adj1" fmla="val 1800000"/>
+            </a:avLst>
+          </a:prstGeom>
+          <a:ln>
+            <a:tailEnd type="triangle"/>
+          </a:ln>
+        </p:spPr>
+        <p:style>
+          <a:lnRef idx="1">
+            <a:schemeClr val="accent1"/>
+          </a:lnRef>
+          <a:fillRef idx="0">
+            <a:schemeClr val="accent1"/>
+          </a:fillRef>
+          <a:effectRef idx="0">
+            <a:schemeClr val="accent1"/>
+          </a:effectRef>
+          <a:fontRef idx="minor">
+            <a:schemeClr val="tx1"/>
+          </a:fontRef>
+        </p:style>
+      </p:cxnSp>
+      <p:sp>
+        <p:nvSpPr>
+          <p:cNvPr id="74" name="Rectangle 73">
+            <a:extLst>
+              <a:ext uri="{FF2B5EF4-FFF2-40B4-BE49-F238E27FC236}">
+                <a16:creationId xmlns:a16="http://schemas.microsoft.com/office/drawing/2014/main" id="{22F1E850-FFD6-452F-B1C3-505AB8B723D9}"/>
+              </a:ext>
+            </a:extLst>
+          </p:cNvPr>
+          <p:cNvSpPr/>
+          <p:nvPr/>
+        </p:nvSpPr>
+        <p:spPr>
+          <a:xfrm>
+            <a:off x="9867900" y="1028700"/>
+            <a:ext cx="1600200" cy="228600"/>
+          </a:xfrm>
+          <a:prstGeom prst="rect">
+            <a:avLst/>
+          </a:prstGeom>
+          <a:solidFill>
+            <a:schemeClr val="accent5"/>
+          </a:solidFill>
+        </p:spPr>
+        <p:style>
+          <a:lnRef idx="2">
+            <a:schemeClr val="accent1">
+              <a:shade val="50000"/>
+            </a:schemeClr>
+          </a:lnRef>
+          <a:fillRef idx="1">
+            <a:schemeClr val="accent1"/>
+          </a:fillRef>
+          <a:effectRef idx="0">
+            <a:schemeClr val="accent1"/>
+          </a:effectRef>
+          <a:fontRef idx="minor">
+            <a:schemeClr val="lt1"/>
+          </a:fontRef>
+        </p:style>
+        <p:txBody>
+          <a:bodyPr rtlCol="0" anchor="ctr"/>
+          <a:lstStyle/>
+          <a:p>
+            <a:pPr algn="ctr"/>
+            <a:r>
+              <a:rPr lang="en-US" sz="1200" i="1" dirty="0" err="1"/>
+              <a:t>BaseInvokeDialog</a:t>
+            </a:r>
+            <a:endParaRPr lang="en-US" sz="1200" i="1" dirty="0"/>
+          </a:p>
+        </p:txBody>
+      </p:sp>
+      <p:cxnSp>
+        <p:nvCxnSpPr>
+          <p:cNvPr id="76" name="Connector: Elbow 75">
+            <a:extLst>
+              <a:ext uri="{FF2B5EF4-FFF2-40B4-BE49-F238E27FC236}">
+                <a16:creationId xmlns:a16="http://schemas.microsoft.com/office/drawing/2014/main" id="{5FACCD61-614E-452E-94DE-FB557FC73C69}"/>
+              </a:ext>
+            </a:extLst>
+          </p:cNvPr>
+          <p:cNvCxnSpPr>
+            <a:cxnSpLocks/>
+            <a:stCxn id="74" idx="0"/>
+            <a:endCxn id="2" idx="2"/>
+          </p:cNvCxnSpPr>
+          <p:nvPr/>
+        </p:nvCxnSpPr>
+        <p:spPr>
+          <a:xfrm rot="16200000" flipV="1">
+            <a:off x="7524750" y="-2114550"/>
+            <a:ext cx="457200" cy="5829300"/>
+          </a:xfrm>
+          <a:prstGeom prst="bentConnector3">
+            <a:avLst/>
+          </a:prstGeom>
+          <a:ln>
+            <a:tailEnd type="triangle"/>
+          </a:ln>
+        </p:spPr>
+        <p:style>
+          <a:lnRef idx="1">
+            <a:schemeClr val="accent1"/>
+          </a:lnRef>
+          <a:fillRef idx="0">
+            <a:schemeClr val="accent1"/>
+          </a:fillRef>
+          <a:effectRef idx="0">
+            <a:schemeClr val="accent1"/>
+          </a:effectRef>
+          <a:fontRef idx="minor">
+            <a:schemeClr val="tx1"/>
+          </a:fontRef>
+        </p:style>
+      </p:cxnSp>
+      <p:cxnSp>
+        <p:nvCxnSpPr>
+          <p:cNvPr id="80" name="Connector: Elbow 79">
+            <a:extLst>
+              <a:ext uri="{FF2B5EF4-FFF2-40B4-BE49-F238E27FC236}">
+                <a16:creationId xmlns:a16="http://schemas.microsoft.com/office/drawing/2014/main" id="{C9D77B8B-7AD7-495F-8B2A-4FD219A55513}"/>
+              </a:ext>
+            </a:extLst>
+          </p:cNvPr>
+          <p:cNvCxnSpPr>
+            <a:cxnSpLocks/>
+            <a:stCxn id="77" idx="1"/>
+            <a:endCxn id="74" idx="1"/>
+          </p:cNvCxnSpPr>
+          <p:nvPr/>
+        </p:nvCxnSpPr>
+        <p:spPr>
+          <a:xfrm rot="10800000">
+            <a:off x="9867900" y="1143000"/>
+            <a:ext cx="12700" cy="342900"/>
+          </a:xfrm>
+          <a:prstGeom prst="bentConnector3">
+            <a:avLst>
+              <a:gd name="adj1" fmla="val 1800000"/>
+            </a:avLst>
+          </a:prstGeom>
+          <a:ln>
+            <a:tailEnd type="triangle"/>
+          </a:ln>
+        </p:spPr>
+        <p:style>
+          <a:lnRef idx="1">
+            <a:schemeClr val="accent1"/>
+          </a:lnRef>
+          <a:fillRef idx="0">
+            <a:schemeClr val="accent1"/>
+          </a:fillRef>
+          <a:effectRef idx="0">
+            <a:schemeClr val="accent1"/>
+          </a:effectRef>
+          <a:fontRef idx="minor">
+            <a:schemeClr val="tx1"/>
+          </a:fontRef>
+        </p:style>
+      </p:cxnSp>
+      <p:cxnSp>
+        <p:nvCxnSpPr>
+          <p:cNvPr id="90" name="Connector: Elbow 89">
+            <a:extLst>
+              <a:ext uri="{FF2B5EF4-FFF2-40B4-BE49-F238E27FC236}">
+                <a16:creationId xmlns:a16="http://schemas.microsoft.com/office/drawing/2014/main" id="{4D59EB4F-95F5-4B1F-9E0A-0E85635490FE}"/>
+              </a:ext>
+            </a:extLst>
+          </p:cNvPr>
+          <p:cNvCxnSpPr>
+            <a:cxnSpLocks/>
+            <a:stCxn id="81" idx="3"/>
+            <a:endCxn id="2" idx="3"/>
+          </p:cNvCxnSpPr>
+          <p:nvPr/>
+        </p:nvCxnSpPr>
+        <p:spPr>
+          <a:xfrm flipH="1" flipV="1">
+            <a:off x="5638800" y="400050"/>
+            <a:ext cx="5829300" cy="1657350"/>
+          </a:xfrm>
+          <a:prstGeom prst="bentConnector3">
+            <a:avLst>
+              <a:gd name="adj1" fmla="val -3922"/>
+            </a:avLst>
+          </a:prstGeom>
+          <a:ln>
+            <a:tailEnd type="triangle"/>
+          </a:ln>
+        </p:spPr>
+        <p:style>
+          <a:lnRef idx="1">
+            <a:schemeClr val="accent1"/>
+          </a:lnRef>
+          <a:fillRef idx="0">
+            <a:schemeClr val="accent1"/>
+          </a:fillRef>
+          <a:effectRef idx="0">
+            <a:schemeClr val="accent1"/>
+          </a:effectRef>
+          <a:fontRef idx="minor">
+            <a:schemeClr val="tx1"/>
+          </a:fontRef>
+        </p:style>
+      </p:cxnSp>
+      <p:grpSp>
+        <p:nvGrpSpPr>
+          <p:cNvPr id="170" name="Group 169">
+            <a:extLst>
+              <a:ext uri="{FF2B5EF4-FFF2-40B4-BE49-F238E27FC236}">
+                <a16:creationId xmlns:a16="http://schemas.microsoft.com/office/drawing/2014/main" id="{65A22A66-8565-4EAC-8A04-064E8294A02E}"/>
+              </a:ext>
+            </a:extLst>
+          </p:cNvPr>
+          <p:cNvGrpSpPr/>
+          <p:nvPr/>
+        </p:nvGrpSpPr>
+        <p:grpSpPr>
+          <a:xfrm>
+            <a:off x="9867900" y="1371600"/>
+            <a:ext cx="1600200" cy="457200"/>
+            <a:chOff x="10096500" y="1371600"/>
+            <a:chExt cx="1600200" cy="457200"/>
+          </a:xfrm>
+        </p:grpSpPr>
+        <p:sp>
+          <p:nvSpPr>
+            <p:cNvPr id="77" name="Rectangle 76">
+              <a:extLst>
+                <a:ext uri="{FF2B5EF4-FFF2-40B4-BE49-F238E27FC236}">
+                  <a16:creationId xmlns:a16="http://schemas.microsoft.com/office/drawing/2014/main" id="{C166C85A-BEAF-49FA-A673-7FF2930AE04E}"/>
+                </a:ext>
+              </a:extLst>
+            </p:cNvPr>
+            <p:cNvSpPr/>
+            <p:nvPr/>
+          </p:nvSpPr>
+          <p:spPr>
+            <a:xfrm>
+              <a:off x="10096500" y="1371600"/>
+              <a:ext cx="1600200" cy="228600"/>
+            </a:xfrm>
+            <a:prstGeom prst="rect">
+              <a:avLst/>
+            </a:prstGeom>
+            <a:solidFill>
+              <a:schemeClr val="accent5"/>
+            </a:solidFill>
+          </p:spPr>
+          <p:style>
+            <a:lnRef idx="2">
+              <a:schemeClr val="accent1">
+                <a:shade val="50000"/>
+              </a:schemeClr>
+            </a:lnRef>
+            <a:fillRef idx="1">
+              <a:schemeClr val="accent1"/>
+            </a:fillRef>
+            <a:effectRef idx="0">
+              <a:schemeClr val="accent1"/>
+            </a:effectRef>
+            <a:fontRef idx="minor">
+              <a:schemeClr val="lt1"/>
+            </a:fontRef>
+          </p:style>
+          <p:txBody>
+            <a:bodyPr rtlCol="0" anchor="ctr"/>
+            <a:lstStyle/>
+            <a:p>
+              <a:pPr algn="ctr"/>
+              <a:r>
+                <a:rPr lang="en-US" sz="1200" dirty="0" err="1"/>
+                <a:t>BeginDialog</a:t>
+              </a:r>
+              <a:endParaRPr lang="en-US" sz="1200" dirty="0"/>
+            </a:p>
+          </p:txBody>
+        </p:sp>
+        <p:sp>
+          <p:nvSpPr>
+            <p:cNvPr id="114" name="Rectangle 113">
+              <a:extLst>
+                <a:ext uri="{FF2B5EF4-FFF2-40B4-BE49-F238E27FC236}">
+                  <a16:creationId xmlns:a16="http://schemas.microsoft.com/office/drawing/2014/main" id="{22712A93-B115-4890-B025-6317EE86F79E}"/>
+                </a:ext>
+              </a:extLst>
+            </p:cNvPr>
+            <p:cNvSpPr/>
+            <p:nvPr/>
+          </p:nvSpPr>
+          <p:spPr>
+            <a:xfrm>
+              <a:off x="10096500" y="1600200"/>
+              <a:ext cx="1600200" cy="228600"/>
+            </a:xfrm>
+            <a:prstGeom prst="rect">
+              <a:avLst/>
+            </a:prstGeom>
+            <a:solidFill>
+              <a:schemeClr val="accent5"/>
+            </a:solidFill>
+          </p:spPr>
+          <p:style>
+            <a:lnRef idx="2">
+              <a:schemeClr val="accent1">
+                <a:shade val="50000"/>
+              </a:schemeClr>
+            </a:lnRef>
+            <a:fillRef idx="1">
+              <a:schemeClr val="accent1"/>
+            </a:fillRef>
+            <a:effectRef idx="0">
+              <a:schemeClr val="accent1"/>
+            </a:effectRef>
+            <a:fontRef idx="minor">
+              <a:schemeClr val="lt1"/>
+            </a:fontRef>
+          </p:style>
+          <p:txBody>
+            <a:bodyPr rtlCol="0" anchor="ctr"/>
+            <a:lstStyle/>
+            <a:p>
+              <a:pPr algn="ctr"/>
+              <a:r>
+                <a:rPr lang="en-US" sz="1200" dirty="0" err="1"/>
+                <a:t>ReplaceDialog</a:t>
+              </a:r>
+              <a:endParaRPr lang="en-US" sz="1200" dirty="0"/>
+            </a:p>
+          </p:txBody>
+        </p:sp>
+      </p:grpSp>
+      <p:grpSp>
+        <p:nvGrpSpPr>
+          <p:cNvPr id="169" name="Group 168">
+            <a:extLst>
+              <a:ext uri="{FF2B5EF4-FFF2-40B4-BE49-F238E27FC236}">
+                <a16:creationId xmlns:a16="http://schemas.microsoft.com/office/drawing/2014/main" id="{E8B09F2E-7394-4C6B-96B4-57605AF3DE83}"/>
+              </a:ext>
+            </a:extLst>
+          </p:cNvPr>
+          <p:cNvGrpSpPr/>
+          <p:nvPr/>
+        </p:nvGrpSpPr>
+        <p:grpSpPr>
+          <a:xfrm>
+            <a:off x="9867900" y="1943100"/>
+            <a:ext cx="1600200" cy="4572000"/>
+            <a:chOff x="10096500" y="1943100"/>
+            <a:chExt cx="1600200" cy="4572000"/>
+          </a:xfrm>
+        </p:grpSpPr>
+        <p:sp>
+          <p:nvSpPr>
+            <p:cNvPr id="81" name="Rectangle 80">
+              <a:extLst>
+                <a:ext uri="{FF2B5EF4-FFF2-40B4-BE49-F238E27FC236}">
+                  <a16:creationId xmlns:a16="http://schemas.microsoft.com/office/drawing/2014/main" id="{2E4CE3C2-873D-4982-808A-B845C17522E4}"/>
+                </a:ext>
+              </a:extLst>
+            </p:cNvPr>
+            <p:cNvSpPr/>
+            <p:nvPr/>
+          </p:nvSpPr>
+          <p:spPr>
+            <a:xfrm>
+              <a:off x="10096500" y="1943100"/>
+              <a:ext cx="1600200" cy="228600"/>
+            </a:xfrm>
+            <a:prstGeom prst="rect">
+              <a:avLst/>
+            </a:prstGeom>
+            <a:solidFill>
+              <a:schemeClr val="accent5"/>
+            </a:solidFill>
+          </p:spPr>
+          <p:style>
+            <a:lnRef idx="2">
+              <a:schemeClr val="accent1">
+                <a:shade val="50000"/>
+              </a:schemeClr>
+            </a:lnRef>
+            <a:fillRef idx="1">
+              <a:schemeClr val="accent1"/>
+            </a:fillRef>
+            <a:effectRef idx="0">
+              <a:schemeClr val="accent1"/>
+            </a:effectRef>
+            <a:fontRef idx="minor">
+              <a:schemeClr val="lt1"/>
+            </a:fontRef>
+          </p:style>
+          <p:txBody>
+            <a:bodyPr rtlCol="0" anchor="ctr"/>
+            <a:lstStyle/>
+            <a:p>
+              <a:pPr algn="ctr"/>
+              <a:r>
+                <a:rPr lang="en-US" sz="1200" dirty="0" err="1"/>
+                <a:t>CancelAllDialogs</a:t>
+              </a:r>
+              <a:endParaRPr lang="en-US" sz="1200" dirty="0"/>
+            </a:p>
+          </p:txBody>
+        </p:sp>
+        <p:sp>
+          <p:nvSpPr>
+            <p:cNvPr id="82" name="Rectangle 81">
+              <a:extLst>
+                <a:ext uri="{FF2B5EF4-FFF2-40B4-BE49-F238E27FC236}">
+                  <a16:creationId xmlns:a16="http://schemas.microsoft.com/office/drawing/2014/main" id="{96F987CC-3E43-4FA1-B126-4C8352DDB56C}"/>
+                </a:ext>
+              </a:extLst>
+            </p:cNvPr>
+            <p:cNvSpPr/>
+            <p:nvPr/>
+          </p:nvSpPr>
+          <p:spPr>
+            <a:xfrm>
+              <a:off x="10096500" y="2171700"/>
+              <a:ext cx="1600200" cy="228600"/>
+            </a:xfrm>
+            <a:prstGeom prst="rect">
+              <a:avLst/>
+            </a:prstGeom>
+            <a:solidFill>
+              <a:schemeClr val="accent5"/>
+            </a:solidFill>
+          </p:spPr>
+          <p:style>
+            <a:lnRef idx="2">
+              <a:schemeClr val="accent1">
+                <a:shade val="50000"/>
+              </a:schemeClr>
+            </a:lnRef>
+            <a:fillRef idx="1">
+              <a:schemeClr val="accent1"/>
+            </a:fillRef>
+            <a:effectRef idx="0">
+              <a:schemeClr val="accent1"/>
+            </a:effectRef>
+            <a:fontRef idx="minor">
+              <a:schemeClr val="lt1"/>
+            </a:fontRef>
+          </p:style>
+          <p:txBody>
+            <a:bodyPr rtlCol="0" anchor="ctr"/>
+            <a:lstStyle/>
+            <a:p>
+              <a:pPr algn="ctr"/>
+              <a:r>
+                <a:rPr lang="en-US" sz="1200" dirty="0" err="1"/>
+                <a:t>CodeAction</a:t>
+              </a:r>
+              <a:endParaRPr lang="en-US" sz="1200" dirty="0"/>
+            </a:p>
+          </p:txBody>
+        </p:sp>
+        <p:sp>
+          <p:nvSpPr>
+            <p:cNvPr id="83" name="Rectangle 82">
+              <a:extLst>
+                <a:ext uri="{FF2B5EF4-FFF2-40B4-BE49-F238E27FC236}">
+                  <a16:creationId xmlns:a16="http://schemas.microsoft.com/office/drawing/2014/main" id="{F3A3C692-8892-429D-AE99-DCAC94605614}"/>
+                </a:ext>
+              </a:extLst>
+            </p:cNvPr>
+            <p:cNvSpPr/>
+            <p:nvPr/>
+          </p:nvSpPr>
+          <p:spPr>
+            <a:xfrm>
+              <a:off x="10096500" y="2400300"/>
+              <a:ext cx="1600200" cy="228600"/>
+            </a:xfrm>
+            <a:prstGeom prst="rect">
+              <a:avLst/>
+            </a:prstGeom>
+            <a:solidFill>
+              <a:schemeClr val="accent5"/>
+            </a:solidFill>
+          </p:spPr>
+          <p:style>
+            <a:lnRef idx="2">
+              <a:schemeClr val="accent1">
+                <a:shade val="50000"/>
+              </a:schemeClr>
+            </a:lnRef>
+            <a:fillRef idx="1">
+              <a:schemeClr val="accent1"/>
+            </a:fillRef>
+            <a:effectRef idx="0">
+              <a:schemeClr val="accent1"/>
+            </a:effectRef>
+            <a:fontRef idx="minor">
+              <a:schemeClr val="lt1"/>
+            </a:fontRef>
+          </p:style>
+          <p:txBody>
+            <a:bodyPr rtlCol="0" anchor="ctr"/>
+            <a:lstStyle/>
+            <a:p>
+              <a:pPr algn="ctr"/>
+              <a:r>
+                <a:rPr lang="en-US" sz="1200" dirty="0" err="1"/>
+                <a:t>DebugBreak</a:t>
+              </a:r>
+              <a:endParaRPr lang="en-US" sz="1200" dirty="0"/>
+            </a:p>
+          </p:txBody>
+        </p:sp>
+        <p:sp>
+          <p:nvSpPr>
+            <p:cNvPr id="84" name="Rectangle 83">
+              <a:extLst>
+                <a:ext uri="{FF2B5EF4-FFF2-40B4-BE49-F238E27FC236}">
+                  <a16:creationId xmlns:a16="http://schemas.microsoft.com/office/drawing/2014/main" id="{F5B72F66-2F41-4029-AED4-A589CB14C478}"/>
+                </a:ext>
+              </a:extLst>
+            </p:cNvPr>
+            <p:cNvSpPr/>
+            <p:nvPr/>
+          </p:nvSpPr>
+          <p:spPr>
+            <a:xfrm>
+              <a:off x="10096500" y="2628900"/>
+              <a:ext cx="1600200" cy="228600"/>
+            </a:xfrm>
+            <a:prstGeom prst="rect">
+              <a:avLst/>
+            </a:prstGeom>
+            <a:solidFill>
+              <a:schemeClr val="accent5"/>
+            </a:solidFill>
+          </p:spPr>
+          <p:style>
+            <a:lnRef idx="2">
+              <a:schemeClr val="accent1">
+                <a:shade val="50000"/>
+              </a:schemeClr>
+            </a:lnRef>
+            <a:fillRef idx="1">
+              <a:schemeClr val="accent1"/>
+            </a:fillRef>
+            <a:effectRef idx="0">
+              <a:schemeClr val="accent1"/>
+            </a:effectRef>
+            <a:fontRef idx="minor">
+              <a:schemeClr val="lt1"/>
+            </a:fontRef>
+          </p:style>
+          <p:txBody>
+            <a:bodyPr rtlCol="0" anchor="ctr"/>
+            <a:lstStyle/>
+            <a:p>
+              <a:pPr algn="ctr"/>
+              <a:r>
+                <a:rPr lang="en-US" sz="1200" dirty="0" err="1"/>
+                <a:t>DeleteProperty</a:t>
+              </a:r>
+              <a:endParaRPr lang="en-US" sz="1200" dirty="0"/>
+            </a:p>
+          </p:txBody>
+        </p:sp>
+        <p:sp>
+          <p:nvSpPr>
+            <p:cNvPr id="85" name="Rectangle 84">
+              <a:extLst>
+                <a:ext uri="{FF2B5EF4-FFF2-40B4-BE49-F238E27FC236}">
+                  <a16:creationId xmlns:a16="http://schemas.microsoft.com/office/drawing/2014/main" id="{0BD5D55F-C5E7-4553-BD81-27E1D69ECC38}"/>
+                </a:ext>
+              </a:extLst>
+            </p:cNvPr>
+            <p:cNvSpPr/>
+            <p:nvPr/>
+          </p:nvSpPr>
+          <p:spPr>
+            <a:xfrm>
+              <a:off x="10096500" y="2857500"/>
+              <a:ext cx="1600200" cy="228600"/>
+            </a:xfrm>
+            <a:prstGeom prst="rect">
+              <a:avLst/>
+            </a:prstGeom>
+            <a:solidFill>
+              <a:schemeClr val="accent5"/>
+            </a:solidFill>
+          </p:spPr>
+          <p:style>
+            <a:lnRef idx="2">
+              <a:schemeClr val="accent1">
+                <a:shade val="50000"/>
+              </a:schemeClr>
+            </a:lnRef>
+            <a:fillRef idx="1">
+              <a:schemeClr val="accent1"/>
+            </a:fillRef>
+            <a:effectRef idx="0">
+              <a:schemeClr val="accent1"/>
+            </a:effectRef>
+            <a:fontRef idx="minor">
+              <a:schemeClr val="lt1"/>
+            </a:fontRef>
+          </p:style>
+          <p:txBody>
+            <a:bodyPr rtlCol="0" anchor="ctr"/>
+            <a:lstStyle/>
+            <a:p>
+              <a:pPr algn="ctr"/>
+              <a:r>
+                <a:rPr lang="en-US" sz="1200" dirty="0" err="1"/>
+                <a:t>EditActions</a:t>
+              </a:r>
+              <a:endParaRPr lang="en-US" sz="1200" dirty="0"/>
+            </a:p>
+          </p:txBody>
+        </p:sp>
+        <p:sp>
+          <p:nvSpPr>
+            <p:cNvPr id="99" name="Rectangle 98">
+              <a:extLst>
+                <a:ext uri="{FF2B5EF4-FFF2-40B4-BE49-F238E27FC236}">
+                  <a16:creationId xmlns:a16="http://schemas.microsoft.com/office/drawing/2014/main" id="{90A14FFC-F044-4A2D-8D25-602CDFF1A125}"/>
+                </a:ext>
+              </a:extLst>
+            </p:cNvPr>
+            <p:cNvSpPr/>
+            <p:nvPr/>
+          </p:nvSpPr>
+          <p:spPr>
+            <a:xfrm>
+              <a:off x="10096500" y="3086100"/>
+              <a:ext cx="1600200" cy="228600"/>
+            </a:xfrm>
+            <a:prstGeom prst="rect">
+              <a:avLst/>
+            </a:prstGeom>
+            <a:solidFill>
+              <a:schemeClr val="accent5"/>
+            </a:solidFill>
+          </p:spPr>
+          <p:style>
+            <a:lnRef idx="2">
+              <a:schemeClr val="accent1">
+                <a:shade val="50000"/>
+              </a:schemeClr>
+            </a:lnRef>
+            <a:fillRef idx="1">
+              <a:schemeClr val="accent1"/>
+            </a:fillRef>
+            <a:effectRef idx="0">
+              <a:schemeClr val="accent1"/>
+            </a:effectRef>
+            <a:fontRef idx="minor">
+              <a:schemeClr val="lt1"/>
+            </a:fontRef>
+          </p:style>
+          <p:txBody>
+            <a:bodyPr rtlCol="0" anchor="ctr"/>
+            <a:lstStyle/>
+            <a:p>
+              <a:pPr algn="ctr"/>
+              <a:r>
+                <a:rPr lang="en-US" sz="1200" dirty="0" err="1"/>
+                <a:t>EditArray</a:t>
+              </a:r>
+              <a:endParaRPr lang="en-US" sz="1200" dirty="0"/>
+            </a:p>
+          </p:txBody>
+        </p:sp>
+        <p:sp>
+          <p:nvSpPr>
+            <p:cNvPr id="102" name="Rectangle 101">
+              <a:extLst>
+                <a:ext uri="{FF2B5EF4-FFF2-40B4-BE49-F238E27FC236}">
+                  <a16:creationId xmlns:a16="http://schemas.microsoft.com/office/drawing/2014/main" id="{085A0E81-125D-486F-9D58-B8C5FB1E14D2}"/>
+                </a:ext>
+              </a:extLst>
+            </p:cNvPr>
+            <p:cNvSpPr/>
+            <p:nvPr/>
+          </p:nvSpPr>
+          <p:spPr>
+            <a:xfrm>
+              <a:off x="10096500" y="3314700"/>
+              <a:ext cx="1600200" cy="228600"/>
+            </a:xfrm>
+            <a:prstGeom prst="rect">
+              <a:avLst/>
+            </a:prstGeom>
+            <a:solidFill>
+              <a:schemeClr val="accent5"/>
+            </a:solidFill>
+          </p:spPr>
+          <p:style>
+            <a:lnRef idx="2">
+              <a:schemeClr val="accent1">
+                <a:shade val="50000"/>
+              </a:schemeClr>
+            </a:lnRef>
+            <a:fillRef idx="1">
+              <a:schemeClr val="accent1"/>
+            </a:fillRef>
+            <a:effectRef idx="0">
+              <a:schemeClr val="accent1"/>
+            </a:effectRef>
+            <a:fontRef idx="minor">
+              <a:schemeClr val="lt1"/>
+            </a:fontRef>
+          </p:style>
+          <p:txBody>
+            <a:bodyPr rtlCol="0" anchor="ctr"/>
+            <a:lstStyle/>
+            <a:p>
+              <a:pPr algn="ctr"/>
+              <a:r>
+                <a:rPr lang="en-US" sz="1200" dirty="0" err="1"/>
+                <a:t>EmitEvent</a:t>
+              </a:r>
+              <a:endParaRPr lang="en-US" sz="1200" dirty="0"/>
+            </a:p>
+          </p:txBody>
+        </p:sp>
+        <p:sp>
+          <p:nvSpPr>
+            <p:cNvPr id="103" name="Rectangle 102">
+              <a:extLst>
+                <a:ext uri="{FF2B5EF4-FFF2-40B4-BE49-F238E27FC236}">
+                  <a16:creationId xmlns:a16="http://schemas.microsoft.com/office/drawing/2014/main" id="{1F387030-9BBC-4AAB-9384-97C9EEEBA062}"/>
+                </a:ext>
+              </a:extLst>
+            </p:cNvPr>
+            <p:cNvSpPr/>
+            <p:nvPr/>
+          </p:nvSpPr>
+          <p:spPr>
+            <a:xfrm>
+              <a:off x="10096500" y="3543300"/>
+              <a:ext cx="1600200" cy="228600"/>
+            </a:xfrm>
+            <a:prstGeom prst="rect">
+              <a:avLst/>
+            </a:prstGeom>
+            <a:solidFill>
+              <a:schemeClr val="accent5"/>
+            </a:solidFill>
+          </p:spPr>
+          <p:style>
+            <a:lnRef idx="2">
+              <a:schemeClr val="accent1">
+                <a:shade val="50000"/>
+              </a:schemeClr>
+            </a:lnRef>
+            <a:fillRef idx="1">
+              <a:schemeClr val="accent1"/>
+            </a:fillRef>
+            <a:effectRef idx="0">
+              <a:schemeClr val="accent1"/>
+            </a:effectRef>
+            <a:fontRef idx="minor">
+              <a:schemeClr val="lt1"/>
+            </a:fontRef>
+          </p:style>
+          <p:txBody>
+            <a:bodyPr rtlCol="0" anchor="ctr"/>
+            <a:lstStyle/>
+            <a:p>
+              <a:pPr algn="ctr"/>
+              <a:r>
+                <a:rPr lang="en-US" sz="1200" dirty="0" err="1"/>
+                <a:t>EndDialog</a:t>
+              </a:r>
+              <a:endParaRPr lang="en-US" sz="1200" dirty="0"/>
+            </a:p>
+          </p:txBody>
+        </p:sp>
+        <p:sp>
+          <p:nvSpPr>
+            <p:cNvPr id="104" name="Rectangle 103">
+              <a:extLst>
+                <a:ext uri="{FF2B5EF4-FFF2-40B4-BE49-F238E27FC236}">
+                  <a16:creationId xmlns:a16="http://schemas.microsoft.com/office/drawing/2014/main" id="{456B9A4D-E6F3-492B-ADC6-020865A9280F}"/>
+                </a:ext>
+              </a:extLst>
+            </p:cNvPr>
+            <p:cNvSpPr/>
+            <p:nvPr/>
+          </p:nvSpPr>
+          <p:spPr>
+            <a:xfrm>
+              <a:off x="10096500" y="3771900"/>
+              <a:ext cx="1600200" cy="228600"/>
+            </a:xfrm>
+            <a:prstGeom prst="rect">
+              <a:avLst/>
+            </a:prstGeom>
+            <a:solidFill>
+              <a:schemeClr val="accent5"/>
+            </a:solidFill>
+          </p:spPr>
+          <p:style>
+            <a:lnRef idx="2">
+              <a:schemeClr val="accent1">
+                <a:shade val="50000"/>
+              </a:schemeClr>
+            </a:lnRef>
+            <a:fillRef idx="1">
+              <a:schemeClr val="accent1"/>
+            </a:fillRef>
+            <a:effectRef idx="0">
+              <a:schemeClr val="accent1"/>
+            </a:effectRef>
+            <a:fontRef idx="minor">
+              <a:schemeClr val="lt1"/>
+            </a:fontRef>
+          </p:style>
+          <p:txBody>
+            <a:bodyPr rtlCol="0" anchor="ctr"/>
+            <a:lstStyle/>
+            <a:p>
+              <a:pPr algn="ctr"/>
+              <a:r>
+                <a:rPr lang="en-US" sz="1200" dirty="0" err="1"/>
+                <a:t>EndTurn</a:t>
+              </a:r>
+              <a:endParaRPr lang="en-US" sz="1200" dirty="0"/>
+            </a:p>
+          </p:txBody>
+        </p:sp>
+        <p:sp>
+          <p:nvSpPr>
+            <p:cNvPr id="106" name="Rectangle 105">
+              <a:extLst>
+                <a:ext uri="{FF2B5EF4-FFF2-40B4-BE49-F238E27FC236}">
+                  <a16:creationId xmlns:a16="http://schemas.microsoft.com/office/drawing/2014/main" id="{142156A5-F6BA-4F26-89B8-6DC0DF75211F}"/>
+                </a:ext>
+              </a:extLst>
+            </p:cNvPr>
+            <p:cNvSpPr/>
+            <p:nvPr/>
+          </p:nvSpPr>
+          <p:spPr>
+            <a:xfrm>
+              <a:off x="10096500" y="4000500"/>
+              <a:ext cx="1600200" cy="228600"/>
+            </a:xfrm>
+            <a:prstGeom prst="rect">
+              <a:avLst/>
+            </a:prstGeom>
+            <a:solidFill>
+              <a:schemeClr val="accent5"/>
+            </a:solidFill>
+          </p:spPr>
+          <p:style>
+            <a:lnRef idx="2">
+              <a:schemeClr val="accent1">
+                <a:shade val="50000"/>
+              </a:schemeClr>
+            </a:lnRef>
+            <a:fillRef idx="1">
+              <a:schemeClr val="accent1"/>
+            </a:fillRef>
+            <a:effectRef idx="0">
+              <a:schemeClr val="accent1"/>
+            </a:effectRef>
+            <a:fontRef idx="minor">
+              <a:schemeClr val="lt1"/>
+            </a:fontRef>
+          </p:style>
+          <p:txBody>
+            <a:bodyPr rtlCol="0" anchor="ctr"/>
+            <a:lstStyle/>
+            <a:p>
+              <a:pPr algn="ctr"/>
+              <a:r>
+                <a:rPr lang="en-US" sz="1200" dirty="0"/>
+                <a:t>Foreach</a:t>
+              </a:r>
+            </a:p>
+          </p:txBody>
+        </p:sp>
+        <p:sp>
+          <p:nvSpPr>
+            <p:cNvPr id="107" name="Rectangle 106">
+              <a:extLst>
+                <a:ext uri="{FF2B5EF4-FFF2-40B4-BE49-F238E27FC236}">
+                  <a16:creationId xmlns:a16="http://schemas.microsoft.com/office/drawing/2014/main" id="{8B73EE16-0245-4693-AF1E-11F76917BE3A}"/>
+                </a:ext>
+              </a:extLst>
+            </p:cNvPr>
+            <p:cNvSpPr/>
+            <p:nvPr/>
+          </p:nvSpPr>
+          <p:spPr>
+            <a:xfrm>
+              <a:off x="10096500" y="4229100"/>
+              <a:ext cx="1600200" cy="228600"/>
+            </a:xfrm>
+            <a:prstGeom prst="rect">
+              <a:avLst/>
+            </a:prstGeom>
+            <a:solidFill>
+              <a:schemeClr val="accent5"/>
+            </a:solidFill>
+          </p:spPr>
+          <p:style>
+            <a:lnRef idx="2">
+              <a:schemeClr val="accent1">
+                <a:shade val="50000"/>
+              </a:schemeClr>
+            </a:lnRef>
+            <a:fillRef idx="1">
+              <a:schemeClr val="accent1"/>
+            </a:fillRef>
+            <a:effectRef idx="0">
+              <a:schemeClr val="accent1"/>
+            </a:effectRef>
+            <a:fontRef idx="minor">
+              <a:schemeClr val="lt1"/>
+            </a:fontRef>
+          </p:style>
+          <p:txBody>
+            <a:bodyPr rtlCol="0" anchor="ctr"/>
+            <a:lstStyle/>
+            <a:p>
+              <a:pPr algn="ctr"/>
+              <a:r>
+                <a:rPr lang="en-US" sz="1200" dirty="0" err="1"/>
+                <a:t>ForeachPage</a:t>
+              </a:r>
+              <a:endParaRPr lang="en-US" sz="1200" dirty="0"/>
+            </a:p>
+          </p:txBody>
+        </p:sp>
+        <p:sp>
+          <p:nvSpPr>
+            <p:cNvPr id="108" name="Rectangle 107">
+              <a:extLst>
+                <a:ext uri="{FF2B5EF4-FFF2-40B4-BE49-F238E27FC236}">
+                  <a16:creationId xmlns:a16="http://schemas.microsoft.com/office/drawing/2014/main" id="{9B3E4C64-DB31-40FD-8CD1-128A03511C47}"/>
+                </a:ext>
+              </a:extLst>
+            </p:cNvPr>
+            <p:cNvSpPr/>
+            <p:nvPr/>
+          </p:nvSpPr>
+          <p:spPr>
+            <a:xfrm>
+              <a:off x="10096500" y="4457700"/>
+              <a:ext cx="1600200" cy="228600"/>
+            </a:xfrm>
+            <a:prstGeom prst="rect">
+              <a:avLst/>
+            </a:prstGeom>
+            <a:solidFill>
+              <a:schemeClr val="accent5"/>
+            </a:solidFill>
+          </p:spPr>
+          <p:style>
+            <a:lnRef idx="2">
+              <a:schemeClr val="accent1">
+                <a:shade val="50000"/>
+              </a:schemeClr>
+            </a:lnRef>
+            <a:fillRef idx="1">
+              <a:schemeClr val="accent1"/>
+            </a:fillRef>
+            <a:effectRef idx="0">
+              <a:schemeClr val="accent1"/>
+            </a:effectRef>
+            <a:fontRef idx="minor">
+              <a:schemeClr val="lt1"/>
+            </a:fontRef>
+          </p:style>
+          <p:txBody>
+            <a:bodyPr rtlCol="0" anchor="ctr"/>
+            <a:lstStyle/>
+            <a:p>
+              <a:pPr algn="ctr"/>
+              <a:r>
+                <a:rPr lang="en-US" sz="1200" dirty="0" err="1"/>
+                <a:t>HttpRequest</a:t>
+              </a:r>
+              <a:endParaRPr lang="en-US" sz="1200" dirty="0"/>
+            </a:p>
+          </p:txBody>
+        </p:sp>
+        <p:sp>
+          <p:nvSpPr>
+            <p:cNvPr id="109" name="Rectangle 108">
+              <a:extLst>
+                <a:ext uri="{FF2B5EF4-FFF2-40B4-BE49-F238E27FC236}">
+                  <a16:creationId xmlns:a16="http://schemas.microsoft.com/office/drawing/2014/main" id="{714E4E12-8DD8-42DF-B508-996C866F767B}"/>
+                </a:ext>
+              </a:extLst>
+            </p:cNvPr>
+            <p:cNvSpPr/>
+            <p:nvPr/>
+          </p:nvSpPr>
+          <p:spPr>
+            <a:xfrm>
+              <a:off x="10096500" y="4686300"/>
+              <a:ext cx="1600200" cy="228600"/>
+            </a:xfrm>
+            <a:prstGeom prst="rect">
+              <a:avLst/>
+            </a:prstGeom>
+            <a:solidFill>
+              <a:schemeClr val="accent5"/>
+            </a:solidFill>
+          </p:spPr>
+          <p:style>
+            <a:lnRef idx="2">
+              <a:schemeClr val="accent1">
+                <a:shade val="50000"/>
+              </a:schemeClr>
+            </a:lnRef>
+            <a:fillRef idx="1">
+              <a:schemeClr val="accent1"/>
+            </a:fillRef>
+            <a:effectRef idx="0">
+              <a:schemeClr val="accent1"/>
+            </a:effectRef>
+            <a:fontRef idx="minor">
+              <a:schemeClr val="lt1"/>
+            </a:fontRef>
+          </p:style>
+          <p:txBody>
+            <a:bodyPr rtlCol="0" anchor="ctr"/>
+            <a:lstStyle/>
+            <a:p>
+              <a:pPr algn="ctr"/>
+              <a:r>
+                <a:rPr lang="en-US" sz="1200" dirty="0" err="1"/>
+                <a:t>IfCondition</a:t>
+              </a:r>
+              <a:endParaRPr lang="en-US" sz="1200" dirty="0"/>
+            </a:p>
+          </p:txBody>
+        </p:sp>
+        <p:sp>
+          <p:nvSpPr>
+            <p:cNvPr id="110" name="Rectangle 109">
+              <a:extLst>
+                <a:ext uri="{FF2B5EF4-FFF2-40B4-BE49-F238E27FC236}">
+                  <a16:creationId xmlns:a16="http://schemas.microsoft.com/office/drawing/2014/main" id="{5B582BE4-E8B5-4340-8766-47768D5337F7}"/>
+                </a:ext>
+              </a:extLst>
+            </p:cNvPr>
+            <p:cNvSpPr/>
+            <p:nvPr/>
+          </p:nvSpPr>
+          <p:spPr>
+            <a:xfrm>
+              <a:off x="10096500" y="4914900"/>
+              <a:ext cx="1600200" cy="228600"/>
+            </a:xfrm>
+            <a:prstGeom prst="rect">
+              <a:avLst/>
+            </a:prstGeom>
+            <a:solidFill>
+              <a:schemeClr val="accent5"/>
+            </a:solidFill>
+          </p:spPr>
+          <p:style>
+            <a:lnRef idx="2">
+              <a:schemeClr val="accent1">
+                <a:shade val="50000"/>
+              </a:schemeClr>
+            </a:lnRef>
+            <a:fillRef idx="1">
+              <a:schemeClr val="accent1"/>
+            </a:fillRef>
+            <a:effectRef idx="0">
+              <a:schemeClr val="accent1"/>
+            </a:effectRef>
+            <a:fontRef idx="minor">
+              <a:schemeClr val="lt1"/>
+            </a:fontRef>
+          </p:style>
+          <p:txBody>
+            <a:bodyPr rtlCol="0" anchor="ctr"/>
+            <a:lstStyle/>
+            <a:p>
+              <a:pPr algn="ctr"/>
+              <a:r>
+                <a:rPr lang="en-US" sz="1200" dirty="0" err="1"/>
+                <a:t>InitProperty</a:t>
+              </a:r>
+              <a:endParaRPr lang="en-US" sz="1200" dirty="0"/>
+            </a:p>
+          </p:txBody>
+        </p:sp>
+        <p:sp>
+          <p:nvSpPr>
+            <p:cNvPr id="111" name="Rectangle 110">
+              <a:extLst>
+                <a:ext uri="{FF2B5EF4-FFF2-40B4-BE49-F238E27FC236}">
+                  <a16:creationId xmlns:a16="http://schemas.microsoft.com/office/drawing/2014/main" id="{961C4812-0A27-4430-AD37-72A5950F50FC}"/>
+                </a:ext>
+              </a:extLst>
+            </p:cNvPr>
+            <p:cNvSpPr/>
+            <p:nvPr/>
+          </p:nvSpPr>
+          <p:spPr>
+            <a:xfrm>
+              <a:off x="10096500" y="5143500"/>
+              <a:ext cx="1600200" cy="228600"/>
+            </a:xfrm>
+            <a:prstGeom prst="rect">
+              <a:avLst/>
+            </a:prstGeom>
+            <a:solidFill>
+              <a:schemeClr val="accent5"/>
+            </a:solidFill>
+          </p:spPr>
+          <p:style>
+            <a:lnRef idx="2">
+              <a:schemeClr val="accent1">
+                <a:shade val="50000"/>
+              </a:schemeClr>
+            </a:lnRef>
+            <a:fillRef idx="1">
+              <a:schemeClr val="accent1"/>
+            </a:fillRef>
+            <a:effectRef idx="0">
+              <a:schemeClr val="accent1"/>
+            </a:effectRef>
+            <a:fontRef idx="minor">
+              <a:schemeClr val="lt1"/>
+            </a:fontRef>
+          </p:style>
+          <p:txBody>
+            <a:bodyPr rtlCol="0" anchor="ctr"/>
+            <a:lstStyle/>
+            <a:p>
+              <a:pPr algn="ctr"/>
+              <a:r>
+                <a:rPr lang="en-US" sz="1200" dirty="0" err="1"/>
+                <a:t>LogAction</a:t>
+              </a:r>
+              <a:endParaRPr lang="en-US" sz="1200" dirty="0"/>
+            </a:p>
+          </p:txBody>
+        </p:sp>
+        <p:sp>
+          <p:nvSpPr>
+            <p:cNvPr id="112" name="Rectangle 111">
+              <a:extLst>
+                <a:ext uri="{FF2B5EF4-FFF2-40B4-BE49-F238E27FC236}">
+                  <a16:creationId xmlns:a16="http://schemas.microsoft.com/office/drawing/2014/main" id="{52CC6072-0FC6-4FE7-8BEB-26A4C66EBCAD}"/>
+                </a:ext>
+              </a:extLst>
+            </p:cNvPr>
+            <p:cNvSpPr/>
+            <p:nvPr/>
+          </p:nvSpPr>
+          <p:spPr>
+            <a:xfrm>
+              <a:off x="10096500" y="5372100"/>
+              <a:ext cx="1600200" cy="228600"/>
+            </a:xfrm>
+            <a:prstGeom prst="rect">
+              <a:avLst/>
+            </a:prstGeom>
+            <a:solidFill>
+              <a:schemeClr val="accent5"/>
+            </a:solidFill>
+          </p:spPr>
+          <p:style>
+            <a:lnRef idx="2">
+              <a:schemeClr val="accent1">
+                <a:shade val="50000"/>
+              </a:schemeClr>
+            </a:lnRef>
+            <a:fillRef idx="1">
+              <a:schemeClr val="accent1"/>
+            </a:fillRef>
+            <a:effectRef idx="0">
+              <a:schemeClr val="accent1"/>
+            </a:effectRef>
+            <a:fontRef idx="minor">
+              <a:schemeClr val="lt1"/>
+            </a:fontRef>
+          </p:style>
+          <p:txBody>
+            <a:bodyPr rtlCol="0" anchor="ctr"/>
+            <a:lstStyle/>
+            <a:p>
+              <a:pPr algn="ctr"/>
+              <a:r>
+                <a:rPr lang="en-US" sz="1200" dirty="0" err="1"/>
+                <a:t>RepeatDialog</a:t>
+              </a:r>
+              <a:endParaRPr lang="en-US" sz="1200" dirty="0"/>
+            </a:p>
+          </p:txBody>
+        </p:sp>
+        <p:sp>
+          <p:nvSpPr>
+            <p:cNvPr id="115" name="Rectangle 114">
+              <a:extLst>
+                <a:ext uri="{FF2B5EF4-FFF2-40B4-BE49-F238E27FC236}">
+                  <a16:creationId xmlns:a16="http://schemas.microsoft.com/office/drawing/2014/main" id="{E8FE3272-46C6-4AE2-A508-A7C5DE80B8E6}"/>
+                </a:ext>
+              </a:extLst>
+            </p:cNvPr>
+            <p:cNvSpPr/>
+            <p:nvPr/>
+          </p:nvSpPr>
+          <p:spPr>
+            <a:xfrm>
+              <a:off x="10096500" y="5600700"/>
+              <a:ext cx="1600200" cy="228600"/>
+            </a:xfrm>
+            <a:prstGeom prst="rect">
+              <a:avLst/>
+            </a:prstGeom>
+            <a:solidFill>
+              <a:schemeClr val="accent5"/>
+            </a:solidFill>
+          </p:spPr>
+          <p:style>
+            <a:lnRef idx="2">
+              <a:schemeClr val="accent1">
+                <a:shade val="50000"/>
+              </a:schemeClr>
+            </a:lnRef>
+            <a:fillRef idx="1">
+              <a:schemeClr val="accent1"/>
+            </a:fillRef>
+            <a:effectRef idx="0">
+              <a:schemeClr val="accent1"/>
+            </a:effectRef>
+            <a:fontRef idx="minor">
+              <a:schemeClr val="lt1"/>
+            </a:fontRef>
+          </p:style>
+          <p:txBody>
+            <a:bodyPr rtlCol="0" anchor="ctr"/>
+            <a:lstStyle/>
+            <a:p>
+              <a:pPr algn="ctr"/>
+              <a:r>
+                <a:rPr lang="en-US" sz="1200" dirty="0" err="1"/>
+                <a:t>SendActivity</a:t>
+              </a:r>
+              <a:endParaRPr lang="en-US" sz="1200" dirty="0"/>
+            </a:p>
+          </p:txBody>
+        </p:sp>
+        <p:sp>
+          <p:nvSpPr>
+            <p:cNvPr id="116" name="Rectangle 115">
+              <a:extLst>
+                <a:ext uri="{FF2B5EF4-FFF2-40B4-BE49-F238E27FC236}">
+                  <a16:creationId xmlns:a16="http://schemas.microsoft.com/office/drawing/2014/main" id="{EBE2E497-2962-4BB6-B13E-D5BAAF72ADBE}"/>
+                </a:ext>
+              </a:extLst>
+            </p:cNvPr>
+            <p:cNvSpPr/>
+            <p:nvPr/>
+          </p:nvSpPr>
+          <p:spPr>
+            <a:xfrm>
+              <a:off x="10096500" y="5829300"/>
+              <a:ext cx="1600200" cy="228600"/>
+            </a:xfrm>
+            <a:prstGeom prst="rect">
+              <a:avLst/>
+            </a:prstGeom>
+            <a:solidFill>
+              <a:schemeClr val="accent5"/>
+            </a:solidFill>
+          </p:spPr>
+          <p:style>
+            <a:lnRef idx="2">
+              <a:schemeClr val="accent1">
+                <a:shade val="50000"/>
+              </a:schemeClr>
+            </a:lnRef>
+            <a:fillRef idx="1">
+              <a:schemeClr val="accent1"/>
+            </a:fillRef>
+            <a:effectRef idx="0">
+              <a:schemeClr val="accent1"/>
+            </a:effectRef>
+            <a:fontRef idx="minor">
+              <a:schemeClr val="lt1"/>
+            </a:fontRef>
+          </p:style>
+          <p:txBody>
+            <a:bodyPr rtlCol="0" anchor="ctr"/>
+            <a:lstStyle/>
+            <a:p>
+              <a:pPr algn="ctr"/>
+              <a:r>
+                <a:rPr lang="en-US" sz="1200" dirty="0" err="1"/>
+                <a:t>SetProperty</a:t>
+              </a:r>
+              <a:endParaRPr lang="en-US" sz="1200" dirty="0"/>
+            </a:p>
+          </p:txBody>
+        </p:sp>
+        <p:sp>
+          <p:nvSpPr>
+            <p:cNvPr id="117" name="Rectangle 116">
+              <a:extLst>
+                <a:ext uri="{FF2B5EF4-FFF2-40B4-BE49-F238E27FC236}">
+                  <a16:creationId xmlns:a16="http://schemas.microsoft.com/office/drawing/2014/main" id="{0EFA465C-136B-477E-A40C-CD5F57FCB0FA}"/>
+                </a:ext>
+              </a:extLst>
+            </p:cNvPr>
+            <p:cNvSpPr/>
+            <p:nvPr/>
+          </p:nvSpPr>
+          <p:spPr>
+            <a:xfrm>
+              <a:off x="10096500" y="6057900"/>
+              <a:ext cx="1600200" cy="228600"/>
+            </a:xfrm>
+            <a:prstGeom prst="rect">
+              <a:avLst/>
+            </a:prstGeom>
+            <a:solidFill>
+              <a:schemeClr val="accent5"/>
+            </a:solidFill>
+          </p:spPr>
+          <p:style>
+            <a:lnRef idx="2">
+              <a:schemeClr val="accent1">
+                <a:shade val="50000"/>
+              </a:schemeClr>
+            </a:lnRef>
+            <a:fillRef idx="1">
+              <a:schemeClr val="accent1"/>
+            </a:fillRef>
+            <a:effectRef idx="0">
+              <a:schemeClr val="accent1"/>
+            </a:effectRef>
+            <a:fontRef idx="minor">
+              <a:schemeClr val="lt1"/>
+            </a:fontRef>
+          </p:style>
+          <p:txBody>
+            <a:bodyPr rtlCol="0" anchor="ctr"/>
+            <a:lstStyle/>
+            <a:p>
+              <a:pPr algn="ctr"/>
+              <a:r>
+                <a:rPr lang="en-US" sz="1200" dirty="0" err="1"/>
+                <a:t>SwitchCondition</a:t>
+              </a:r>
+              <a:endParaRPr lang="en-US" sz="1200" dirty="0"/>
+            </a:p>
+          </p:txBody>
+        </p:sp>
+        <p:sp>
+          <p:nvSpPr>
+            <p:cNvPr id="118" name="Rectangle 117">
+              <a:extLst>
+                <a:ext uri="{FF2B5EF4-FFF2-40B4-BE49-F238E27FC236}">
+                  <a16:creationId xmlns:a16="http://schemas.microsoft.com/office/drawing/2014/main" id="{F60BD05B-E29C-4D91-9EC2-5759B58F984D}"/>
+                </a:ext>
+              </a:extLst>
+            </p:cNvPr>
+            <p:cNvSpPr/>
+            <p:nvPr/>
+          </p:nvSpPr>
+          <p:spPr>
+            <a:xfrm>
+              <a:off x="10096500" y="6286500"/>
+              <a:ext cx="1600200" cy="228600"/>
+            </a:xfrm>
+            <a:prstGeom prst="rect">
+              <a:avLst/>
+            </a:prstGeom>
+            <a:solidFill>
+              <a:schemeClr val="accent5"/>
+            </a:solidFill>
+          </p:spPr>
+          <p:style>
+            <a:lnRef idx="2">
+              <a:schemeClr val="accent1">
+                <a:shade val="50000"/>
+              </a:schemeClr>
+            </a:lnRef>
+            <a:fillRef idx="1">
+              <a:schemeClr val="accent1"/>
+            </a:fillRef>
+            <a:effectRef idx="0">
+              <a:schemeClr val="accent1"/>
+            </a:effectRef>
+            <a:fontRef idx="minor">
+              <a:schemeClr val="lt1"/>
+            </a:fontRef>
+          </p:style>
+          <p:txBody>
+            <a:bodyPr rtlCol="0" anchor="ctr"/>
+            <a:lstStyle/>
+            <a:p>
+              <a:pPr algn="ctr"/>
+              <a:r>
+                <a:rPr lang="en-US" sz="1200" dirty="0" err="1"/>
+                <a:t>TraceActivity</a:t>
+              </a:r>
+              <a:endParaRPr lang="en-US" sz="1200" dirty="0"/>
+            </a:p>
+          </p:txBody>
+        </p:sp>
+      </p:grpSp>
+      <p:sp>
+        <p:nvSpPr>
+          <p:cNvPr id="138" name="Rectangle 137">
+            <a:extLst>
+              <a:ext uri="{FF2B5EF4-FFF2-40B4-BE49-F238E27FC236}">
+                <a16:creationId xmlns:a16="http://schemas.microsoft.com/office/drawing/2014/main" id="{A8F19425-9D45-49E0-A0B7-6674988A8302}"/>
+              </a:ext>
+            </a:extLst>
+          </p:cNvPr>
+          <p:cNvSpPr/>
+          <p:nvPr/>
+        </p:nvSpPr>
+        <p:spPr>
+          <a:xfrm>
+            <a:off x="5067300" y="3314700"/>
+            <a:ext cx="1600200" cy="342900"/>
+          </a:xfrm>
+          <a:prstGeom prst="rect">
+            <a:avLst/>
+          </a:prstGeom>
+          <a:solidFill>
+            <a:schemeClr val="accent5"/>
+          </a:solidFill>
+        </p:spPr>
+        <p:style>
+          <a:lnRef idx="2">
+            <a:schemeClr val="accent1">
+              <a:shade val="50000"/>
+            </a:schemeClr>
+          </a:lnRef>
+          <a:fillRef idx="1">
+            <a:schemeClr val="accent1"/>
+          </a:fillRef>
+          <a:effectRef idx="0">
+            <a:schemeClr val="accent1"/>
+          </a:effectRef>
+          <a:fontRef idx="minor">
+            <a:schemeClr val="lt1"/>
+          </a:fontRef>
+        </p:style>
+        <p:txBody>
+          <a:bodyPr rtlCol="0" anchor="ctr"/>
+          <a:lstStyle/>
+          <a:p>
+            <a:pPr algn="ctr"/>
+            <a:r>
+              <a:rPr lang="en-US" sz="1200" dirty="0" err="1"/>
+              <a:t>QnAMakerDialog</a:t>
+            </a:r>
+            <a:endParaRPr lang="en-US" sz="1200" dirty="0"/>
+          </a:p>
+        </p:txBody>
+      </p:sp>
+      <p:cxnSp>
+        <p:nvCxnSpPr>
+          <p:cNvPr id="140" name="Connector: Elbow 139">
+            <a:extLst>
+              <a:ext uri="{FF2B5EF4-FFF2-40B4-BE49-F238E27FC236}">
+                <a16:creationId xmlns:a16="http://schemas.microsoft.com/office/drawing/2014/main" id="{D697F18E-65F6-4EF5-9A8F-83325C955755}"/>
+              </a:ext>
+            </a:extLst>
+          </p:cNvPr>
+          <p:cNvCxnSpPr>
+            <a:cxnSpLocks/>
+            <a:stCxn id="138" idx="1"/>
+            <a:endCxn id="2" idx="2"/>
+          </p:cNvCxnSpPr>
+          <p:nvPr/>
+        </p:nvCxnSpPr>
+        <p:spPr>
+          <a:xfrm rot="10800000">
+            <a:off x="4838700" y="571500"/>
+            <a:ext cx="228600" cy="2914650"/>
+          </a:xfrm>
+          <a:prstGeom prst="bentConnector2">
+            <a:avLst/>
+          </a:prstGeom>
+          <a:ln>
+            <a:tailEnd type="triangle"/>
+          </a:ln>
+        </p:spPr>
+        <p:style>
+          <a:lnRef idx="1">
+            <a:schemeClr val="accent1"/>
+          </a:lnRef>
+          <a:fillRef idx="0">
+            <a:schemeClr val="accent1"/>
+          </a:fillRef>
+          <a:effectRef idx="0">
+            <a:schemeClr val="accent1"/>
+          </a:effectRef>
+          <a:fontRef idx="minor">
+            <a:schemeClr val="tx1"/>
+          </a:fontRef>
+        </p:style>
+      </p:cxnSp>
+      <p:sp>
+        <p:nvSpPr>
+          <p:cNvPr id="148" name="Rectangle 147">
+            <a:extLst>
+              <a:ext uri="{FF2B5EF4-FFF2-40B4-BE49-F238E27FC236}">
+                <a16:creationId xmlns:a16="http://schemas.microsoft.com/office/drawing/2014/main" id="{CEA5A0DD-6BDF-4EB4-BBBC-E1302C4799EF}"/>
+              </a:ext>
+            </a:extLst>
+          </p:cNvPr>
+          <p:cNvSpPr/>
+          <p:nvPr/>
+        </p:nvSpPr>
+        <p:spPr>
+          <a:xfrm>
+            <a:off x="5638800" y="571500"/>
+            <a:ext cx="1600200" cy="228600"/>
+          </a:xfrm>
+          <a:prstGeom prst="rect">
+            <a:avLst/>
+          </a:prstGeom>
+          <a:noFill/>
+          <a:ln>
+            <a:noFill/>
+          </a:ln>
+        </p:spPr>
+        <p:style>
+          <a:lnRef idx="2">
+            <a:schemeClr val="accent1">
+              <a:shade val="50000"/>
+            </a:schemeClr>
+          </a:lnRef>
+          <a:fillRef idx="1">
+            <a:schemeClr val="accent1"/>
+          </a:fillRef>
+          <a:effectRef idx="0">
+            <a:schemeClr val="accent1"/>
+          </a:effectRef>
+          <a:fontRef idx="minor">
+            <a:schemeClr val="lt1"/>
+          </a:fontRef>
+        </p:style>
+        <p:txBody>
+          <a:bodyPr rtlCol="0" anchor="ctr"/>
+          <a:lstStyle/>
+          <a:p>
+            <a:pPr algn="ctr"/>
+            <a:r>
+              <a:rPr lang="en-US" sz="1200" dirty="0">
+                <a:solidFill>
+                  <a:schemeClr val="tx1"/>
+                </a:solidFill>
+              </a:rPr>
+              <a:t>Composites</a:t>
+            </a:r>
+          </a:p>
+        </p:txBody>
+      </p:sp>
+      <p:sp>
+        <p:nvSpPr>
+          <p:cNvPr id="149" name="Rectangle 148">
+            <a:extLst>
+              <a:ext uri="{FF2B5EF4-FFF2-40B4-BE49-F238E27FC236}">
+                <a16:creationId xmlns:a16="http://schemas.microsoft.com/office/drawing/2014/main" id="{801AF27D-997C-4EB0-8CF3-5C5A7D1CC322}"/>
+              </a:ext>
+            </a:extLst>
+          </p:cNvPr>
+          <p:cNvSpPr/>
+          <p:nvPr/>
+        </p:nvSpPr>
+        <p:spPr>
+          <a:xfrm>
+            <a:off x="7696200" y="571500"/>
+            <a:ext cx="1600200" cy="228600"/>
+          </a:xfrm>
+          <a:prstGeom prst="rect">
+            <a:avLst/>
+          </a:prstGeom>
+          <a:noFill/>
+          <a:ln>
+            <a:noFill/>
+          </a:ln>
+        </p:spPr>
+        <p:style>
+          <a:lnRef idx="2">
+            <a:schemeClr val="accent1">
+              <a:shade val="50000"/>
+            </a:schemeClr>
+          </a:lnRef>
+          <a:fillRef idx="1">
+            <a:schemeClr val="accent1"/>
+          </a:fillRef>
+          <a:effectRef idx="0">
+            <a:schemeClr val="accent1"/>
+          </a:effectRef>
+          <a:fontRef idx="minor">
+            <a:schemeClr val="lt1"/>
+          </a:fontRef>
+        </p:style>
+        <p:txBody>
+          <a:bodyPr rtlCol="0" anchor="ctr"/>
+          <a:lstStyle/>
+          <a:p>
+            <a:pPr algn="ctr"/>
+            <a:r>
+              <a:rPr lang="en-US" sz="1200" dirty="0">
+                <a:solidFill>
+                  <a:schemeClr val="tx1"/>
+                </a:solidFill>
+              </a:rPr>
+              <a:t>“New” prompts</a:t>
+            </a:r>
+          </a:p>
+        </p:txBody>
+      </p:sp>
+      <p:sp>
+        <p:nvSpPr>
+          <p:cNvPr id="150" name="Rectangle 149">
+            <a:extLst>
+              <a:ext uri="{FF2B5EF4-FFF2-40B4-BE49-F238E27FC236}">
+                <a16:creationId xmlns:a16="http://schemas.microsoft.com/office/drawing/2014/main" id="{615ABC16-4BD9-4FFE-88FF-444503D045EF}"/>
+              </a:ext>
+            </a:extLst>
+          </p:cNvPr>
+          <p:cNvSpPr/>
+          <p:nvPr/>
+        </p:nvSpPr>
+        <p:spPr>
+          <a:xfrm>
+            <a:off x="495300" y="571500"/>
+            <a:ext cx="1600200" cy="228600"/>
+          </a:xfrm>
+          <a:prstGeom prst="rect">
+            <a:avLst/>
+          </a:prstGeom>
+          <a:noFill/>
+          <a:ln>
+            <a:noFill/>
+          </a:ln>
+        </p:spPr>
+        <p:style>
+          <a:lnRef idx="2">
+            <a:schemeClr val="accent1">
+              <a:shade val="50000"/>
+            </a:schemeClr>
+          </a:lnRef>
+          <a:fillRef idx="1">
+            <a:schemeClr val="accent1"/>
+          </a:fillRef>
+          <a:effectRef idx="0">
+            <a:schemeClr val="accent1"/>
+          </a:effectRef>
+          <a:fontRef idx="minor">
+            <a:schemeClr val="lt1"/>
+          </a:fontRef>
+        </p:style>
+        <p:txBody>
+          <a:bodyPr rtlCol="0" anchor="ctr"/>
+          <a:lstStyle/>
+          <a:p>
+            <a:pPr algn="ctr"/>
+            <a:r>
+              <a:rPr lang="en-US" sz="1200" dirty="0">
+                <a:solidFill>
+                  <a:schemeClr val="tx1"/>
+                </a:solidFill>
+              </a:rPr>
+              <a:t>“Old” prompts</a:t>
+            </a:r>
+          </a:p>
+        </p:txBody>
+      </p:sp>
+      <p:sp>
+        <p:nvSpPr>
+          <p:cNvPr id="174" name="Rectangle 173">
+            <a:extLst>
+              <a:ext uri="{FF2B5EF4-FFF2-40B4-BE49-F238E27FC236}">
+                <a16:creationId xmlns:a16="http://schemas.microsoft.com/office/drawing/2014/main" id="{AC9B81B3-21EC-48F9-A368-5041459D5764}"/>
+              </a:ext>
+            </a:extLst>
+          </p:cNvPr>
+          <p:cNvSpPr/>
+          <p:nvPr/>
+        </p:nvSpPr>
+        <p:spPr>
+          <a:xfrm>
+            <a:off x="3009900" y="1600200"/>
+            <a:ext cx="1600200" cy="228600"/>
+          </a:xfrm>
+          <a:prstGeom prst="rect">
+            <a:avLst/>
+          </a:prstGeom>
+          <a:noFill/>
+          <a:ln>
+            <a:noFill/>
+          </a:ln>
+        </p:spPr>
+        <p:style>
+          <a:lnRef idx="2">
+            <a:schemeClr val="accent1">
+              <a:shade val="50000"/>
+            </a:schemeClr>
+          </a:lnRef>
+          <a:fillRef idx="1">
+            <a:schemeClr val="accent1"/>
+          </a:fillRef>
+          <a:effectRef idx="0">
+            <a:schemeClr val="accent1"/>
+          </a:effectRef>
+          <a:fontRef idx="minor">
+            <a:schemeClr val="lt1"/>
+          </a:fontRef>
+        </p:style>
+        <p:txBody>
+          <a:bodyPr rtlCol="0" anchor="ctr"/>
+          <a:lstStyle/>
+          <a:p>
+            <a:pPr algn="ctr"/>
+            <a:r>
+              <a:rPr lang="en-US" sz="1200" dirty="0">
+                <a:solidFill>
+                  <a:schemeClr val="tx1"/>
+                </a:solidFill>
+              </a:rPr>
+              <a:t>OAuth Prompts</a:t>
+            </a:r>
+          </a:p>
+        </p:txBody>
+      </p:sp>
+      <p:sp>
+        <p:nvSpPr>
+          <p:cNvPr id="177" name="TextBox 176">
+            <a:extLst>
+              <a:ext uri="{FF2B5EF4-FFF2-40B4-BE49-F238E27FC236}">
+                <a16:creationId xmlns:a16="http://schemas.microsoft.com/office/drawing/2014/main" id="{1C2B487D-852C-4AAE-A7DD-E81057734637}"/>
+              </a:ext>
+            </a:extLst>
+          </p:cNvPr>
+          <p:cNvSpPr txBox="1"/>
+          <p:nvPr/>
+        </p:nvSpPr>
+        <p:spPr>
+          <a:xfrm>
+            <a:off x="7124700" y="3512403"/>
+            <a:ext cx="2253887" cy="830997"/>
+          </a:xfrm>
+          <a:prstGeom prst="rect">
+            <a:avLst/>
+          </a:prstGeom>
+          <a:solidFill>
+            <a:schemeClr val="bg1"/>
+          </a:solidFill>
+          <a:ln>
+            <a:solidFill>
+              <a:schemeClr val="tx1"/>
+            </a:solidFill>
+          </a:ln>
+        </p:spPr>
+        <p:txBody>
+          <a:bodyPr wrap="none" rtlCol="0">
+            <a:spAutoFit/>
+          </a:bodyPr>
+          <a:lstStyle/>
+          <a:p>
+            <a:r>
+              <a:rPr lang="en-US" sz="1200" dirty="0"/>
+              <a:t>Sequences are the replacement</a:t>
+            </a:r>
+          </a:p>
+          <a:p>
+            <a:r>
+              <a:rPr lang="en-US" sz="1200" dirty="0"/>
+              <a:t>for waterfall dialogs. Actions are</a:t>
+            </a:r>
+          </a:p>
+          <a:p>
+            <a:r>
+              <a:rPr lang="en-US" sz="1200" dirty="0"/>
+              <a:t>like steps in an implied waterfall</a:t>
+            </a:r>
+          </a:p>
+          <a:p>
+            <a:r>
+              <a:rPr lang="en-US" sz="1200" dirty="0"/>
+              <a:t>dialog.</a:t>
+            </a:r>
+          </a:p>
+        </p:txBody>
+      </p:sp>
+      <p:cxnSp>
+        <p:nvCxnSpPr>
+          <p:cNvPr id="179" name="Straight Connector 178">
+            <a:extLst>
+              <a:ext uri="{FF2B5EF4-FFF2-40B4-BE49-F238E27FC236}">
+                <a16:creationId xmlns:a16="http://schemas.microsoft.com/office/drawing/2014/main" id="{71392F71-F44D-4409-9858-3758A2CE0D87}"/>
+              </a:ext>
+            </a:extLst>
+          </p:cNvPr>
+          <p:cNvCxnSpPr>
+            <a:cxnSpLocks/>
+            <a:stCxn id="177" idx="3"/>
+          </p:cNvCxnSpPr>
+          <p:nvPr/>
+        </p:nvCxnSpPr>
+        <p:spPr>
+          <a:xfrm>
+            <a:off x="9378587" y="3927902"/>
+            <a:ext cx="146413" cy="0"/>
+          </a:xfrm>
+          <a:prstGeom prst="line">
+            <a:avLst/>
+          </a:prstGeom>
+        </p:spPr>
+        <p:style>
+          <a:lnRef idx="1">
+            <a:schemeClr val="accent1"/>
+          </a:lnRef>
+          <a:fillRef idx="0">
+            <a:schemeClr val="accent1"/>
+          </a:fillRef>
+          <a:effectRef idx="0">
+            <a:schemeClr val="accent1"/>
+          </a:effectRef>
+          <a:fontRef idx="minor">
+            <a:schemeClr val="tx1"/>
+          </a:fontRef>
+        </p:style>
+      </p:cxnSp>
+      <p:sp>
+        <p:nvSpPr>
+          <p:cNvPr id="184" name="Rectangle 183">
+            <a:extLst>
+              <a:ext uri="{FF2B5EF4-FFF2-40B4-BE49-F238E27FC236}">
+                <a16:creationId xmlns:a16="http://schemas.microsoft.com/office/drawing/2014/main" id="{22CF43E0-5DE9-4B86-BA4F-0E31434C7563}"/>
+              </a:ext>
+            </a:extLst>
+          </p:cNvPr>
+          <p:cNvSpPr/>
+          <p:nvPr/>
+        </p:nvSpPr>
+        <p:spPr>
+          <a:xfrm>
+            <a:off x="9867900" y="571500"/>
+            <a:ext cx="1600200" cy="228600"/>
+          </a:xfrm>
+          <a:prstGeom prst="rect">
+            <a:avLst/>
+          </a:prstGeom>
+          <a:noFill/>
+          <a:ln>
+            <a:noFill/>
+          </a:ln>
+        </p:spPr>
+        <p:style>
+          <a:lnRef idx="2">
+            <a:schemeClr val="accent1">
+              <a:shade val="50000"/>
+            </a:schemeClr>
+          </a:lnRef>
+          <a:fillRef idx="1">
+            <a:schemeClr val="accent1"/>
+          </a:fillRef>
+          <a:effectRef idx="0">
+            <a:schemeClr val="accent1"/>
+          </a:effectRef>
+          <a:fontRef idx="minor">
+            <a:schemeClr val="lt1"/>
+          </a:fontRef>
+        </p:style>
+        <p:txBody>
+          <a:bodyPr rtlCol="0" anchor="ctr"/>
+          <a:lstStyle/>
+          <a:p>
+            <a:pPr algn="ctr"/>
+            <a:r>
+              <a:rPr lang="en-US" sz="1200" dirty="0">
+                <a:solidFill>
+                  <a:schemeClr val="tx1"/>
+                </a:solidFill>
+              </a:rPr>
+              <a:t>Actions</a:t>
+            </a:r>
+          </a:p>
+        </p:txBody>
+      </p:sp>
+      <p:sp>
+        <p:nvSpPr>
+          <p:cNvPr id="78" name="TextBox 77">
+            <a:extLst>
+              <a:ext uri="{FF2B5EF4-FFF2-40B4-BE49-F238E27FC236}">
+                <a16:creationId xmlns:a16="http://schemas.microsoft.com/office/drawing/2014/main" id="{C772FC8E-052B-46EB-BE07-D9996C088027}"/>
+              </a:ext>
+            </a:extLst>
+          </p:cNvPr>
+          <p:cNvSpPr txBox="1"/>
+          <p:nvPr/>
+        </p:nvSpPr>
+        <p:spPr>
+          <a:xfrm>
+            <a:off x="7156813" y="4541103"/>
+            <a:ext cx="2161297" cy="646331"/>
+          </a:xfrm>
+          <a:prstGeom prst="rect">
+            <a:avLst/>
+          </a:prstGeom>
+          <a:solidFill>
+            <a:schemeClr val="bg1"/>
+          </a:solidFill>
+          <a:ln>
+            <a:solidFill>
+              <a:schemeClr val="tx1"/>
+            </a:solidFill>
+          </a:ln>
+        </p:spPr>
+        <p:txBody>
+          <a:bodyPr wrap="none" rtlCol="0">
+            <a:spAutoFit/>
+          </a:bodyPr>
+          <a:lstStyle/>
+          <a:p>
+            <a:r>
+              <a:rPr lang="en-US" sz="1200" dirty="0"/>
+              <a:t>Actions in the composer are</a:t>
+            </a:r>
+          </a:p>
+          <a:p>
+            <a:r>
+              <a:rPr lang="en-US" sz="1200" dirty="0"/>
+              <a:t>grouped by category and visible</a:t>
+            </a:r>
+          </a:p>
+          <a:p>
+            <a:r>
+              <a:rPr lang="en-US" sz="1200" dirty="0"/>
+              <a:t>only in the appropriate context.</a:t>
+            </a:r>
+          </a:p>
+        </p:txBody>
+      </p:sp>
+      <p:cxnSp>
+        <p:nvCxnSpPr>
+          <p:cNvPr id="15" name="Straight Connector 14">
+            <a:extLst>
+              <a:ext uri="{FF2B5EF4-FFF2-40B4-BE49-F238E27FC236}">
+                <a16:creationId xmlns:a16="http://schemas.microsoft.com/office/drawing/2014/main" id="{BBF38888-853B-423C-AF61-20F648FE3298}"/>
+              </a:ext>
+            </a:extLst>
+          </p:cNvPr>
+          <p:cNvCxnSpPr>
+            <a:stCxn id="78" idx="3"/>
+          </p:cNvCxnSpPr>
+          <p:nvPr/>
+        </p:nvCxnSpPr>
+        <p:spPr>
+          <a:xfrm flipV="1">
+            <a:off x="9318110" y="4800600"/>
+            <a:ext cx="206890" cy="63669"/>
+          </a:xfrm>
+          <a:prstGeom prst="line">
+            <a:avLst/>
+          </a:prstGeom>
+        </p:spPr>
+        <p:style>
+          <a:lnRef idx="1">
+            <a:schemeClr val="accent1"/>
+          </a:lnRef>
+          <a:fillRef idx="0">
+            <a:schemeClr val="accent1"/>
+          </a:fillRef>
+          <a:effectRef idx="0">
+            <a:schemeClr val="accent1"/>
+          </a:effectRef>
+          <a:fontRef idx="minor">
+            <a:schemeClr val="tx1"/>
+          </a:fontRef>
+        </p:style>
+      </p:cxnSp>
+    </p:spTree>
+    <p:extLst>
+      <p:ext uri="{BB962C8B-B14F-4D97-AF65-F5344CB8AC3E}">
+        <p14:creationId xmlns:p14="http://schemas.microsoft.com/office/powerpoint/2010/main" val="3623657709"/>
+      </p:ext>
+    </p:extLst>
+  </p:cSld>
+  <p:clrMapOvr>
+    <a:masterClrMapping/>
+  </p:clrMapOvr>
+</p:sld>
+</file>
+
 <file path=ppt/theme/theme1.xml><?xml version="1.0" encoding="utf-8"?>
 <a:theme xmlns:a="http://schemas.openxmlformats.org/drawingml/2006/main" name="Office Theme">
   <a:themeElements>

</xml_diff>

<commit_message>
Release 'live' 11-11-2019 (#1811)
</commit_message>
<xml_diff>
--- a/styleguide/dialogs/work-in-progress/dialog-diagrams.pptx
+++ b/styleguide/dialogs/work-in-progress/dialog-diagrams.pptx
@@ -8,6 +8,7 @@
     <p:sldId id="256" r:id="rId2"/>
     <p:sldId id="257" r:id="rId3"/>
     <p:sldId id="258" r:id="rId4"/>
+    <p:sldId id="259" r:id="rId5"/>
   </p:sldIdLst>
   <p:sldSz cx="12192000" cy="6858000"/>
   <p:notesSz cx="6858000" cy="9144000"/>
@@ -261,7 +262,7 @@
           <a:p>
             <a:fld id="{5E7A417E-3F10-4EE6-A8E6-5AC370CB751F}" type="datetimeFigureOut">
               <a:rPr lang="en-US" smtClean="0"/>
-              <a:t>10/16/2019</a:t>
+              <a:t>11/7/2019</a:t>
             </a:fld>
             <a:endParaRPr lang="en-US"/>
           </a:p>
@@ -459,7 +460,7 @@
           <a:p>
             <a:fld id="{5E7A417E-3F10-4EE6-A8E6-5AC370CB751F}" type="datetimeFigureOut">
               <a:rPr lang="en-US" smtClean="0"/>
-              <a:t>10/16/2019</a:t>
+              <a:t>11/7/2019</a:t>
             </a:fld>
             <a:endParaRPr lang="en-US"/>
           </a:p>
@@ -667,7 +668,7 @@
           <a:p>
             <a:fld id="{5E7A417E-3F10-4EE6-A8E6-5AC370CB751F}" type="datetimeFigureOut">
               <a:rPr lang="en-US" smtClean="0"/>
-              <a:t>10/16/2019</a:t>
+              <a:t>11/7/2019</a:t>
             </a:fld>
             <a:endParaRPr lang="en-US"/>
           </a:p>
@@ -865,7 +866,7 @@
           <a:p>
             <a:fld id="{5E7A417E-3F10-4EE6-A8E6-5AC370CB751F}" type="datetimeFigureOut">
               <a:rPr lang="en-US" smtClean="0"/>
-              <a:t>10/16/2019</a:t>
+              <a:t>11/7/2019</a:t>
             </a:fld>
             <a:endParaRPr lang="en-US"/>
           </a:p>
@@ -1140,7 +1141,7 @@
           <a:p>
             <a:fld id="{5E7A417E-3F10-4EE6-A8E6-5AC370CB751F}" type="datetimeFigureOut">
               <a:rPr lang="en-US" smtClean="0"/>
-              <a:t>10/16/2019</a:t>
+              <a:t>11/7/2019</a:t>
             </a:fld>
             <a:endParaRPr lang="en-US"/>
           </a:p>
@@ -1405,7 +1406,7 @@
           <a:p>
             <a:fld id="{5E7A417E-3F10-4EE6-A8E6-5AC370CB751F}" type="datetimeFigureOut">
               <a:rPr lang="en-US" smtClean="0"/>
-              <a:t>10/16/2019</a:t>
+              <a:t>11/7/2019</a:t>
             </a:fld>
             <a:endParaRPr lang="en-US"/>
           </a:p>
@@ -1817,7 +1818,7 @@
           <a:p>
             <a:fld id="{5E7A417E-3F10-4EE6-A8E6-5AC370CB751F}" type="datetimeFigureOut">
               <a:rPr lang="en-US" smtClean="0"/>
-              <a:t>10/16/2019</a:t>
+              <a:t>11/7/2019</a:t>
             </a:fld>
             <a:endParaRPr lang="en-US"/>
           </a:p>
@@ -1958,7 +1959,7 @@
           <a:p>
             <a:fld id="{5E7A417E-3F10-4EE6-A8E6-5AC370CB751F}" type="datetimeFigureOut">
               <a:rPr lang="en-US" smtClean="0"/>
-              <a:t>10/16/2019</a:t>
+              <a:t>11/7/2019</a:t>
             </a:fld>
             <a:endParaRPr lang="en-US"/>
           </a:p>
@@ -2071,7 +2072,7 @@
           <a:p>
             <a:fld id="{5E7A417E-3F10-4EE6-A8E6-5AC370CB751F}" type="datetimeFigureOut">
               <a:rPr lang="en-US" smtClean="0"/>
-              <a:t>10/16/2019</a:t>
+              <a:t>11/7/2019</a:t>
             </a:fld>
             <a:endParaRPr lang="en-US"/>
           </a:p>
@@ -2382,7 +2383,7 @@
           <a:p>
             <a:fld id="{5E7A417E-3F10-4EE6-A8E6-5AC370CB751F}" type="datetimeFigureOut">
               <a:rPr lang="en-US" smtClean="0"/>
-              <a:t>10/16/2019</a:t>
+              <a:t>11/7/2019</a:t>
             </a:fld>
             <a:endParaRPr lang="en-US"/>
           </a:p>
@@ -2670,7 +2671,7 @@
           <a:p>
             <a:fld id="{5E7A417E-3F10-4EE6-A8E6-5AC370CB751F}" type="datetimeFigureOut">
               <a:rPr lang="en-US" smtClean="0"/>
-              <a:t>10/16/2019</a:t>
+              <a:t>11/7/2019</a:t>
             </a:fld>
             <a:endParaRPr lang="en-US"/>
           </a:p>
@@ -2911,7 +2912,7 @@
           <a:p>
             <a:fld id="{5E7A417E-3F10-4EE6-A8E6-5AC370CB751F}" type="datetimeFigureOut">
               <a:rPr lang="en-US" smtClean="0"/>
-              <a:t>10/16/2019</a:t>
+              <a:t>11/7/2019</a:t>
             </a:fld>
             <a:endParaRPr lang="en-US"/>
           </a:p>
@@ -8970,6 +8971,1290 @@
 </p:sld>
 </file>
 
+<file path=ppt/slides/slide4.xml><?xml version="1.0" encoding="utf-8"?>
+<p:sld xmlns:a="http://schemas.openxmlformats.org/drawingml/2006/main" xmlns:r="http://schemas.openxmlformats.org/officeDocument/2006/relationships" xmlns:p="http://schemas.openxmlformats.org/presentationml/2006/main">
+  <p:cSld>
+    <p:spTree>
+      <p:nvGrpSpPr>
+        <p:cNvPr id="1" name=""/>
+        <p:cNvGrpSpPr/>
+        <p:nvPr/>
+      </p:nvGrpSpPr>
+      <p:grpSpPr>
+        <a:xfrm>
+          <a:off x="0" y="0"/>
+          <a:ext cx="0" cy="0"/>
+          <a:chOff x="0" y="0"/>
+          <a:chExt cx="0" cy="0"/>
+        </a:xfrm>
+      </p:grpSpPr>
+      <p:sp>
+        <p:nvSpPr>
+          <p:cNvPr id="30" name="Rectangle 29">
+            <a:extLst>
+              <a:ext uri="{FF2B5EF4-FFF2-40B4-BE49-F238E27FC236}">
+                <a16:creationId xmlns:a16="http://schemas.microsoft.com/office/drawing/2014/main" id="{C30C4695-9044-46D7-AF85-0068A8656D3B}"/>
+              </a:ext>
+            </a:extLst>
+          </p:cNvPr>
+          <p:cNvSpPr/>
+          <p:nvPr/>
+        </p:nvSpPr>
+        <p:spPr>
+          <a:xfrm>
+            <a:off x="771525" y="800100"/>
+            <a:ext cx="10172700" cy="4081521"/>
+          </a:xfrm>
+          <a:prstGeom prst="rect">
+            <a:avLst/>
+          </a:prstGeom>
+          <a:solidFill>
+            <a:schemeClr val="accent1">
+              <a:lumMod val="20000"/>
+              <a:lumOff val="80000"/>
+            </a:schemeClr>
+          </a:solidFill>
+        </p:spPr>
+        <p:style>
+          <a:lnRef idx="2">
+            <a:schemeClr val="accent1">
+              <a:shade val="50000"/>
+            </a:schemeClr>
+          </a:lnRef>
+          <a:fillRef idx="1">
+            <a:schemeClr val="accent1"/>
+          </a:fillRef>
+          <a:effectRef idx="0">
+            <a:schemeClr val="accent1"/>
+          </a:effectRef>
+          <a:fontRef idx="minor">
+            <a:schemeClr val="lt1"/>
+          </a:fontRef>
+        </p:style>
+        <p:txBody>
+          <a:bodyPr rtlCol="0" anchor="t" anchorCtr="0"/>
+          <a:lstStyle/>
+          <a:p>
+            <a:pPr algn="ctr"/>
+            <a:r>
+              <a:rPr lang="en-US" dirty="0">
+                <a:solidFill>
+                  <a:schemeClr val="tx1"/>
+                </a:solidFill>
+              </a:rPr>
+              <a:t>Azure Bot Service</a:t>
+            </a:r>
+          </a:p>
+        </p:txBody>
+      </p:sp>
+      <p:sp>
+        <p:nvSpPr>
+          <p:cNvPr id="2" name="Rectangle 1">
+            <a:extLst>
+              <a:ext uri="{FF2B5EF4-FFF2-40B4-BE49-F238E27FC236}">
+                <a16:creationId xmlns:a16="http://schemas.microsoft.com/office/drawing/2014/main" id="{FC731DE7-BA80-4BB9-A5E1-9A457D18E9F4}"/>
+              </a:ext>
+            </a:extLst>
+          </p:cNvPr>
+          <p:cNvSpPr/>
+          <p:nvPr/>
+        </p:nvSpPr>
+        <p:spPr>
+          <a:xfrm>
+            <a:off x="2257425" y="2669410"/>
+            <a:ext cx="6057900" cy="1600200"/>
+          </a:xfrm>
+          <a:prstGeom prst="rect">
+            <a:avLst/>
+          </a:prstGeom>
+          <a:solidFill>
+            <a:schemeClr val="accent4">
+              <a:lumMod val="75000"/>
+            </a:schemeClr>
+          </a:solidFill>
+        </p:spPr>
+        <p:style>
+          <a:lnRef idx="2">
+            <a:schemeClr val="accent1">
+              <a:shade val="50000"/>
+            </a:schemeClr>
+          </a:lnRef>
+          <a:fillRef idx="1">
+            <a:schemeClr val="accent1"/>
+          </a:fillRef>
+          <a:effectRef idx="0">
+            <a:schemeClr val="accent1"/>
+          </a:effectRef>
+          <a:fontRef idx="minor">
+            <a:schemeClr val="lt1"/>
+          </a:fontRef>
+        </p:style>
+        <p:txBody>
+          <a:bodyPr rtlCol="0" anchor="t" anchorCtr="0"/>
+          <a:lstStyle/>
+          <a:p>
+            <a:r>
+              <a:rPr lang="en-US" sz="1400" dirty="0"/>
+              <a:t>Core </a:t>
+            </a:r>
+            <a:r>
+              <a:rPr lang="en-US" sz="1400" dirty="0" err="1"/>
+              <a:t>BotFramework</a:t>
+            </a:r>
+            <a:r>
+              <a:rPr lang="en-US" sz="1400" dirty="0"/>
+              <a:t> SDK</a:t>
+            </a:r>
+          </a:p>
+        </p:txBody>
+      </p:sp>
+      <p:sp>
+        <p:nvSpPr>
+          <p:cNvPr id="3" name="Rectangle 2">
+            <a:extLst>
+              <a:ext uri="{FF2B5EF4-FFF2-40B4-BE49-F238E27FC236}">
+                <a16:creationId xmlns:a16="http://schemas.microsoft.com/office/drawing/2014/main" id="{FDD72F1E-6A9F-4E8A-8710-8E645F097728}"/>
+              </a:ext>
+            </a:extLst>
+          </p:cNvPr>
+          <p:cNvSpPr/>
+          <p:nvPr/>
+        </p:nvSpPr>
+        <p:spPr>
+          <a:xfrm>
+            <a:off x="2257425" y="2097911"/>
+            <a:ext cx="3086100" cy="457199"/>
+          </a:xfrm>
+          <a:prstGeom prst="rect">
+            <a:avLst/>
+          </a:prstGeom>
+          <a:solidFill>
+            <a:schemeClr val="accent2">
+              <a:lumMod val="75000"/>
+            </a:schemeClr>
+          </a:solidFill>
+        </p:spPr>
+        <p:style>
+          <a:lnRef idx="2">
+            <a:schemeClr val="accent1">
+              <a:shade val="50000"/>
+            </a:schemeClr>
+          </a:lnRef>
+          <a:fillRef idx="1">
+            <a:schemeClr val="accent1"/>
+          </a:fillRef>
+          <a:effectRef idx="0">
+            <a:schemeClr val="accent1"/>
+          </a:effectRef>
+          <a:fontRef idx="minor">
+            <a:schemeClr val="lt1"/>
+          </a:fontRef>
+        </p:style>
+        <p:txBody>
+          <a:bodyPr rtlCol="0" anchor="ctr"/>
+          <a:lstStyle/>
+          <a:p>
+            <a:pPr algn="ctr"/>
+            <a:r>
+              <a:rPr lang="en-US" sz="1400" dirty="0"/>
+              <a:t>Dialogs library</a:t>
+            </a:r>
+          </a:p>
+        </p:txBody>
+      </p:sp>
+      <p:sp>
+        <p:nvSpPr>
+          <p:cNvPr id="4" name="Rectangle 3">
+            <a:extLst>
+              <a:ext uri="{FF2B5EF4-FFF2-40B4-BE49-F238E27FC236}">
+                <a16:creationId xmlns:a16="http://schemas.microsoft.com/office/drawing/2014/main" id="{85AFDE1D-2E44-47DC-BB92-6E485B45F0AC}"/>
+              </a:ext>
+            </a:extLst>
+          </p:cNvPr>
+          <p:cNvSpPr/>
+          <p:nvPr/>
+        </p:nvSpPr>
+        <p:spPr>
+          <a:xfrm>
+            <a:off x="5229225" y="3583810"/>
+            <a:ext cx="1638300" cy="574964"/>
+          </a:xfrm>
+          <a:prstGeom prst="rect">
+            <a:avLst/>
+          </a:prstGeom>
+          <a:solidFill>
+            <a:schemeClr val="accent5">
+              <a:lumMod val="75000"/>
+            </a:schemeClr>
+          </a:solidFill>
+        </p:spPr>
+        <p:style>
+          <a:lnRef idx="2">
+            <a:schemeClr val="accent1">
+              <a:shade val="50000"/>
+            </a:schemeClr>
+          </a:lnRef>
+          <a:fillRef idx="1">
+            <a:schemeClr val="accent1"/>
+          </a:fillRef>
+          <a:effectRef idx="0">
+            <a:schemeClr val="accent1"/>
+          </a:effectRef>
+          <a:fontRef idx="minor">
+            <a:schemeClr val="lt1"/>
+          </a:fontRef>
+        </p:style>
+        <p:txBody>
+          <a:bodyPr rtlCol="0" anchor="ctr"/>
+          <a:lstStyle/>
+          <a:p>
+            <a:pPr algn="ctr"/>
+            <a:r>
+              <a:rPr lang="en-US" sz="1400" dirty="0"/>
+              <a:t>memory management</a:t>
+            </a:r>
+          </a:p>
+        </p:txBody>
+      </p:sp>
+      <p:sp>
+        <p:nvSpPr>
+          <p:cNvPr id="5" name="Rectangle 4">
+            <a:extLst>
+              <a:ext uri="{FF2B5EF4-FFF2-40B4-BE49-F238E27FC236}">
+                <a16:creationId xmlns:a16="http://schemas.microsoft.com/office/drawing/2014/main" id="{C7116817-FAD9-4EAA-A610-19003D5E227D}"/>
+              </a:ext>
+            </a:extLst>
+          </p:cNvPr>
+          <p:cNvSpPr/>
+          <p:nvPr/>
+        </p:nvSpPr>
+        <p:spPr>
+          <a:xfrm>
+            <a:off x="6867525" y="3583810"/>
+            <a:ext cx="1333500" cy="574966"/>
+          </a:xfrm>
+          <a:prstGeom prst="rect">
+            <a:avLst/>
+          </a:prstGeom>
+          <a:solidFill>
+            <a:schemeClr val="accent6">
+              <a:lumMod val="75000"/>
+            </a:schemeClr>
+          </a:solidFill>
+        </p:spPr>
+        <p:style>
+          <a:lnRef idx="2">
+            <a:schemeClr val="accent1">
+              <a:shade val="50000"/>
+            </a:schemeClr>
+          </a:lnRef>
+          <a:fillRef idx="1">
+            <a:schemeClr val="accent1"/>
+          </a:fillRef>
+          <a:effectRef idx="0">
+            <a:schemeClr val="accent1"/>
+          </a:effectRef>
+          <a:fontRef idx="minor">
+            <a:schemeClr val="lt1"/>
+          </a:fontRef>
+        </p:style>
+        <p:txBody>
+          <a:bodyPr rtlCol="0" anchor="ctr"/>
+          <a:lstStyle/>
+          <a:p>
+            <a:pPr algn="ctr"/>
+            <a:r>
+              <a:rPr lang="en-US" sz="1400" dirty="0"/>
+              <a:t>Middleware</a:t>
+            </a:r>
+          </a:p>
+        </p:txBody>
+      </p:sp>
+      <p:sp>
+        <p:nvSpPr>
+          <p:cNvPr id="6" name="Rectangle 5">
+            <a:extLst>
+              <a:ext uri="{FF2B5EF4-FFF2-40B4-BE49-F238E27FC236}">
+                <a16:creationId xmlns:a16="http://schemas.microsoft.com/office/drawing/2014/main" id="{C4C0162F-5D17-4491-8604-B1EB1462AE67}"/>
+              </a:ext>
+            </a:extLst>
+          </p:cNvPr>
+          <p:cNvSpPr/>
+          <p:nvPr/>
+        </p:nvSpPr>
+        <p:spPr>
+          <a:xfrm>
+            <a:off x="3286125" y="4104102"/>
+            <a:ext cx="1638300" cy="276344"/>
+          </a:xfrm>
+          <a:prstGeom prst="rect">
+            <a:avLst/>
+          </a:prstGeom>
+          <a:solidFill>
+            <a:schemeClr val="accent6">
+              <a:lumMod val="75000"/>
+            </a:schemeClr>
+          </a:solidFill>
+        </p:spPr>
+        <p:style>
+          <a:lnRef idx="2">
+            <a:schemeClr val="accent1">
+              <a:shade val="50000"/>
+            </a:schemeClr>
+          </a:lnRef>
+          <a:fillRef idx="1">
+            <a:schemeClr val="accent1"/>
+          </a:fillRef>
+          <a:effectRef idx="0">
+            <a:schemeClr val="accent1"/>
+          </a:effectRef>
+          <a:fontRef idx="minor">
+            <a:schemeClr val="lt1"/>
+          </a:fontRef>
+        </p:style>
+        <p:txBody>
+          <a:bodyPr rtlCol="0" anchor="ctr"/>
+          <a:lstStyle/>
+          <a:p>
+            <a:pPr algn="ctr"/>
+            <a:r>
+              <a:rPr lang="en-US" sz="1400" dirty="0"/>
+              <a:t>Adapters</a:t>
+            </a:r>
+          </a:p>
+        </p:txBody>
+      </p:sp>
+      <p:sp>
+        <p:nvSpPr>
+          <p:cNvPr id="7" name="Rectangle 6">
+            <a:extLst>
+              <a:ext uri="{FF2B5EF4-FFF2-40B4-BE49-F238E27FC236}">
+                <a16:creationId xmlns:a16="http://schemas.microsoft.com/office/drawing/2014/main" id="{D481C1CB-8656-43C5-8C58-8A2745F914E1}"/>
+              </a:ext>
+            </a:extLst>
+          </p:cNvPr>
+          <p:cNvSpPr/>
+          <p:nvPr/>
+        </p:nvSpPr>
+        <p:spPr>
+          <a:xfrm>
+            <a:off x="6829425" y="2946503"/>
+            <a:ext cx="2400300" cy="457199"/>
+          </a:xfrm>
+          <a:prstGeom prst="rect">
+            <a:avLst/>
+          </a:prstGeom>
+          <a:solidFill>
+            <a:schemeClr val="accent1">
+              <a:lumMod val="75000"/>
+            </a:schemeClr>
+          </a:solidFill>
+        </p:spPr>
+        <p:style>
+          <a:lnRef idx="2">
+            <a:schemeClr val="accent1">
+              <a:shade val="50000"/>
+            </a:schemeClr>
+          </a:lnRef>
+          <a:fillRef idx="1">
+            <a:schemeClr val="accent1"/>
+          </a:fillRef>
+          <a:effectRef idx="0">
+            <a:schemeClr val="accent1"/>
+          </a:effectRef>
+          <a:fontRef idx="minor">
+            <a:schemeClr val="lt1"/>
+          </a:fontRef>
+        </p:style>
+        <p:txBody>
+          <a:bodyPr rtlCol="0" anchor="ctr"/>
+          <a:lstStyle/>
+          <a:p>
+            <a:pPr algn="ctr"/>
+            <a:r>
+              <a:rPr lang="en-US" sz="1400" dirty="0" err="1"/>
+              <a:t>ActivityHandler</a:t>
+            </a:r>
+            <a:endParaRPr lang="en-US" sz="1400" dirty="0"/>
+          </a:p>
+        </p:txBody>
+      </p:sp>
+      <p:sp>
+        <p:nvSpPr>
+          <p:cNvPr id="8" name="Oval 7">
+            <a:extLst>
+              <a:ext uri="{FF2B5EF4-FFF2-40B4-BE49-F238E27FC236}">
+                <a16:creationId xmlns:a16="http://schemas.microsoft.com/office/drawing/2014/main" id="{7C79A84A-8F5E-4B42-B0B8-B00D6BA329CB}"/>
+              </a:ext>
+            </a:extLst>
+          </p:cNvPr>
+          <p:cNvSpPr/>
+          <p:nvPr/>
+        </p:nvSpPr>
+        <p:spPr>
+          <a:xfrm>
+            <a:off x="723900" y="5500623"/>
+            <a:ext cx="1257300" cy="689264"/>
+          </a:xfrm>
+          <a:prstGeom prst="ellipse">
+            <a:avLst/>
+          </a:prstGeom>
+        </p:spPr>
+        <p:style>
+          <a:lnRef idx="2">
+            <a:schemeClr val="accent1">
+              <a:shade val="50000"/>
+            </a:schemeClr>
+          </a:lnRef>
+          <a:fillRef idx="1">
+            <a:schemeClr val="accent1"/>
+          </a:fillRef>
+          <a:effectRef idx="0">
+            <a:schemeClr val="accent1"/>
+          </a:effectRef>
+          <a:fontRef idx="minor">
+            <a:schemeClr val="lt1"/>
+          </a:fontRef>
+        </p:style>
+        <p:txBody>
+          <a:bodyPr rtlCol="0" anchor="ctr"/>
+          <a:lstStyle/>
+          <a:p>
+            <a:pPr algn="ctr"/>
+            <a:r>
+              <a:rPr lang="en-US" dirty="0"/>
+              <a:t>User</a:t>
+            </a:r>
+          </a:p>
+        </p:txBody>
+      </p:sp>
+      <p:sp>
+        <p:nvSpPr>
+          <p:cNvPr id="9" name="Rectangle: Rounded Corners 8">
+            <a:extLst>
+              <a:ext uri="{FF2B5EF4-FFF2-40B4-BE49-F238E27FC236}">
+                <a16:creationId xmlns:a16="http://schemas.microsoft.com/office/drawing/2014/main" id="{E3A195DF-2D89-4835-9368-77863F06FD36}"/>
+              </a:ext>
+            </a:extLst>
+          </p:cNvPr>
+          <p:cNvSpPr/>
+          <p:nvPr/>
+        </p:nvSpPr>
+        <p:spPr>
+          <a:xfrm>
+            <a:off x="2314575" y="5500623"/>
+            <a:ext cx="3581400" cy="689264"/>
+          </a:xfrm>
+          <a:prstGeom prst="roundRect">
+            <a:avLst/>
+          </a:prstGeom>
+          <a:solidFill>
+            <a:schemeClr val="accent6">
+              <a:lumMod val="75000"/>
+            </a:schemeClr>
+          </a:solidFill>
+        </p:spPr>
+        <p:style>
+          <a:lnRef idx="2">
+            <a:schemeClr val="accent1">
+              <a:shade val="50000"/>
+            </a:schemeClr>
+          </a:lnRef>
+          <a:fillRef idx="1">
+            <a:schemeClr val="accent1"/>
+          </a:fillRef>
+          <a:effectRef idx="0">
+            <a:schemeClr val="accent1"/>
+          </a:effectRef>
+          <a:fontRef idx="minor">
+            <a:schemeClr val="lt1"/>
+          </a:fontRef>
+        </p:style>
+        <p:txBody>
+          <a:bodyPr rtlCol="0" anchor="ctr"/>
+          <a:lstStyle/>
+          <a:p>
+            <a:pPr algn="ctr"/>
+            <a:r>
+              <a:rPr lang="en-US" dirty="0"/>
+              <a:t>Channel</a:t>
+            </a:r>
+          </a:p>
+        </p:txBody>
+      </p:sp>
+      <p:cxnSp>
+        <p:nvCxnSpPr>
+          <p:cNvPr id="11" name="Straight Arrow Connector 10">
+            <a:extLst>
+              <a:ext uri="{FF2B5EF4-FFF2-40B4-BE49-F238E27FC236}">
+                <a16:creationId xmlns:a16="http://schemas.microsoft.com/office/drawing/2014/main" id="{3137083D-2D9C-4AB3-B613-3BF5128C3663}"/>
+              </a:ext>
+            </a:extLst>
+          </p:cNvPr>
+          <p:cNvCxnSpPr>
+            <a:cxnSpLocks/>
+            <a:stCxn id="8" idx="6"/>
+            <a:endCxn id="9" idx="1"/>
+          </p:cNvCxnSpPr>
+          <p:nvPr/>
+        </p:nvCxnSpPr>
+        <p:spPr>
+          <a:xfrm>
+            <a:off x="1981200" y="5845255"/>
+            <a:ext cx="333375" cy="0"/>
+          </a:xfrm>
+          <a:prstGeom prst="straightConnector1">
+            <a:avLst/>
+          </a:prstGeom>
+          <a:ln>
+            <a:tailEnd type="triangle"/>
+          </a:ln>
+        </p:spPr>
+        <p:style>
+          <a:lnRef idx="1">
+            <a:schemeClr val="accent1"/>
+          </a:lnRef>
+          <a:fillRef idx="0">
+            <a:schemeClr val="accent1"/>
+          </a:fillRef>
+          <a:effectRef idx="0">
+            <a:schemeClr val="accent1"/>
+          </a:effectRef>
+          <a:fontRef idx="minor">
+            <a:schemeClr val="tx1"/>
+          </a:fontRef>
+        </p:style>
+      </p:cxnSp>
+      <p:cxnSp>
+        <p:nvCxnSpPr>
+          <p:cNvPr id="13" name="Straight Connector 12">
+            <a:extLst>
+              <a:ext uri="{FF2B5EF4-FFF2-40B4-BE49-F238E27FC236}">
+                <a16:creationId xmlns:a16="http://schemas.microsoft.com/office/drawing/2014/main" id="{E42D2BA1-34A6-4B5E-B16C-1224959CD19E}"/>
+              </a:ext>
+            </a:extLst>
+          </p:cNvPr>
+          <p:cNvCxnSpPr>
+            <a:cxnSpLocks/>
+            <a:stCxn id="9" idx="0"/>
+            <a:endCxn id="6" idx="2"/>
+          </p:cNvCxnSpPr>
+          <p:nvPr/>
+        </p:nvCxnSpPr>
+        <p:spPr>
+          <a:xfrm flipV="1">
+            <a:off x="4105275" y="4380446"/>
+            <a:ext cx="0" cy="1120177"/>
+          </a:xfrm>
+          <a:prstGeom prst="line">
+            <a:avLst/>
+          </a:prstGeom>
+        </p:spPr>
+        <p:style>
+          <a:lnRef idx="1">
+            <a:schemeClr val="accent1"/>
+          </a:lnRef>
+          <a:fillRef idx="0">
+            <a:schemeClr val="accent1"/>
+          </a:fillRef>
+          <a:effectRef idx="0">
+            <a:schemeClr val="accent1"/>
+          </a:effectRef>
+          <a:fontRef idx="minor">
+            <a:schemeClr val="tx1"/>
+          </a:fontRef>
+        </p:style>
+      </p:cxnSp>
+      <p:cxnSp>
+        <p:nvCxnSpPr>
+          <p:cNvPr id="15" name="Connector: Elbow 14">
+            <a:extLst>
+              <a:ext uri="{FF2B5EF4-FFF2-40B4-BE49-F238E27FC236}">
+                <a16:creationId xmlns:a16="http://schemas.microsoft.com/office/drawing/2014/main" id="{141F64E2-FD2B-4365-8321-CE332FB82186}"/>
+              </a:ext>
+            </a:extLst>
+          </p:cNvPr>
+          <p:cNvCxnSpPr>
+            <a:cxnSpLocks/>
+            <a:stCxn id="3" idx="1"/>
+            <a:endCxn id="8" idx="2"/>
+          </p:cNvCxnSpPr>
+          <p:nvPr/>
+        </p:nvCxnSpPr>
+        <p:spPr>
+          <a:xfrm rot="10800000" flipV="1">
+            <a:off x="723901" y="2326511"/>
+            <a:ext cx="1533525" cy="3518744"/>
+          </a:xfrm>
+          <a:prstGeom prst="bentConnector3">
+            <a:avLst>
+              <a:gd name="adj1" fmla="val 114907"/>
+            </a:avLst>
+          </a:prstGeom>
+          <a:ln cap="rnd">
+            <a:prstDash val="sysDot"/>
+          </a:ln>
+        </p:spPr>
+        <p:style>
+          <a:lnRef idx="1">
+            <a:schemeClr val="accent1"/>
+          </a:lnRef>
+          <a:fillRef idx="0">
+            <a:schemeClr val="accent1"/>
+          </a:fillRef>
+          <a:effectRef idx="0">
+            <a:schemeClr val="accent1"/>
+          </a:effectRef>
+          <a:fontRef idx="minor">
+            <a:schemeClr val="tx1"/>
+          </a:fontRef>
+        </p:style>
+      </p:cxnSp>
+      <p:cxnSp>
+        <p:nvCxnSpPr>
+          <p:cNvPr id="22" name="Connector: Elbow 21">
+            <a:extLst>
+              <a:ext uri="{FF2B5EF4-FFF2-40B4-BE49-F238E27FC236}">
+                <a16:creationId xmlns:a16="http://schemas.microsoft.com/office/drawing/2014/main" id="{82EF755A-2C44-41FE-9E09-7168A9272DF8}"/>
+              </a:ext>
+            </a:extLst>
+          </p:cNvPr>
+          <p:cNvCxnSpPr>
+            <a:cxnSpLocks/>
+            <a:stCxn id="7" idx="3"/>
+            <a:endCxn id="9" idx="3"/>
+          </p:cNvCxnSpPr>
+          <p:nvPr/>
+        </p:nvCxnSpPr>
+        <p:spPr>
+          <a:xfrm flipH="1">
+            <a:off x="5895975" y="3175103"/>
+            <a:ext cx="3333750" cy="2670152"/>
+          </a:xfrm>
+          <a:prstGeom prst="bentConnector3">
+            <a:avLst>
+              <a:gd name="adj1" fmla="val -6857"/>
+            </a:avLst>
+          </a:prstGeom>
+        </p:spPr>
+        <p:style>
+          <a:lnRef idx="1">
+            <a:schemeClr val="accent1"/>
+          </a:lnRef>
+          <a:fillRef idx="0">
+            <a:schemeClr val="accent1"/>
+          </a:fillRef>
+          <a:effectRef idx="0">
+            <a:schemeClr val="accent1"/>
+          </a:effectRef>
+          <a:fontRef idx="minor">
+            <a:schemeClr val="tx1"/>
+          </a:fontRef>
+        </p:style>
+      </p:cxnSp>
+      <p:sp>
+        <p:nvSpPr>
+          <p:cNvPr id="31" name="Rectangle 30">
+            <a:extLst>
+              <a:ext uri="{FF2B5EF4-FFF2-40B4-BE49-F238E27FC236}">
+                <a16:creationId xmlns:a16="http://schemas.microsoft.com/office/drawing/2014/main" id="{E603184A-2794-4899-A8C7-AF5CAB60E7DC}"/>
+              </a:ext>
+            </a:extLst>
+          </p:cNvPr>
+          <p:cNvSpPr/>
+          <p:nvPr/>
+        </p:nvSpPr>
+        <p:spPr>
+          <a:xfrm>
+            <a:off x="6486525" y="1755011"/>
+            <a:ext cx="1943100" cy="457199"/>
+          </a:xfrm>
+          <a:prstGeom prst="rect">
+            <a:avLst/>
+          </a:prstGeom>
+          <a:solidFill>
+            <a:schemeClr val="accent2">
+              <a:lumMod val="75000"/>
+            </a:schemeClr>
+          </a:solidFill>
+        </p:spPr>
+        <p:style>
+          <a:lnRef idx="2">
+            <a:schemeClr val="accent1">
+              <a:shade val="50000"/>
+            </a:schemeClr>
+          </a:lnRef>
+          <a:fillRef idx="1">
+            <a:schemeClr val="accent1"/>
+          </a:fillRef>
+          <a:effectRef idx="0">
+            <a:schemeClr val="accent1"/>
+          </a:effectRef>
+          <a:fontRef idx="minor">
+            <a:schemeClr val="lt1"/>
+          </a:fontRef>
+        </p:style>
+        <p:txBody>
+          <a:bodyPr rtlCol="0" anchor="ctr"/>
+          <a:lstStyle/>
+          <a:p>
+            <a:pPr algn="ctr"/>
+            <a:r>
+              <a:rPr lang="en-US" sz="1400" dirty="0"/>
+              <a:t>Language understanding</a:t>
+            </a:r>
+          </a:p>
+        </p:txBody>
+      </p:sp>
+      <p:sp>
+        <p:nvSpPr>
+          <p:cNvPr id="32" name="Rectangle 31">
+            <a:extLst>
+              <a:ext uri="{FF2B5EF4-FFF2-40B4-BE49-F238E27FC236}">
+                <a16:creationId xmlns:a16="http://schemas.microsoft.com/office/drawing/2014/main" id="{AD2DAC28-7DE2-4F2B-94D6-B6DA359768F2}"/>
+              </a:ext>
+            </a:extLst>
+          </p:cNvPr>
+          <p:cNvSpPr/>
+          <p:nvPr/>
+        </p:nvSpPr>
+        <p:spPr>
+          <a:xfrm>
+            <a:off x="6486525" y="1249318"/>
+            <a:ext cx="1943100" cy="457199"/>
+          </a:xfrm>
+          <a:prstGeom prst="rect">
+            <a:avLst/>
+          </a:prstGeom>
+          <a:solidFill>
+            <a:schemeClr val="accent2">
+              <a:lumMod val="75000"/>
+            </a:schemeClr>
+          </a:solidFill>
+        </p:spPr>
+        <p:style>
+          <a:lnRef idx="2">
+            <a:schemeClr val="accent1">
+              <a:shade val="50000"/>
+            </a:schemeClr>
+          </a:lnRef>
+          <a:fillRef idx="1">
+            <a:schemeClr val="accent1"/>
+          </a:fillRef>
+          <a:effectRef idx="0">
+            <a:schemeClr val="accent1"/>
+          </a:effectRef>
+          <a:fontRef idx="minor">
+            <a:schemeClr val="lt1"/>
+          </a:fontRef>
+        </p:style>
+        <p:txBody>
+          <a:bodyPr rtlCol="0" anchor="ctr"/>
+          <a:lstStyle/>
+          <a:p>
+            <a:pPr algn="ctr"/>
+            <a:r>
+              <a:rPr lang="en-US" sz="1400" dirty="0"/>
+              <a:t>Language generation</a:t>
+            </a:r>
+          </a:p>
+        </p:txBody>
+      </p:sp>
+      <p:sp>
+        <p:nvSpPr>
+          <p:cNvPr id="33" name="Rectangle 32">
+            <a:extLst>
+              <a:ext uri="{FF2B5EF4-FFF2-40B4-BE49-F238E27FC236}">
+                <a16:creationId xmlns:a16="http://schemas.microsoft.com/office/drawing/2014/main" id="{F1E212D9-03BB-4284-8ED0-E5F23C5FEE0A}"/>
+              </a:ext>
+            </a:extLst>
+          </p:cNvPr>
+          <p:cNvSpPr/>
+          <p:nvPr/>
+        </p:nvSpPr>
+        <p:spPr>
+          <a:xfrm>
+            <a:off x="8496300" y="1249318"/>
+            <a:ext cx="1943100" cy="457199"/>
+          </a:xfrm>
+          <a:prstGeom prst="rect">
+            <a:avLst/>
+          </a:prstGeom>
+          <a:solidFill>
+            <a:schemeClr val="accent2">
+              <a:lumMod val="75000"/>
+            </a:schemeClr>
+          </a:solidFill>
+        </p:spPr>
+        <p:style>
+          <a:lnRef idx="2">
+            <a:schemeClr val="accent1">
+              <a:shade val="50000"/>
+            </a:schemeClr>
+          </a:lnRef>
+          <a:fillRef idx="1">
+            <a:schemeClr val="accent1"/>
+          </a:fillRef>
+          <a:effectRef idx="0">
+            <a:schemeClr val="accent1"/>
+          </a:effectRef>
+          <a:fontRef idx="minor">
+            <a:schemeClr val="lt1"/>
+          </a:fontRef>
+        </p:style>
+        <p:txBody>
+          <a:bodyPr rtlCol="0" anchor="ctr"/>
+          <a:lstStyle/>
+          <a:p>
+            <a:pPr algn="ctr"/>
+            <a:r>
+              <a:rPr lang="en-US" sz="1400" dirty="0"/>
+              <a:t>Declarative dialogs</a:t>
+            </a:r>
+          </a:p>
+        </p:txBody>
+      </p:sp>
+      <p:sp>
+        <p:nvSpPr>
+          <p:cNvPr id="37" name="Rectangle 36">
+            <a:extLst>
+              <a:ext uri="{FF2B5EF4-FFF2-40B4-BE49-F238E27FC236}">
+                <a16:creationId xmlns:a16="http://schemas.microsoft.com/office/drawing/2014/main" id="{461BC270-111B-4850-9DE6-62D169F7BFBC}"/>
+              </a:ext>
+            </a:extLst>
+          </p:cNvPr>
+          <p:cNvSpPr/>
+          <p:nvPr/>
+        </p:nvSpPr>
+        <p:spPr>
+          <a:xfrm>
+            <a:off x="8496300" y="1755011"/>
+            <a:ext cx="1943100" cy="457199"/>
+          </a:xfrm>
+          <a:prstGeom prst="rect">
+            <a:avLst/>
+          </a:prstGeom>
+          <a:solidFill>
+            <a:schemeClr val="accent2">
+              <a:lumMod val="75000"/>
+            </a:schemeClr>
+          </a:solidFill>
+        </p:spPr>
+        <p:style>
+          <a:lnRef idx="2">
+            <a:schemeClr val="accent1">
+              <a:shade val="50000"/>
+            </a:schemeClr>
+          </a:lnRef>
+          <a:fillRef idx="1">
+            <a:schemeClr val="accent1"/>
+          </a:fillRef>
+          <a:effectRef idx="0">
+            <a:schemeClr val="accent1"/>
+          </a:effectRef>
+          <a:fontRef idx="minor">
+            <a:schemeClr val="lt1"/>
+          </a:fontRef>
+        </p:style>
+        <p:txBody>
+          <a:bodyPr rtlCol="0" anchor="ctr"/>
+          <a:lstStyle/>
+          <a:p>
+            <a:pPr algn="ctr"/>
+            <a:r>
+              <a:rPr lang="en-US" sz="1400" dirty="0" err="1"/>
+              <a:t>Adative</a:t>
+            </a:r>
+            <a:r>
+              <a:rPr lang="en-US" sz="1400" dirty="0"/>
+              <a:t> dialogs</a:t>
+            </a:r>
+          </a:p>
+        </p:txBody>
+      </p:sp>
+      <p:cxnSp>
+        <p:nvCxnSpPr>
+          <p:cNvPr id="39" name="Connector: Elbow 38">
+            <a:extLst>
+              <a:ext uri="{FF2B5EF4-FFF2-40B4-BE49-F238E27FC236}">
+                <a16:creationId xmlns:a16="http://schemas.microsoft.com/office/drawing/2014/main" id="{8E351D81-EA15-41C6-90DA-091BCA72DB35}"/>
+              </a:ext>
+            </a:extLst>
+          </p:cNvPr>
+          <p:cNvCxnSpPr>
+            <a:stCxn id="3" idx="3"/>
+            <a:endCxn id="37" idx="2"/>
+          </p:cNvCxnSpPr>
+          <p:nvPr/>
+        </p:nvCxnSpPr>
+        <p:spPr>
+          <a:xfrm flipV="1">
+            <a:off x="5343525" y="2212210"/>
+            <a:ext cx="4124325" cy="114301"/>
+          </a:xfrm>
+          <a:prstGeom prst="bentConnector2">
+            <a:avLst/>
+          </a:prstGeom>
+        </p:spPr>
+        <p:style>
+          <a:lnRef idx="1">
+            <a:schemeClr val="accent1"/>
+          </a:lnRef>
+          <a:fillRef idx="0">
+            <a:schemeClr val="accent1"/>
+          </a:fillRef>
+          <a:effectRef idx="0">
+            <a:schemeClr val="accent1"/>
+          </a:effectRef>
+          <a:fontRef idx="minor">
+            <a:schemeClr val="tx1"/>
+          </a:fontRef>
+        </p:style>
+      </p:cxnSp>
+      <p:sp>
+        <p:nvSpPr>
+          <p:cNvPr id="47" name="Rectangle 46">
+            <a:extLst>
+              <a:ext uri="{FF2B5EF4-FFF2-40B4-BE49-F238E27FC236}">
+                <a16:creationId xmlns:a16="http://schemas.microsoft.com/office/drawing/2014/main" id="{9902C92B-1222-4B81-9481-8529CECEED13}"/>
+              </a:ext>
+            </a:extLst>
+          </p:cNvPr>
+          <p:cNvSpPr/>
+          <p:nvPr/>
+        </p:nvSpPr>
+        <p:spPr>
+          <a:xfrm>
+            <a:off x="1981200" y="3608088"/>
+            <a:ext cx="1190625" cy="574964"/>
+          </a:xfrm>
+          <a:prstGeom prst="rect">
+            <a:avLst/>
+          </a:prstGeom>
+          <a:solidFill>
+            <a:schemeClr val="accent5">
+              <a:lumMod val="75000"/>
+            </a:schemeClr>
+          </a:solidFill>
+        </p:spPr>
+        <p:style>
+          <a:lnRef idx="2">
+            <a:schemeClr val="accent1">
+              <a:shade val="50000"/>
+            </a:schemeClr>
+          </a:lnRef>
+          <a:fillRef idx="1">
+            <a:schemeClr val="accent1"/>
+          </a:fillRef>
+          <a:effectRef idx="0">
+            <a:schemeClr val="accent1"/>
+          </a:effectRef>
+          <a:fontRef idx="minor">
+            <a:schemeClr val="lt1"/>
+          </a:fontRef>
+        </p:style>
+        <p:txBody>
+          <a:bodyPr rtlCol="0" anchor="ctr"/>
+          <a:lstStyle/>
+          <a:p>
+            <a:pPr algn="ctr"/>
+            <a:r>
+              <a:rPr lang="en-US" sz="1400" dirty="0"/>
+              <a:t>Configuration</a:t>
+            </a:r>
+          </a:p>
+        </p:txBody>
+      </p:sp>
+      <p:sp>
+        <p:nvSpPr>
+          <p:cNvPr id="48" name="Oval 47">
+            <a:extLst>
+              <a:ext uri="{FF2B5EF4-FFF2-40B4-BE49-F238E27FC236}">
+                <a16:creationId xmlns:a16="http://schemas.microsoft.com/office/drawing/2014/main" id="{A1129B65-D553-4EA2-8F88-A5E6873CF89B}"/>
+              </a:ext>
+            </a:extLst>
+          </p:cNvPr>
+          <p:cNvSpPr/>
+          <p:nvPr/>
+        </p:nvSpPr>
+        <p:spPr>
+          <a:xfrm>
+            <a:off x="857251" y="2692635"/>
+            <a:ext cx="1257300" cy="689264"/>
+          </a:xfrm>
+          <a:prstGeom prst="ellipse">
+            <a:avLst/>
+          </a:prstGeom>
+        </p:spPr>
+        <p:style>
+          <a:lnRef idx="2">
+            <a:schemeClr val="accent1">
+              <a:shade val="50000"/>
+            </a:schemeClr>
+          </a:lnRef>
+          <a:fillRef idx="1">
+            <a:schemeClr val="accent1"/>
+          </a:fillRef>
+          <a:effectRef idx="0">
+            <a:schemeClr val="accent1"/>
+          </a:effectRef>
+          <a:fontRef idx="minor">
+            <a:schemeClr val="lt1"/>
+          </a:fontRef>
+        </p:style>
+        <p:txBody>
+          <a:bodyPr rtlCol="0" anchor="ctr"/>
+          <a:lstStyle/>
+          <a:p>
+            <a:pPr algn="ctr"/>
+            <a:r>
+              <a:rPr lang="en-US" dirty="0"/>
+              <a:t>config file</a:t>
+            </a:r>
+          </a:p>
+        </p:txBody>
+      </p:sp>
+      <p:cxnSp>
+        <p:nvCxnSpPr>
+          <p:cNvPr id="50" name="Connector: Elbow 49">
+            <a:extLst>
+              <a:ext uri="{FF2B5EF4-FFF2-40B4-BE49-F238E27FC236}">
+                <a16:creationId xmlns:a16="http://schemas.microsoft.com/office/drawing/2014/main" id="{E177AD78-B155-49F4-87CC-C68A355048F5}"/>
+              </a:ext>
+            </a:extLst>
+          </p:cNvPr>
+          <p:cNvCxnSpPr>
+            <a:cxnSpLocks/>
+            <a:stCxn id="47" idx="1"/>
+            <a:endCxn id="48" idx="4"/>
+          </p:cNvCxnSpPr>
+          <p:nvPr/>
+        </p:nvCxnSpPr>
+        <p:spPr>
+          <a:xfrm rot="10800000">
+            <a:off x="1485902" y="3381900"/>
+            <a:ext cx="495299" cy="513671"/>
+          </a:xfrm>
+          <a:prstGeom prst="bentConnector2">
+            <a:avLst/>
+          </a:prstGeom>
+        </p:spPr>
+        <p:style>
+          <a:lnRef idx="1">
+            <a:schemeClr val="accent1"/>
+          </a:lnRef>
+          <a:fillRef idx="0">
+            <a:schemeClr val="accent1"/>
+          </a:fillRef>
+          <a:effectRef idx="0">
+            <a:schemeClr val="accent1"/>
+          </a:effectRef>
+          <a:fontRef idx="minor">
+            <a:schemeClr val="tx1"/>
+          </a:fontRef>
+        </p:style>
+      </p:cxnSp>
+      <p:sp>
+        <p:nvSpPr>
+          <p:cNvPr id="53" name="Rectangle 52">
+            <a:extLst>
+              <a:ext uri="{FF2B5EF4-FFF2-40B4-BE49-F238E27FC236}">
+                <a16:creationId xmlns:a16="http://schemas.microsoft.com/office/drawing/2014/main" id="{901B70B4-669A-4211-9F81-CDDE5A8B406B}"/>
+              </a:ext>
+            </a:extLst>
+          </p:cNvPr>
+          <p:cNvSpPr/>
+          <p:nvPr/>
+        </p:nvSpPr>
+        <p:spPr>
+          <a:xfrm>
+            <a:off x="9658350" y="2537795"/>
+            <a:ext cx="1943100" cy="457199"/>
+          </a:xfrm>
+          <a:prstGeom prst="rect">
+            <a:avLst/>
+          </a:prstGeom>
+          <a:solidFill>
+            <a:schemeClr val="accent2">
+              <a:lumMod val="75000"/>
+            </a:schemeClr>
+          </a:solidFill>
+        </p:spPr>
+        <p:style>
+          <a:lnRef idx="2">
+            <a:schemeClr val="accent1">
+              <a:shade val="50000"/>
+            </a:schemeClr>
+          </a:lnRef>
+          <a:fillRef idx="1">
+            <a:schemeClr val="accent1"/>
+          </a:fillRef>
+          <a:effectRef idx="0">
+            <a:schemeClr val="accent1"/>
+          </a:effectRef>
+          <a:fontRef idx="minor">
+            <a:schemeClr val="lt1"/>
+          </a:fontRef>
+        </p:style>
+        <p:txBody>
+          <a:bodyPr rtlCol="0" anchor="ctr"/>
+          <a:lstStyle/>
+          <a:p>
+            <a:pPr algn="ctr"/>
+            <a:r>
+              <a:rPr lang="en-US" sz="1400" dirty="0"/>
+              <a:t>Skills</a:t>
+            </a:r>
+          </a:p>
+        </p:txBody>
+      </p:sp>
+      <p:cxnSp>
+        <p:nvCxnSpPr>
+          <p:cNvPr id="55" name="Connector: Elbow 54">
+            <a:extLst>
+              <a:ext uri="{FF2B5EF4-FFF2-40B4-BE49-F238E27FC236}">
+                <a16:creationId xmlns:a16="http://schemas.microsoft.com/office/drawing/2014/main" id="{E422F5BC-2EA6-4857-BEB7-6369A092399E}"/>
+              </a:ext>
+            </a:extLst>
+          </p:cNvPr>
+          <p:cNvCxnSpPr>
+            <a:cxnSpLocks/>
+            <a:stCxn id="53" idx="3"/>
+            <a:endCxn id="30" idx="0"/>
+          </p:cNvCxnSpPr>
+          <p:nvPr/>
+        </p:nvCxnSpPr>
+        <p:spPr>
+          <a:xfrm flipH="1" flipV="1">
+            <a:off x="5857875" y="800100"/>
+            <a:ext cx="5743575" cy="1966295"/>
+          </a:xfrm>
+          <a:prstGeom prst="bentConnector4">
+            <a:avLst>
+              <a:gd name="adj1" fmla="val -3980"/>
+              <a:gd name="adj2" fmla="val 111626"/>
+            </a:avLst>
+          </a:prstGeom>
+          <a:ln>
+            <a:tailEnd type="triangle"/>
+          </a:ln>
+        </p:spPr>
+        <p:style>
+          <a:lnRef idx="1">
+            <a:schemeClr val="accent1"/>
+          </a:lnRef>
+          <a:fillRef idx="0">
+            <a:schemeClr val="accent1"/>
+          </a:fillRef>
+          <a:effectRef idx="0">
+            <a:schemeClr val="accent1"/>
+          </a:effectRef>
+          <a:fontRef idx="minor">
+            <a:schemeClr val="tx1"/>
+          </a:fontRef>
+        </p:style>
+      </p:cxnSp>
+      <p:cxnSp>
+        <p:nvCxnSpPr>
+          <p:cNvPr id="57" name="Connector: Elbow 56">
+            <a:extLst>
+              <a:ext uri="{FF2B5EF4-FFF2-40B4-BE49-F238E27FC236}">
+                <a16:creationId xmlns:a16="http://schemas.microsoft.com/office/drawing/2014/main" id="{66409DC7-F46D-4D45-8C03-B0AC7CBED2D8}"/>
+              </a:ext>
+            </a:extLst>
+          </p:cNvPr>
+          <p:cNvCxnSpPr>
+            <a:cxnSpLocks/>
+            <a:stCxn id="53" idx="1"/>
+          </p:cNvCxnSpPr>
+          <p:nvPr/>
+        </p:nvCxnSpPr>
+        <p:spPr>
+          <a:xfrm rot="10800000" flipV="1">
+            <a:off x="8301038" y="2766394"/>
+            <a:ext cx="1357312" cy="12725"/>
+          </a:xfrm>
+          <a:prstGeom prst="bentConnector3">
+            <a:avLst/>
+          </a:prstGeom>
+        </p:spPr>
+        <p:style>
+          <a:lnRef idx="1">
+            <a:schemeClr val="accent1"/>
+          </a:lnRef>
+          <a:fillRef idx="0">
+            <a:schemeClr val="accent1"/>
+          </a:fillRef>
+          <a:effectRef idx="0">
+            <a:schemeClr val="accent1"/>
+          </a:effectRef>
+          <a:fontRef idx="minor">
+            <a:schemeClr val="tx1"/>
+          </a:fontRef>
+        </p:style>
+      </p:cxnSp>
+      <p:sp>
+        <p:nvSpPr>
+          <p:cNvPr id="70" name="Rectangle 69">
+            <a:extLst>
+              <a:ext uri="{FF2B5EF4-FFF2-40B4-BE49-F238E27FC236}">
+                <a16:creationId xmlns:a16="http://schemas.microsoft.com/office/drawing/2014/main" id="{1B1BB0BE-2307-4726-AF70-713545E7DB17}"/>
+              </a:ext>
+            </a:extLst>
+          </p:cNvPr>
+          <p:cNvSpPr/>
+          <p:nvPr/>
+        </p:nvSpPr>
+        <p:spPr>
+          <a:xfrm>
+            <a:off x="3286125" y="4698050"/>
+            <a:ext cx="2171700" cy="689264"/>
+          </a:xfrm>
+          <a:prstGeom prst="rect">
+            <a:avLst/>
+          </a:prstGeom>
+        </p:spPr>
+        <p:style>
+          <a:lnRef idx="2">
+            <a:schemeClr val="accent1">
+              <a:shade val="50000"/>
+            </a:schemeClr>
+          </a:lnRef>
+          <a:fillRef idx="1">
+            <a:schemeClr val="accent1"/>
+          </a:fillRef>
+          <a:effectRef idx="0">
+            <a:schemeClr val="accent1"/>
+          </a:effectRef>
+          <a:fontRef idx="minor">
+            <a:schemeClr val="lt1"/>
+          </a:fontRef>
+        </p:style>
+        <p:txBody>
+          <a:bodyPr rtlCol="0" anchor="ctr"/>
+          <a:lstStyle/>
+          <a:p>
+            <a:pPr algn="ctr"/>
+            <a:r>
+              <a:rPr lang="en-US" sz="1200" dirty="0"/>
+              <a:t>bot connector and related protocols and services</a:t>
+            </a:r>
+          </a:p>
+        </p:txBody>
+      </p:sp>
+    </p:spTree>
+    <p:extLst>
+      <p:ext uri="{BB962C8B-B14F-4D97-AF65-F5344CB8AC3E}">
+        <p14:creationId xmlns:p14="http://schemas.microsoft.com/office/powerpoint/2010/main" val="3078482857"/>
+      </p:ext>
+    </p:extLst>
+  </p:cSld>
+  <p:clrMapOvr>
+    <a:masterClrMapping/>
+  </p:clrMapOvr>
+</p:sld>
+</file>
+
 <file path=ppt/theme/theme1.xml><?xml version="1.0" encoding="utf-8"?>
 <a:theme xmlns:a="http://schemas.openxmlformats.org/drawingml/2006/main" name="Office Theme">
   <a:themeElements>

</xml_diff>